<commit_message>
update slide and word
</commit_message>
<xml_diff>
--- a/nhom1.pptx
+++ b/nhom1.pptx
@@ -5,7 +5,7 @@
     <p:sldMasterId id="2147483659" r:id="rId1"/>
   </p:sldMasterIdLst>
   <p:notesMasterIdLst>
-    <p:notesMasterId r:id="rId40"/>
+    <p:notesMasterId r:id="rId44"/>
   </p:notesMasterIdLst>
   <p:sldIdLst>
     <p:sldId id="256" r:id="rId2"/>
@@ -35,41 +35,45 @@
     <p:sldId id="316" r:id="rId26"/>
     <p:sldId id="317" r:id="rId27"/>
     <p:sldId id="318" r:id="rId28"/>
-    <p:sldId id="312" r:id="rId29"/>
-    <p:sldId id="320" r:id="rId30"/>
-    <p:sldId id="321" r:id="rId31"/>
-    <p:sldId id="322" r:id="rId32"/>
-    <p:sldId id="323" r:id="rId33"/>
-    <p:sldId id="319" r:id="rId34"/>
-    <p:sldId id="307" r:id="rId35"/>
-    <p:sldId id="308" r:id="rId36"/>
-    <p:sldId id="309" r:id="rId37"/>
-    <p:sldId id="278" r:id="rId38"/>
-    <p:sldId id="294" r:id="rId39"/>
+    <p:sldId id="324" r:id="rId29"/>
+    <p:sldId id="325" r:id="rId30"/>
+    <p:sldId id="312" r:id="rId31"/>
+    <p:sldId id="320" r:id="rId32"/>
+    <p:sldId id="321" r:id="rId33"/>
+    <p:sldId id="322" r:id="rId34"/>
+    <p:sldId id="323" r:id="rId35"/>
+    <p:sldId id="326" r:id="rId36"/>
+    <p:sldId id="327" r:id="rId37"/>
+    <p:sldId id="319" r:id="rId38"/>
+    <p:sldId id="307" r:id="rId39"/>
+    <p:sldId id="308" r:id="rId40"/>
+    <p:sldId id="309" r:id="rId41"/>
+    <p:sldId id="278" r:id="rId42"/>
+    <p:sldId id="294" r:id="rId43"/>
   </p:sldIdLst>
   <p:sldSz cx="9144000" cy="5143500" type="screen16x9"/>
   <p:notesSz cx="6858000" cy="9144000"/>
   <p:embeddedFontLst>
     <p:embeddedFont>
-      <p:font typeface="Barlow SemiBold" charset="0"/>
-      <p:regular r:id="rId41"/>
-      <p:bold r:id="rId42"/>
-      <p:italic r:id="rId43"/>
-      <p:boldItalic r:id="rId44"/>
-    </p:embeddedFont>
-    <p:embeddedFont>
-      <p:font typeface="Barlow Light" charset="0"/>
+      <p:font typeface="Montserrat" charset="0"/>
       <p:regular r:id="rId45"/>
       <p:bold r:id="rId46"/>
       <p:italic r:id="rId47"/>
       <p:boldItalic r:id="rId48"/>
     </p:embeddedFont>
     <p:embeddedFont>
-      <p:font typeface="Montserrat" charset="0"/>
+      <p:font typeface="Barlow Light" charset="0"/>
       <p:regular r:id="rId49"/>
       <p:bold r:id="rId50"/>
       <p:italic r:id="rId51"/>
       <p:boldItalic r:id="rId52"/>
+    </p:embeddedFont>
+    <p:embeddedFont>
+      <p:font typeface="Barlow SemiBold" charset="0"/>
+      <p:regular r:id="rId53"/>
+      <p:bold r:id="rId54"/>
+      <p:italic r:id="rId55"/>
+      <p:boldItalic r:id="rId56"/>
     </p:embeddedFont>
   </p:embeddedFontLst>
   <p:defaultTextStyle>
@@ -3875,7 +3879,7 @@
   <p:cSld>
     <p:spTree>
       <p:nvGrpSpPr>
-        <p:cNvPr id="1" name="Shape 765"/>
+        <p:cNvPr id="1" name="Shape 573"/>
         <p:cNvGrpSpPr/>
         <p:nvPr/>
       </p:nvGrpSpPr>
@@ -3889,7 +3893,7 @@
       </p:grpSpPr>
       <p:sp>
         <p:nvSpPr>
-          <p:cNvPr id="766" name="Google Shape;766;g35ed75ccf_022:notes"/>
+          <p:cNvPr id="574" name="Google Shape;574;g35f391192_017:notes"/>
           <p:cNvSpPr>
             <a:spLocks noGrp="1" noRot="1" noChangeAspect="1"/>
           </p:cNvSpPr>
@@ -3930,7 +3934,7 @@
       </p:sp>
       <p:sp>
         <p:nvSpPr>
-          <p:cNvPr id="767" name="Google Shape;767;g35ed75ccf_022:notes"/>
+          <p:cNvPr id="575" name="Google Shape;575;g35f391192_017:notes"/>
           <p:cNvSpPr txBox="1">
             <a:spLocks noGrp="1"/>
           </p:cNvSpPr>
@@ -3979,7 +3983,7 @@
   <p:cSld>
     <p:spTree>
       <p:nvGrpSpPr>
-        <p:cNvPr id="1" name="Shape 1819"/>
+        <p:cNvPr id="1" name="Shape 573"/>
         <p:cNvGrpSpPr/>
         <p:nvPr/>
       </p:nvGrpSpPr>
@@ -3993,7 +3997,7 @@
       </p:grpSpPr>
       <p:sp>
         <p:nvSpPr>
-          <p:cNvPr id="1820" name="Google Shape;1820;g41a98d525d_0_38:notes"/>
+          <p:cNvPr id="574" name="Google Shape;574;g35f391192_017:notes"/>
           <p:cNvSpPr>
             <a:spLocks noGrp="1" noRot="1" noChangeAspect="1"/>
           </p:cNvSpPr>
@@ -4034,7 +4038,111 @@
       </p:sp>
       <p:sp>
         <p:nvSpPr>
-          <p:cNvPr id="1821" name="Google Shape;1821;g41a98d525d_0_38:notes"/>
+          <p:cNvPr id="575" name="Google Shape;575;g35f391192_017:notes"/>
+          <p:cNvSpPr txBox="1">
+            <a:spLocks noGrp="1"/>
+          </p:cNvSpPr>
+          <p:nvPr>
+            <p:ph type="body" idx="1"/>
+          </p:nvPr>
+        </p:nvSpPr>
+        <p:spPr>
+          <a:xfrm>
+            <a:off x="685800" y="4343400"/>
+            <a:ext cx="5486400" cy="4114800"/>
+          </a:xfrm>
+          <a:prstGeom prst="rect">
+            <a:avLst/>
+          </a:prstGeom>
+        </p:spPr>
+        <p:txBody>
+          <a:bodyPr spcFirstLastPara="1" wrap="square" lIns="91425" tIns="91425" rIns="91425" bIns="91425" anchor="t" anchorCtr="0">
+            <a:noAutofit/>
+          </a:bodyPr>
+          <a:lstStyle/>
+          <a:p>
+            <a:pPr marL="0" lvl="0" indent="0" algn="l" rtl="0">
+              <a:spcBef>
+                <a:spcPts val="0"/>
+              </a:spcBef>
+              <a:spcAft>
+                <a:spcPts val="0"/>
+              </a:spcAft>
+              <a:buNone/>
+            </a:pPr>
+            <a:endParaRPr/>
+          </a:p>
+        </p:txBody>
+      </p:sp>
+    </p:spTree>
+  </p:cSld>
+  <p:clrMapOvr>
+    <a:masterClrMapping/>
+  </p:clrMapOvr>
+</p:notes>
+</file>
+
+<file path=ppt/notesSlides/notesSlide39.xml><?xml version="1.0" encoding="utf-8"?>
+<p:notes xmlns:a="http://schemas.openxmlformats.org/drawingml/2006/main" xmlns:r="http://schemas.openxmlformats.org/officeDocument/2006/relationships" xmlns:p="http://schemas.openxmlformats.org/presentationml/2006/main" showMasterSp="0" showMasterPhAnim="0">
+  <p:cSld>
+    <p:spTree>
+      <p:nvGrpSpPr>
+        <p:cNvPr id="1" name="Shape 573"/>
+        <p:cNvGrpSpPr/>
+        <p:nvPr/>
+      </p:nvGrpSpPr>
+      <p:grpSpPr>
+        <a:xfrm>
+          <a:off x="0" y="0"/>
+          <a:ext cx="0" cy="0"/>
+          <a:chOff x="0" y="0"/>
+          <a:chExt cx="0" cy="0"/>
+        </a:xfrm>
+      </p:grpSpPr>
+      <p:sp>
+        <p:nvSpPr>
+          <p:cNvPr id="574" name="Google Shape;574;g35f391192_017:notes"/>
+          <p:cNvSpPr>
+            <a:spLocks noGrp="1" noRot="1" noChangeAspect="1"/>
+          </p:cNvSpPr>
+          <p:nvPr>
+            <p:ph type="sldImg" idx="2"/>
+          </p:nvPr>
+        </p:nvSpPr>
+        <p:spPr>
+          <a:xfrm>
+            <a:off x="381000" y="685800"/>
+            <a:ext cx="6096000" cy="3429000"/>
+          </a:xfrm>
+          <a:custGeom>
+            <a:avLst/>
+            <a:gdLst/>
+            <a:ahLst/>
+            <a:cxnLst/>
+            <a:rect l="l" t="t" r="r" b="b"/>
+            <a:pathLst>
+              <a:path w="120000" h="120000" extrusionOk="0">
+                <a:moveTo>
+                  <a:pt x="0" y="0"/>
+                </a:moveTo>
+                <a:lnTo>
+                  <a:pt x="120000" y="0"/>
+                </a:lnTo>
+                <a:lnTo>
+                  <a:pt x="120000" y="120000"/>
+                </a:lnTo>
+                <a:lnTo>
+                  <a:pt x="0" y="120000"/>
+                </a:lnTo>
+                <a:close/>
+              </a:path>
+            </a:pathLst>
+          </a:custGeom>
+        </p:spPr>
+      </p:sp>
+      <p:sp>
+        <p:nvSpPr>
+          <p:cNvPr id="575" name="Google Shape;575;g35f391192_017:notes"/>
           <p:cNvSpPr txBox="1">
             <a:spLocks noGrp="1"/>
           </p:cNvSpPr>
@@ -4139,6 +4247,318 @@
       <p:sp>
         <p:nvSpPr>
           <p:cNvPr id="519" name="Google Shape;519;g3606f1c2d_30:notes"/>
+          <p:cNvSpPr txBox="1">
+            <a:spLocks noGrp="1"/>
+          </p:cNvSpPr>
+          <p:nvPr>
+            <p:ph type="body" idx="1"/>
+          </p:nvPr>
+        </p:nvSpPr>
+        <p:spPr>
+          <a:xfrm>
+            <a:off x="685800" y="4343400"/>
+            <a:ext cx="5486400" cy="4114800"/>
+          </a:xfrm>
+          <a:prstGeom prst="rect">
+            <a:avLst/>
+          </a:prstGeom>
+        </p:spPr>
+        <p:txBody>
+          <a:bodyPr spcFirstLastPara="1" wrap="square" lIns="91425" tIns="91425" rIns="91425" bIns="91425" anchor="t" anchorCtr="0">
+            <a:noAutofit/>
+          </a:bodyPr>
+          <a:lstStyle/>
+          <a:p>
+            <a:pPr marL="0" lvl="0" indent="0" algn="l" rtl="0">
+              <a:spcBef>
+                <a:spcPts val="0"/>
+              </a:spcBef>
+              <a:spcAft>
+                <a:spcPts val="0"/>
+              </a:spcAft>
+              <a:buNone/>
+            </a:pPr>
+            <a:endParaRPr/>
+          </a:p>
+        </p:txBody>
+      </p:sp>
+    </p:spTree>
+  </p:cSld>
+  <p:clrMapOvr>
+    <a:masterClrMapping/>
+  </p:clrMapOvr>
+</p:notes>
+</file>
+
+<file path=ppt/notesSlides/notesSlide40.xml><?xml version="1.0" encoding="utf-8"?>
+<p:notes xmlns:a="http://schemas.openxmlformats.org/drawingml/2006/main" xmlns:r="http://schemas.openxmlformats.org/officeDocument/2006/relationships" xmlns:p="http://schemas.openxmlformats.org/presentationml/2006/main" showMasterSp="0" showMasterPhAnim="0">
+  <p:cSld>
+    <p:spTree>
+      <p:nvGrpSpPr>
+        <p:cNvPr id="1" name="Shape 573"/>
+        <p:cNvGrpSpPr/>
+        <p:nvPr/>
+      </p:nvGrpSpPr>
+      <p:grpSpPr>
+        <a:xfrm>
+          <a:off x="0" y="0"/>
+          <a:ext cx="0" cy="0"/>
+          <a:chOff x="0" y="0"/>
+          <a:chExt cx="0" cy="0"/>
+        </a:xfrm>
+      </p:grpSpPr>
+      <p:sp>
+        <p:nvSpPr>
+          <p:cNvPr id="574" name="Google Shape;574;g35f391192_017:notes"/>
+          <p:cNvSpPr>
+            <a:spLocks noGrp="1" noRot="1" noChangeAspect="1"/>
+          </p:cNvSpPr>
+          <p:nvPr>
+            <p:ph type="sldImg" idx="2"/>
+          </p:nvPr>
+        </p:nvSpPr>
+        <p:spPr>
+          <a:xfrm>
+            <a:off x="381000" y="685800"/>
+            <a:ext cx="6096000" cy="3429000"/>
+          </a:xfrm>
+          <a:custGeom>
+            <a:avLst/>
+            <a:gdLst/>
+            <a:ahLst/>
+            <a:cxnLst/>
+            <a:rect l="l" t="t" r="r" b="b"/>
+            <a:pathLst>
+              <a:path w="120000" h="120000" extrusionOk="0">
+                <a:moveTo>
+                  <a:pt x="0" y="0"/>
+                </a:moveTo>
+                <a:lnTo>
+                  <a:pt x="120000" y="0"/>
+                </a:lnTo>
+                <a:lnTo>
+                  <a:pt x="120000" y="120000"/>
+                </a:lnTo>
+                <a:lnTo>
+                  <a:pt x="0" y="120000"/>
+                </a:lnTo>
+                <a:close/>
+              </a:path>
+            </a:pathLst>
+          </a:custGeom>
+        </p:spPr>
+      </p:sp>
+      <p:sp>
+        <p:nvSpPr>
+          <p:cNvPr id="575" name="Google Shape;575;g35f391192_017:notes"/>
+          <p:cNvSpPr txBox="1">
+            <a:spLocks noGrp="1"/>
+          </p:cNvSpPr>
+          <p:nvPr>
+            <p:ph type="body" idx="1"/>
+          </p:nvPr>
+        </p:nvSpPr>
+        <p:spPr>
+          <a:xfrm>
+            <a:off x="685800" y="4343400"/>
+            <a:ext cx="5486400" cy="4114800"/>
+          </a:xfrm>
+          <a:prstGeom prst="rect">
+            <a:avLst/>
+          </a:prstGeom>
+        </p:spPr>
+        <p:txBody>
+          <a:bodyPr spcFirstLastPara="1" wrap="square" lIns="91425" tIns="91425" rIns="91425" bIns="91425" anchor="t" anchorCtr="0">
+            <a:noAutofit/>
+          </a:bodyPr>
+          <a:lstStyle/>
+          <a:p>
+            <a:pPr marL="0" lvl="0" indent="0" algn="l" rtl="0">
+              <a:spcBef>
+                <a:spcPts val="0"/>
+              </a:spcBef>
+              <a:spcAft>
+                <a:spcPts val="0"/>
+              </a:spcAft>
+              <a:buNone/>
+            </a:pPr>
+            <a:endParaRPr/>
+          </a:p>
+        </p:txBody>
+      </p:sp>
+    </p:spTree>
+  </p:cSld>
+  <p:clrMapOvr>
+    <a:masterClrMapping/>
+  </p:clrMapOvr>
+</p:notes>
+</file>
+
+<file path=ppt/notesSlides/notesSlide41.xml><?xml version="1.0" encoding="utf-8"?>
+<p:notes xmlns:a="http://schemas.openxmlformats.org/drawingml/2006/main" xmlns:r="http://schemas.openxmlformats.org/officeDocument/2006/relationships" xmlns:p="http://schemas.openxmlformats.org/presentationml/2006/main" showMasterSp="0" showMasterPhAnim="0">
+  <p:cSld>
+    <p:spTree>
+      <p:nvGrpSpPr>
+        <p:cNvPr id="1" name="Shape 765"/>
+        <p:cNvGrpSpPr/>
+        <p:nvPr/>
+      </p:nvGrpSpPr>
+      <p:grpSpPr>
+        <a:xfrm>
+          <a:off x="0" y="0"/>
+          <a:ext cx="0" cy="0"/>
+          <a:chOff x="0" y="0"/>
+          <a:chExt cx="0" cy="0"/>
+        </a:xfrm>
+      </p:grpSpPr>
+      <p:sp>
+        <p:nvSpPr>
+          <p:cNvPr id="766" name="Google Shape;766;g35ed75ccf_022:notes"/>
+          <p:cNvSpPr>
+            <a:spLocks noGrp="1" noRot="1" noChangeAspect="1"/>
+          </p:cNvSpPr>
+          <p:nvPr>
+            <p:ph type="sldImg" idx="2"/>
+          </p:nvPr>
+        </p:nvSpPr>
+        <p:spPr>
+          <a:xfrm>
+            <a:off x="381000" y="685800"/>
+            <a:ext cx="6096000" cy="3429000"/>
+          </a:xfrm>
+          <a:custGeom>
+            <a:avLst/>
+            <a:gdLst/>
+            <a:ahLst/>
+            <a:cxnLst/>
+            <a:rect l="l" t="t" r="r" b="b"/>
+            <a:pathLst>
+              <a:path w="120000" h="120000" extrusionOk="0">
+                <a:moveTo>
+                  <a:pt x="0" y="0"/>
+                </a:moveTo>
+                <a:lnTo>
+                  <a:pt x="120000" y="0"/>
+                </a:lnTo>
+                <a:lnTo>
+                  <a:pt x="120000" y="120000"/>
+                </a:lnTo>
+                <a:lnTo>
+                  <a:pt x="0" y="120000"/>
+                </a:lnTo>
+                <a:close/>
+              </a:path>
+            </a:pathLst>
+          </a:custGeom>
+        </p:spPr>
+      </p:sp>
+      <p:sp>
+        <p:nvSpPr>
+          <p:cNvPr id="767" name="Google Shape;767;g35ed75ccf_022:notes"/>
+          <p:cNvSpPr txBox="1">
+            <a:spLocks noGrp="1"/>
+          </p:cNvSpPr>
+          <p:nvPr>
+            <p:ph type="body" idx="1"/>
+          </p:nvPr>
+        </p:nvSpPr>
+        <p:spPr>
+          <a:xfrm>
+            <a:off x="685800" y="4343400"/>
+            <a:ext cx="5486400" cy="4114800"/>
+          </a:xfrm>
+          <a:prstGeom prst="rect">
+            <a:avLst/>
+          </a:prstGeom>
+        </p:spPr>
+        <p:txBody>
+          <a:bodyPr spcFirstLastPara="1" wrap="square" lIns="91425" tIns="91425" rIns="91425" bIns="91425" anchor="t" anchorCtr="0">
+            <a:noAutofit/>
+          </a:bodyPr>
+          <a:lstStyle/>
+          <a:p>
+            <a:pPr marL="0" lvl="0" indent="0" algn="l" rtl="0">
+              <a:spcBef>
+                <a:spcPts val="0"/>
+              </a:spcBef>
+              <a:spcAft>
+                <a:spcPts val="0"/>
+              </a:spcAft>
+              <a:buNone/>
+            </a:pPr>
+            <a:endParaRPr/>
+          </a:p>
+        </p:txBody>
+      </p:sp>
+    </p:spTree>
+  </p:cSld>
+  <p:clrMapOvr>
+    <a:masterClrMapping/>
+  </p:clrMapOvr>
+</p:notes>
+</file>
+
+<file path=ppt/notesSlides/notesSlide42.xml><?xml version="1.0" encoding="utf-8"?>
+<p:notes xmlns:a="http://schemas.openxmlformats.org/drawingml/2006/main" xmlns:r="http://schemas.openxmlformats.org/officeDocument/2006/relationships" xmlns:p="http://schemas.openxmlformats.org/presentationml/2006/main" showMasterSp="0" showMasterPhAnim="0">
+  <p:cSld>
+    <p:spTree>
+      <p:nvGrpSpPr>
+        <p:cNvPr id="1" name="Shape 1819"/>
+        <p:cNvGrpSpPr/>
+        <p:nvPr/>
+      </p:nvGrpSpPr>
+      <p:grpSpPr>
+        <a:xfrm>
+          <a:off x="0" y="0"/>
+          <a:ext cx="0" cy="0"/>
+          <a:chOff x="0" y="0"/>
+          <a:chExt cx="0" cy="0"/>
+        </a:xfrm>
+      </p:grpSpPr>
+      <p:sp>
+        <p:nvSpPr>
+          <p:cNvPr id="1820" name="Google Shape;1820;g41a98d525d_0_38:notes"/>
+          <p:cNvSpPr>
+            <a:spLocks noGrp="1" noRot="1" noChangeAspect="1"/>
+          </p:cNvSpPr>
+          <p:nvPr>
+            <p:ph type="sldImg" idx="2"/>
+          </p:nvPr>
+        </p:nvSpPr>
+        <p:spPr>
+          <a:xfrm>
+            <a:off x="381000" y="685800"/>
+            <a:ext cx="6096000" cy="3429000"/>
+          </a:xfrm>
+          <a:custGeom>
+            <a:avLst/>
+            <a:gdLst/>
+            <a:ahLst/>
+            <a:cxnLst/>
+            <a:rect l="l" t="t" r="r" b="b"/>
+            <a:pathLst>
+              <a:path w="120000" h="120000" extrusionOk="0">
+                <a:moveTo>
+                  <a:pt x="0" y="0"/>
+                </a:moveTo>
+                <a:lnTo>
+                  <a:pt x="120000" y="0"/>
+                </a:lnTo>
+                <a:lnTo>
+                  <a:pt x="120000" y="120000"/>
+                </a:lnTo>
+                <a:lnTo>
+                  <a:pt x="0" y="120000"/>
+                </a:lnTo>
+                <a:close/>
+              </a:path>
+            </a:pathLst>
+          </a:custGeom>
+        </p:spPr>
+      </p:sp>
+      <p:sp>
+        <p:nvSpPr>
+          <p:cNvPr id="1821" name="Google Shape;1821;g41a98d525d_0_38:notes"/>
           <p:cNvSpPr txBox="1">
             <a:spLocks noGrp="1"/>
           </p:cNvSpPr>
@@ -26730,7 +27150,7 @@
             <a:spLocks noGrp="1"/>
           </p:cNvSpPr>
           <p:nvPr>
-            <p:ph type="ctrTitle"/>
+            <p:ph type="title"/>
           </p:nvPr>
         </p:nvSpPr>
         <p:spPr/>
@@ -26740,35 +27160,11 @@
           <a:p>
             <a:r>
               <a:rPr lang="en-US" dirty="0" smtClean="0"/>
-              <a:t>4. </a:t>
-            </a:r>
-            <a:r>
-              <a:rPr lang="en-US" dirty="0" err="1" smtClean="0"/>
-              <a:t>Thiết</a:t>
+              <a:t>3.5 Update </a:t>
             </a:r>
             <a:r>
               <a:rPr lang="en-US" dirty="0" smtClean="0"/>
-              <a:t> </a:t>
-            </a:r>
-            <a:r>
-              <a:rPr lang="en-US" dirty="0" err="1" smtClean="0"/>
-              <a:t>kế</a:t>
-            </a:r>
-            <a:r>
-              <a:rPr lang="en-US" dirty="0" smtClean="0"/>
-              <a:t> </a:t>
-            </a:r>
-            <a:r>
-              <a:rPr lang="en-US" dirty="0" err="1" smtClean="0"/>
-              <a:t>giao</a:t>
-            </a:r>
-            <a:r>
-              <a:rPr lang="en-US" dirty="0" smtClean="0"/>
-              <a:t> </a:t>
-            </a:r>
-            <a:r>
-              <a:rPr lang="en-US" dirty="0" err="1" smtClean="0"/>
-              <a:t>diện</a:t>
+              <a:t>sequence</a:t>
             </a:r>
             <a:endParaRPr lang="en-US" dirty="0"/>
           </a:p>
@@ -26781,14 +27177,10 @@
             <a:spLocks noGrp="1"/>
           </p:cNvSpPr>
           <p:nvPr>
-            <p:ph type="sldNum" idx="4294967295"/>
+            <p:ph type="sldNum" idx="12"/>
           </p:nvPr>
         </p:nvSpPr>
         <p:spPr>
-          <a:xfrm>
-            <a:off x="8489950" y="4489450"/>
-            <a:ext cx="654050" cy="654050"/>
-          </a:xfrm>
           <a:prstGeom prst="rect">
             <a:avLst/>
           </a:prstGeom>
@@ -26816,10 +27208,51 @@
           </a:p>
         </p:txBody>
       </p:sp>
+      <p:pic>
+        <p:nvPicPr>
+          <p:cNvPr id="7" name="Picture 2" descr="Sequence-updateGV.png"/>
+          <p:cNvPicPr>
+            <a:picLocks noChangeAspect="1" noChangeArrowheads="1"/>
+          </p:cNvPicPr>
+          <p:nvPr/>
+        </p:nvPicPr>
+        <p:blipFill>
+          <a:blip r:embed="rId3">
+            <a:extLst>
+              <a:ext uri="{28A0092B-C50C-407E-A947-70E740481C1C}">
+                <a14:useLocalDpi xmlns:a14="http://schemas.microsoft.com/office/drawing/2010/main" val="0"/>
+              </a:ext>
+            </a:extLst>
+          </a:blip>
+          <a:srcRect/>
+          <a:stretch>
+            <a:fillRect/>
+          </a:stretch>
+        </p:blipFill>
+        <p:spPr bwMode="auto">
+          <a:xfrm>
+            <a:off x="1331640" y="1419622"/>
+            <a:ext cx="6840760" cy="3466773"/>
+          </a:xfrm>
+          <a:prstGeom prst="rect">
+            <a:avLst/>
+          </a:prstGeom>
+          <a:noFill/>
+          <a:extLst>
+            <a:ext uri="{909E8E84-426E-40DD-AFC4-6F175D3DCCD1}">
+              <a14:hiddenFill xmlns:a14="http://schemas.microsoft.com/office/drawing/2010/main">
+                <a:solidFill>
+                  <a:srgbClr val="FFFFFF"/>
+                </a:solidFill>
+              </a14:hiddenFill>
+            </a:ext>
+          </a:extLst>
+        </p:spPr>
+      </p:pic>
     </p:spTree>
     <p:extLst>
       <p:ext uri="{BB962C8B-B14F-4D97-AF65-F5344CB8AC3E}">
-        <p14:creationId xmlns:p14="http://schemas.microsoft.com/office/powerpoint/2010/main" val="2562418691"/>
+        <p14:creationId xmlns:p14="http://schemas.microsoft.com/office/powerpoint/2010/main" val="3179674117"/>
       </p:ext>
     </p:extLst>
   </p:cSld>
@@ -26863,35 +27296,19 @@
           <a:p>
             <a:r>
               <a:rPr lang="en-US" dirty="0" smtClean="0"/>
-              <a:t>4.1 </a:t>
-            </a:r>
-            <a:r>
-              <a:rPr lang="en-US" dirty="0" err="1" smtClean="0"/>
-              <a:t>Trang</a:t>
+              <a:t>3.4 </a:t>
+            </a:r>
+            <a:r>
+              <a:rPr lang="en-US" dirty="0" smtClean="0"/>
+              <a:t>Add</a:t>
             </a:r>
             <a:r>
               <a:rPr lang="en-US" dirty="0" smtClean="0"/>
               <a:t> </a:t>
             </a:r>
             <a:r>
-              <a:rPr lang="en-US" dirty="0" err="1" smtClean="0"/>
-              <a:t>chủ</a:t>
-            </a:r>
-            <a:r>
               <a:rPr lang="en-US" dirty="0" smtClean="0"/>
-              <a:t> </a:t>
-            </a:r>
-            <a:r>
-              <a:rPr lang="en-US" dirty="0" err="1" smtClean="0"/>
-              <a:t>hệ</a:t>
-            </a:r>
-            <a:r>
-              <a:rPr lang="en-US" dirty="0" smtClean="0"/>
-              <a:t> </a:t>
-            </a:r>
-            <a:r>
-              <a:rPr lang="en-US" dirty="0" err="1" smtClean="0"/>
-              <a:t>thống</a:t>
+              <a:t>sequence</a:t>
             </a:r>
             <a:endParaRPr lang="en-US" dirty="0"/>
           </a:p>
@@ -26937,7 +27354,7 @@
       </p:sp>
       <p:pic>
         <p:nvPicPr>
-          <p:cNvPr id="1026" name="Picture 2"/>
+          <p:cNvPr id="2" name="Picture 2" descr="G:\CNPM\SequenceDelete.png"/>
           <p:cNvPicPr>
             <a:picLocks noChangeAspect="1" noChangeArrowheads="1"/>
           </p:cNvPicPr>
@@ -26958,43 +27375,20 @@
         </p:blipFill>
         <p:spPr bwMode="auto">
           <a:xfrm>
-            <a:off x="1403648" y="1419622"/>
-            <a:ext cx="5987577" cy="3144181"/>
+            <a:off x="1259632" y="1347614"/>
+            <a:ext cx="6581775" cy="3578845"/>
           </a:xfrm>
           <a:prstGeom prst="rect">
             <a:avLst/>
           </a:prstGeom>
           <a:noFill/>
-          <a:ln>
-            <a:noFill/>
-          </a:ln>
-          <a:effectLst/>
           <a:extLst>
             <a:ext uri="{909E8E84-426E-40DD-AFC4-6F175D3DCCD1}">
               <a14:hiddenFill xmlns:a14="http://schemas.microsoft.com/office/drawing/2010/main">
                 <a:solidFill>
-                  <a:schemeClr val="accent1"/>
+                  <a:srgbClr val="FFFFFF"/>
                 </a:solidFill>
               </a14:hiddenFill>
-            </a:ext>
-            <a:ext uri="{91240B29-F687-4F45-9708-019B960494DF}">
-              <a14:hiddenLine xmlns:a14="http://schemas.microsoft.com/office/drawing/2010/main" w="9525">
-                <a:solidFill>
-                  <a:schemeClr val="tx1"/>
-                </a:solidFill>
-                <a:miter lim="800000"/>
-                <a:headEnd/>
-                <a:tailEnd/>
-              </a14:hiddenLine>
-            </a:ext>
-            <a:ext uri="{AF507438-7753-43E0-B8FC-AC1667EBCBE1}">
-              <a14:hiddenEffects xmlns:a14="http://schemas.microsoft.com/office/drawing/2010/main">
-                <a:effectLst>
-                  <a:outerShdw dist="35921" dir="2700000" algn="ctr" rotWithShape="0">
-                    <a:schemeClr val="bg2"/>
-                  </a:outerShdw>
-                </a:effectLst>
-              </a14:hiddenEffects>
             </a:ext>
           </a:extLst>
         </p:spPr>
@@ -27002,7 +27396,7 @@
     </p:spTree>
     <p:extLst>
       <p:ext uri="{BB962C8B-B14F-4D97-AF65-F5344CB8AC3E}">
-        <p14:creationId xmlns:p14="http://schemas.microsoft.com/office/powerpoint/2010/main" val="1440441784"/>
+        <p14:creationId xmlns:p14="http://schemas.microsoft.com/office/powerpoint/2010/main" val="736819119"/>
       </p:ext>
     </p:extLst>
   </p:cSld>
@@ -27510,6 +27904,129 @@
             <a:spLocks noGrp="1"/>
           </p:cNvSpPr>
           <p:nvPr>
+            <p:ph type="ctrTitle"/>
+          </p:nvPr>
+        </p:nvSpPr>
+        <p:spPr/>
+        <p:txBody>
+          <a:bodyPr/>
+          <a:lstStyle/>
+          <a:p>
+            <a:r>
+              <a:rPr lang="en-US" dirty="0" smtClean="0"/>
+              <a:t>4. </a:t>
+            </a:r>
+            <a:r>
+              <a:rPr lang="en-US" dirty="0" err="1" smtClean="0"/>
+              <a:t>Thiết</a:t>
+            </a:r>
+            <a:r>
+              <a:rPr lang="en-US" dirty="0" smtClean="0"/>
+              <a:t> </a:t>
+            </a:r>
+            <a:r>
+              <a:rPr lang="en-US" dirty="0" err="1" smtClean="0"/>
+              <a:t>kế</a:t>
+            </a:r>
+            <a:r>
+              <a:rPr lang="en-US" dirty="0" smtClean="0"/>
+              <a:t> </a:t>
+            </a:r>
+            <a:r>
+              <a:rPr lang="en-US" dirty="0" err="1" smtClean="0"/>
+              <a:t>giao</a:t>
+            </a:r>
+            <a:r>
+              <a:rPr lang="en-US" dirty="0" smtClean="0"/>
+              <a:t> </a:t>
+            </a:r>
+            <a:r>
+              <a:rPr lang="en-US" dirty="0" err="1" smtClean="0"/>
+              <a:t>diện</a:t>
+            </a:r>
+            <a:endParaRPr lang="en-US" dirty="0"/>
+          </a:p>
+        </p:txBody>
+      </p:sp>
+      <p:sp>
+        <p:nvSpPr>
+          <p:cNvPr id="580" name="Google Shape;580;p20"/>
+          <p:cNvSpPr txBox="1">
+            <a:spLocks noGrp="1"/>
+          </p:cNvSpPr>
+          <p:nvPr>
+            <p:ph type="sldNum" idx="4294967295"/>
+          </p:nvPr>
+        </p:nvSpPr>
+        <p:spPr>
+          <a:xfrm>
+            <a:off x="8489950" y="4489450"/>
+            <a:ext cx="654050" cy="654050"/>
+          </a:xfrm>
+          <a:prstGeom prst="rect">
+            <a:avLst/>
+          </a:prstGeom>
+        </p:spPr>
+        <p:txBody>
+          <a:bodyPr spcFirstLastPara="1" wrap="square" lIns="0" tIns="0" rIns="0" bIns="0" anchor="ctr" anchorCtr="0">
+            <a:noAutofit/>
+          </a:bodyPr>
+          <a:lstStyle/>
+          <a:p>
+            <a:pPr marL="0" lvl="0" indent="0" algn="ctr" rtl="0">
+              <a:spcBef>
+                <a:spcPts val="0"/>
+              </a:spcBef>
+              <a:spcAft>
+                <a:spcPts val="0"/>
+              </a:spcAft>
+              <a:buNone/>
+            </a:pPr>
+            <a:fld id="{00000000-1234-1234-1234-123412341234}" type="slidenum">
+              <a:rPr lang="en"/>
+              <a:t>30</a:t>
+            </a:fld>
+            <a:endParaRPr/>
+          </a:p>
+        </p:txBody>
+      </p:sp>
+    </p:spTree>
+    <p:extLst>
+      <p:ext uri="{BB962C8B-B14F-4D97-AF65-F5344CB8AC3E}">
+        <p14:creationId xmlns:p14="http://schemas.microsoft.com/office/powerpoint/2010/main" val="2562418691"/>
+      </p:ext>
+    </p:extLst>
+  </p:cSld>
+  <p:clrMapOvr>
+    <a:masterClrMapping/>
+  </p:clrMapOvr>
+</p:sld>
+</file>
+
+<file path=ppt/slides/slide31.xml><?xml version="1.0" encoding="utf-8"?>
+<p:sld xmlns:a="http://schemas.openxmlformats.org/drawingml/2006/main" xmlns:r="http://schemas.openxmlformats.org/officeDocument/2006/relationships" xmlns:p="http://schemas.openxmlformats.org/presentationml/2006/main">
+  <p:cSld>
+    <p:spTree>
+      <p:nvGrpSpPr>
+        <p:cNvPr id="1" name="Shape 576"/>
+        <p:cNvGrpSpPr/>
+        <p:nvPr/>
+      </p:nvGrpSpPr>
+      <p:grpSpPr>
+        <a:xfrm>
+          <a:off x="0" y="0"/>
+          <a:ext cx="0" cy="0"/>
+          <a:chOff x="0" y="0"/>
+          <a:chExt cx="0" cy="0"/>
+        </a:xfrm>
+      </p:grpSpPr>
+      <p:sp>
+        <p:nvSpPr>
+          <p:cNvPr id="5" name="Title 4"/>
+          <p:cNvSpPr>
+            <a:spLocks noGrp="1"/>
+          </p:cNvSpPr>
+          <p:nvPr>
             <p:ph type="title"/>
           </p:nvPr>
         </p:nvSpPr>
@@ -27520,7 +28037,7 @@
           <a:p>
             <a:r>
               <a:rPr lang="en-US" dirty="0" smtClean="0"/>
-              <a:t>4.2 </a:t>
+              <a:t>4.1 </a:t>
             </a:r>
             <a:r>
               <a:rPr lang="en-US" dirty="0" err="1" smtClean="0"/>
@@ -27532,7 +28049,7 @@
             </a:r>
             <a:r>
               <a:rPr lang="en-US" dirty="0" err="1" smtClean="0"/>
-              <a:t>tìm</a:t>
+              <a:t>chủ</a:t>
             </a:r>
             <a:r>
               <a:rPr lang="en-US" dirty="0" smtClean="0"/>
@@ -27540,7 +28057,15 @@
             </a:r>
             <a:r>
               <a:rPr lang="en-US" dirty="0" err="1" smtClean="0"/>
-              <a:t>kiếm</a:t>
+              <a:t>hệ</a:t>
+            </a:r>
+            <a:r>
+              <a:rPr lang="en-US" dirty="0" smtClean="0"/>
+              <a:t> </a:t>
+            </a:r>
+            <a:r>
+              <a:rPr lang="en-US" dirty="0" err="1" smtClean="0"/>
+              <a:t>thống</a:t>
             </a:r>
             <a:endParaRPr lang="en-US" dirty="0"/>
           </a:p>
@@ -27578,7 +28103,182 @@
             </a:pPr>
             <a:fld id="{00000000-1234-1234-1234-123412341234}" type="slidenum">
               <a:rPr lang="en"/>
-              <a:t>30</a:t>
+              <a:t>31</a:t>
+            </a:fld>
+            <a:endParaRPr/>
+          </a:p>
+        </p:txBody>
+      </p:sp>
+      <p:pic>
+        <p:nvPicPr>
+          <p:cNvPr id="1026" name="Picture 2"/>
+          <p:cNvPicPr>
+            <a:picLocks noChangeAspect="1" noChangeArrowheads="1"/>
+          </p:cNvPicPr>
+          <p:nvPr/>
+        </p:nvPicPr>
+        <p:blipFill>
+          <a:blip r:embed="rId3">
+            <a:extLst>
+              <a:ext uri="{28A0092B-C50C-407E-A947-70E740481C1C}">
+                <a14:useLocalDpi xmlns:a14="http://schemas.microsoft.com/office/drawing/2010/main" val="0"/>
+              </a:ext>
+            </a:extLst>
+          </a:blip>
+          <a:srcRect/>
+          <a:stretch>
+            <a:fillRect/>
+          </a:stretch>
+        </p:blipFill>
+        <p:spPr bwMode="auto">
+          <a:xfrm>
+            <a:off x="1403648" y="1419622"/>
+            <a:ext cx="5987577" cy="3144181"/>
+          </a:xfrm>
+          <a:prstGeom prst="rect">
+            <a:avLst/>
+          </a:prstGeom>
+          <a:noFill/>
+          <a:ln>
+            <a:noFill/>
+          </a:ln>
+          <a:effectLst/>
+          <a:extLst>
+            <a:ext uri="{909E8E84-426E-40DD-AFC4-6F175D3DCCD1}">
+              <a14:hiddenFill xmlns:a14="http://schemas.microsoft.com/office/drawing/2010/main">
+                <a:solidFill>
+                  <a:schemeClr val="accent1"/>
+                </a:solidFill>
+              </a14:hiddenFill>
+            </a:ext>
+            <a:ext uri="{91240B29-F687-4F45-9708-019B960494DF}">
+              <a14:hiddenLine xmlns:a14="http://schemas.microsoft.com/office/drawing/2010/main" w="9525">
+                <a:solidFill>
+                  <a:schemeClr val="tx1"/>
+                </a:solidFill>
+                <a:miter lim="800000"/>
+                <a:headEnd/>
+                <a:tailEnd/>
+              </a14:hiddenLine>
+            </a:ext>
+            <a:ext uri="{AF507438-7753-43E0-B8FC-AC1667EBCBE1}">
+              <a14:hiddenEffects xmlns:a14="http://schemas.microsoft.com/office/drawing/2010/main">
+                <a:effectLst>
+                  <a:outerShdw dist="35921" dir="2700000" algn="ctr" rotWithShape="0">
+                    <a:schemeClr val="bg2"/>
+                  </a:outerShdw>
+                </a:effectLst>
+              </a14:hiddenEffects>
+            </a:ext>
+          </a:extLst>
+        </p:spPr>
+      </p:pic>
+    </p:spTree>
+    <p:extLst>
+      <p:ext uri="{BB962C8B-B14F-4D97-AF65-F5344CB8AC3E}">
+        <p14:creationId xmlns:p14="http://schemas.microsoft.com/office/powerpoint/2010/main" val="1440441784"/>
+      </p:ext>
+    </p:extLst>
+  </p:cSld>
+  <p:clrMapOvr>
+    <a:masterClrMapping/>
+  </p:clrMapOvr>
+</p:sld>
+</file>
+
+<file path=ppt/slides/slide32.xml><?xml version="1.0" encoding="utf-8"?>
+<p:sld xmlns:a="http://schemas.openxmlformats.org/drawingml/2006/main" xmlns:r="http://schemas.openxmlformats.org/officeDocument/2006/relationships" xmlns:p="http://schemas.openxmlformats.org/presentationml/2006/main">
+  <p:cSld>
+    <p:spTree>
+      <p:nvGrpSpPr>
+        <p:cNvPr id="1" name="Shape 576"/>
+        <p:cNvGrpSpPr/>
+        <p:nvPr/>
+      </p:nvGrpSpPr>
+      <p:grpSpPr>
+        <a:xfrm>
+          <a:off x="0" y="0"/>
+          <a:ext cx="0" cy="0"/>
+          <a:chOff x="0" y="0"/>
+          <a:chExt cx="0" cy="0"/>
+        </a:xfrm>
+      </p:grpSpPr>
+      <p:sp>
+        <p:nvSpPr>
+          <p:cNvPr id="5" name="Title 4"/>
+          <p:cNvSpPr>
+            <a:spLocks noGrp="1"/>
+          </p:cNvSpPr>
+          <p:nvPr>
+            <p:ph type="title"/>
+          </p:nvPr>
+        </p:nvSpPr>
+        <p:spPr/>
+        <p:txBody>
+          <a:bodyPr/>
+          <a:lstStyle/>
+          <a:p>
+            <a:r>
+              <a:rPr lang="en-US" dirty="0" smtClean="0"/>
+              <a:t>4.2 </a:t>
+            </a:r>
+            <a:r>
+              <a:rPr lang="en-US" dirty="0" err="1" smtClean="0"/>
+              <a:t>Trang</a:t>
+            </a:r>
+            <a:r>
+              <a:rPr lang="en-US" dirty="0" smtClean="0"/>
+              <a:t> </a:t>
+            </a:r>
+            <a:r>
+              <a:rPr lang="en-US" dirty="0" err="1" smtClean="0"/>
+              <a:t>tìm</a:t>
+            </a:r>
+            <a:r>
+              <a:rPr lang="en-US" dirty="0" smtClean="0"/>
+              <a:t> </a:t>
+            </a:r>
+            <a:r>
+              <a:rPr lang="en-US" dirty="0" err="1" smtClean="0"/>
+              <a:t>kiếm</a:t>
+            </a:r>
+            <a:endParaRPr lang="en-US" dirty="0"/>
+          </a:p>
+        </p:txBody>
+      </p:sp>
+      <p:sp>
+        <p:nvSpPr>
+          <p:cNvPr id="580" name="Google Shape;580;p20"/>
+          <p:cNvSpPr txBox="1">
+            <a:spLocks noGrp="1"/>
+          </p:cNvSpPr>
+          <p:nvPr>
+            <p:ph type="sldNum" idx="12"/>
+          </p:nvPr>
+        </p:nvSpPr>
+        <p:spPr>
+          <a:prstGeom prst="rect">
+            <a:avLst/>
+          </a:prstGeom>
+        </p:spPr>
+        <p:txBody>
+          <a:bodyPr spcFirstLastPara="1" wrap="square" lIns="0" tIns="0" rIns="0" bIns="0" anchor="ctr" anchorCtr="0">
+            <a:noAutofit/>
+          </a:bodyPr>
+          <a:lstStyle/>
+          <a:p>
+            <a:pPr marL="0" lvl="0" indent="0" algn="ctr" rtl="0">
+              <a:spcBef>
+                <a:spcPts val="0"/>
+              </a:spcBef>
+              <a:spcAft>
+                <a:spcPts val="0"/>
+              </a:spcAft>
+              <a:buNone/>
+            </a:pPr>
+            <a:fld id="{00000000-1234-1234-1234-123412341234}" type="slidenum">
+              <a:rPr lang="en"/>
+              <a:t>32</a:t>
             </a:fld>
             <a:endParaRPr/>
           </a:p>
@@ -27661,7 +28361,7 @@
 </p:sld>
 </file>
 
-<file path=ppt/slides/slide31.xml><?xml version="1.0" encoding="utf-8"?>
+<file path=ppt/slides/slide33.xml><?xml version="1.0" encoding="utf-8"?>
 <p:sld xmlns:a="http://schemas.openxmlformats.org/drawingml/2006/main" xmlns:r="http://schemas.openxmlformats.org/officeDocument/2006/relationships" xmlns:p="http://schemas.openxmlformats.org/presentationml/2006/main">
   <p:cSld>
     <p:spTree>
@@ -27695,7 +28395,7 @@
           <a:p>
             <a:r>
               <a:rPr lang="en-US" dirty="0" smtClean="0"/>
-              <a:t>4.2 </a:t>
+              <a:t>4.3 </a:t>
             </a:r>
             <a:r>
               <a:rPr lang="en-US" dirty="0" err="1" smtClean="0"/>
@@ -27753,7 +28453,7 @@
             </a:pPr>
             <a:fld id="{00000000-1234-1234-1234-123412341234}" type="slidenum">
               <a:rPr lang="en"/>
-              <a:t>31</a:t>
+              <a:t>33</a:t>
             </a:fld>
             <a:endParaRPr/>
           </a:p>
@@ -27836,7 +28536,7 @@
 </p:sld>
 </file>
 
-<file path=ppt/slides/slide32.xml><?xml version="1.0" encoding="utf-8"?>
+<file path=ppt/slides/slide34.xml><?xml version="1.0" encoding="utf-8"?>
 <p:sld xmlns:a="http://schemas.openxmlformats.org/drawingml/2006/main" xmlns:r="http://schemas.openxmlformats.org/officeDocument/2006/relationships" xmlns:p="http://schemas.openxmlformats.org/presentationml/2006/main">
   <p:cSld>
     <p:spTree>
@@ -27870,7 +28570,7 @@
           <a:p>
             <a:r>
               <a:rPr lang="en-US" dirty="0" smtClean="0"/>
-              <a:t>4.2 </a:t>
+              <a:t>4.4 </a:t>
             </a:r>
             <a:r>
               <a:rPr lang="en-US" dirty="0" err="1" smtClean="0"/>
@@ -27878,11 +28578,7 @@
             </a:r>
             <a:r>
               <a:rPr lang="en-US" dirty="0" smtClean="0"/>
-              <a:t> </a:t>
-            </a:r>
-            <a:r>
-              <a:rPr lang="en-US" dirty="0" smtClean="0"/>
-              <a:t>login</a:t>
+              <a:t> login</a:t>
             </a:r>
             <a:endParaRPr lang="en-US" dirty="0"/>
           </a:p>
@@ -27920,7 +28616,7 @@
             </a:pPr>
             <a:fld id="{00000000-1234-1234-1234-123412341234}" type="slidenum">
               <a:rPr lang="en"/>
-              <a:t>32</a:t>
+              <a:t>34</a:t>
             </a:fld>
             <a:endParaRPr/>
           </a:p>
@@ -27980,7 +28676,287 @@
 </p:sld>
 </file>
 
-<file path=ppt/slides/slide33.xml><?xml version="1.0" encoding="utf-8"?>
+<file path=ppt/slides/slide35.xml><?xml version="1.0" encoding="utf-8"?>
+<p:sld xmlns:a="http://schemas.openxmlformats.org/drawingml/2006/main" xmlns:r="http://schemas.openxmlformats.org/officeDocument/2006/relationships" xmlns:p="http://schemas.openxmlformats.org/presentationml/2006/main">
+  <p:cSld>
+    <p:spTree>
+      <p:nvGrpSpPr>
+        <p:cNvPr id="1" name="Shape 576"/>
+        <p:cNvGrpSpPr/>
+        <p:nvPr/>
+      </p:nvGrpSpPr>
+      <p:grpSpPr>
+        <a:xfrm>
+          <a:off x="0" y="0"/>
+          <a:ext cx="0" cy="0"/>
+          <a:chOff x="0" y="0"/>
+          <a:chExt cx="0" cy="0"/>
+        </a:xfrm>
+      </p:grpSpPr>
+      <p:sp>
+        <p:nvSpPr>
+          <p:cNvPr id="5" name="Title 4"/>
+          <p:cNvSpPr>
+            <a:spLocks noGrp="1"/>
+          </p:cNvSpPr>
+          <p:nvPr>
+            <p:ph type="title"/>
+          </p:nvPr>
+        </p:nvSpPr>
+        <p:spPr/>
+        <p:txBody>
+          <a:bodyPr/>
+          <a:lstStyle/>
+          <a:p>
+            <a:r>
+              <a:rPr lang="en-US" dirty="0" smtClean="0"/>
+              <a:t>4.5 </a:t>
+            </a:r>
+            <a:r>
+              <a:rPr lang="en-US" dirty="0" err="1" smtClean="0"/>
+              <a:t>Trang</a:t>
+            </a:r>
+            <a:r>
+              <a:rPr lang="en-US" dirty="0" smtClean="0"/>
+              <a:t> login</a:t>
+            </a:r>
+            <a:endParaRPr lang="en-US" dirty="0"/>
+          </a:p>
+        </p:txBody>
+      </p:sp>
+      <p:sp>
+        <p:nvSpPr>
+          <p:cNvPr id="580" name="Google Shape;580;p20"/>
+          <p:cNvSpPr txBox="1">
+            <a:spLocks noGrp="1"/>
+          </p:cNvSpPr>
+          <p:nvPr>
+            <p:ph type="sldNum" idx="12"/>
+          </p:nvPr>
+        </p:nvSpPr>
+        <p:spPr>
+          <a:prstGeom prst="rect">
+            <a:avLst/>
+          </a:prstGeom>
+        </p:spPr>
+        <p:txBody>
+          <a:bodyPr spcFirstLastPara="1" wrap="square" lIns="0" tIns="0" rIns="0" bIns="0" anchor="ctr" anchorCtr="0">
+            <a:noAutofit/>
+          </a:bodyPr>
+          <a:lstStyle/>
+          <a:p>
+            <a:pPr marL="0" lvl="0" indent="0" algn="ctr" rtl="0">
+              <a:spcBef>
+                <a:spcPts val="0"/>
+              </a:spcBef>
+              <a:spcAft>
+                <a:spcPts val="0"/>
+              </a:spcAft>
+              <a:buNone/>
+            </a:pPr>
+            <a:fld id="{00000000-1234-1234-1234-123412341234}" type="slidenum">
+              <a:rPr lang="en"/>
+              <a:t>35</a:t>
+            </a:fld>
+            <a:endParaRPr/>
+          </a:p>
+        </p:txBody>
+      </p:sp>
+      <p:pic>
+        <p:nvPicPr>
+          <p:cNvPr id="6" name="Picture 2" descr="prototype-AddGv.png"/>
+          <p:cNvPicPr>
+            <a:picLocks noChangeAspect="1" noChangeArrowheads="1"/>
+          </p:cNvPicPr>
+          <p:nvPr/>
+        </p:nvPicPr>
+        <p:blipFill>
+          <a:blip r:embed="rId3">
+            <a:extLst>
+              <a:ext uri="{28A0092B-C50C-407E-A947-70E740481C1C}">
+                <a14:useLocalDpi xmlns:a14="http://schemas.microsoft.com/office/drawing/2010/main" val="0"/>
+              </a:ext>
+            </a:extLst>
+          </a:blip>
+          <a:srcRect/>
+          <a:stretch>
+            <a:fillRect/>
+          </a:stretch>
+        </p:blipFill>
+        <p:spPr bwMode="auto">
+          <a:xfrm>
+            <a:off x="1619673" y="1347615"/>
+            <a:ext cx="5976664" cy="3384376"/>
+          </a:xfrm>
+          <a:prstGeom prst="rect">
+            <a:avLst/>
+          </a:prstGeom>
+          <a:noFill/>
+          <a:extLst>
+            <a:ext uri="{909E8E84-426E-40DD-AFC4-6F175D3DCCD1}">
+              <a14:hiddenFill xmlns:a14="http://schemas.microsoft.com/office/drawing/2010/main">
+                <a:solidFill>
+                  <a:srgbClr val="FFFFFF"/>
+                </a:solidFill>
+              </a14:hiddenFill>
+            </a:ext>
+          </a:extLst>
+        </p:spPr>
+      </p:pic>
+    </p:spTree>
+    <p:extLst>
+      <p:ext uri="{BB962C8B-B14F-4D97-AF65-F5344CB8AC3E}">
+        <p14:creationId xmlns:p14="http://schemas.microsoft.com/office/powerpoint/2010/main" val="4080301683"/>
+      </p:ext>
+    </p:extLst>
+  </p:cSld>
+  <p:clrMapOvr>
+    <a:masterClrMapping/>
+  </p:clrMapOvr>
+</p:sld>
+</file>
+
+<file path=ppt/slides/slide36.xml><?xml version="1.0" encoding="utf-8"?>
+<p:sld xmlns:a="http://schemas.openxmlformats.org/drawingml/2006/main" xmlns:r="http://schemas.openxmlformats.org/officeDocument/2006/relationships" xmlns:p="http://schemas.openxmlformats.org/presentationml/2006/main">
+  <p:cSld>
+    <p:spTree>
+      <p:nvGrpSpPr>
+        <p:cNvPr id="1" name="Shape 576"/>
+        <p:cNvGrpSpPr/>
+        <p:nvPr/>
+      </p:nvGrpSpPr>
+      <p:grpSpPr>
+        <a:xfrm>
+          <a:off x="0" y="0"/>
+          <a:ext cx="0" cy="0"/>
+          <a:chOff x="0" y="0"/>
+          <a:chExt cx="0" cy="0"/>
+        </a:xfrm>
+      </p:grpSpPr>
+      <p:sp>
+        <p:nvSpPr>
+          <p:cNvPr id="5" name="Title 4"/>
+          <p:cNvSpPr>
+            <a:spLocks noGrp="1"/>
+          </p:cNvSpPr>
+          <p:nvPr>
+            <p:ph type="title"/>
+          </p:nvPr>
+        </p:nvSpPr>
+        <p:spPr/>
+        <p:txBody>
+          <a:bodyPr/>
+          <a:lstStyle/>
+          <a:p>
+            <a:r>
+              <a:rPr lang="en-US" dirty="0" smtClean="0"/>
+              <a:t>4.6 </a:t>
+            </a:r>
+            <a:r>
+              <a:rPr lang="en-US" dirty="0" err="1" smtClean="0"/>
+              <a:t>Trang</a:t>
+            </a:r>
+            <a:r>
+              <a:rPr lang="en-US" dirty="0" smtClean="0"/>
+              <a:t> login</a:t>
+            </a:r>
+            <a:endParaRPr lang="en-US" dirty="0"/>
+          </a:p>
+        </p:txBody>
+      </p:sp>
+      <p:sp>
+        <p:nvSpPr>
+          <p:cNvPr id="580" name="Google Shape;580;p20"/>
+          <p:cNvSpPr txBox="1">
+            <a:spLocks noGrp="1"/>
+          </p:cNvSpPr>
+          <p:nvPr>
+            <p:ph type="sldNum" idx="12"/>
+          </p:nvPr>
+        </p:nvSpPr>
+        <p:spPr>
+          <a:prstGeom prst="rect">
+            <a:avLst/>
+          </a:prstGeom>
+        </p:spPr>
+        <p:txBody>
+          <a:bodyPr spcFirstLastPara="1" wrap="square" lIns="0" tIns="0" rIns="0" bIns="0" anchor="ctr" anchorCtr="0">
+            <a:noAutofit/>
+          </a:bodyPr>
+          <a:lstStyle/>
+          <a:p>
+            <a:pPr marL="0" lvl="0" indent="0" algn="ctr" rtl="0">
+              <a:spcBef>
+                <a:spcPts val="0"/>
+              </a:spcBef>
+              <a:spcAft>
+                <a:spcPts val="0"/>
+              </a:spcAft>
+              <a:buNone/>
+            </a:pPr>
+            <a:fld id="{00000000-1234-1234-1234-123412341234}" type="slidenum">
+              <a:rPr lang="en"/>
+              <a:t>36</a:t>
+            </a:fld>
+            <a:endParaRPr/>
+          </a:p>
+        </p:txBody>
+      </p:sp>
+      <p:pic>
+        <p:nvPicPr>
+          <p:cNvPr id="6" name="Picture 2" descr="prototype-UpdateGv.png"/>
+          <p:cNvPicPr>
+            <a:picLocks noChangeAspect="1" noChangeArrowheads="1"/>
+          </p:cNvPicPr>
+          <p:nvPr/>
+        </p:nvPicPr>
+        <p:blipFill>
+          <a:blip r:embed="rId3">
+            <a:extLst>
+              <a:ext uri="{28A0092B-C50C-407E-A947-70E740481C1C}">
+                <a14:useLocalDpi xmlns:a14="http://schemas.microsoft.com/office/drawing/2010/main" val="0"/>
+              </a:ext>
+            </a:extLst>
+          </a:blip>
+          <a:srcRect/>
+          <a:stretch>
+            <a:fillRect/>
+          </a:stretch>
+        </p:blipFill>
+        <p:spPr bwMode="auto">
+          <a:xfrm>
+            <a:off x="1475657" y="1295425"/>
+            <a:ext cx="5976664" cy="3625783"/>
+          </a:xfrm>
+          <a:prstGeom prst="rect">
+            <a:avLst/>
+          </a:prstGeom>
+          <a:noFill/>
+          <a:extLst>
+            <a:ext uri="{909E8E84-426E-40DD-AFC4-6F175D3DCCD1}">
+              <a14:hiddenFill xmlns:a14="http://schemas.microsoft.com/office/drawing/2010/main">
+                <a:solidFill>
+                  <a:srgbClr val="FFFFFF"/>
+                </a:solidFill>
+              </a14:hiddenFill>
+            </a:ext>
+          </a:extLst>
+        </p:spPr>
+      </p:pic>
+    </p:spTree>
+    <p:extLst>
+      <p:ext uri="{BB962C8B-B14F-4D97-AF65-F5344CB8AC3E}">
+        <p14:creationId xmlns:p14="http://schemas.microsoft.com/office/powerpoint/2010/main" val="2243437889"/>
+      </p:ext>
+    </p:extLst>
+  </p:cSld>
+  <p:clrMapOvr>
+    <a:masterClrMapping/>
+  </p:clrMapOvr>
+</p:sld>
+</file>
+
+<file path=ppt/slides/slide37.xml><?xml version="1.0" encoding="utf-8"?>
 <p:sld xmlns:a="http://schemas.openxmlformats.org/drawingml/2006/main" xmlns:r="http://schemas.openxmlformats.org/officeDocument/2006/relationships" xmlns:p="http://schemas.openxmlformats.org/presentationml/2006/main">
   <p:cSld>
     <p:spTree>
@@ -28192,7 +29168,7 @@
             </a:pPr>
             <a:fld id="{00000000-1234-1234-1234-123412341234}" type="slidenum">
               <a:rPr lang="en"/>
-              <a:t>33</a:t>
+              <a:t>37</a:t>
             </a:fld>
             <a:endParaRPr/>
           </a:p>
@@ -28211,7 +29187,7 @@
 </p:sld>
 </file>
 
-<file path=ppt/slides/slide34.xml><?xml version="1.0" encoding="utf-8"?>
+<file path=ppt/slides/slide38.xml><?xml version="1.0" encoding="utf-8"?>
 <p:sld xmlns:a="http://schemas.openxmlformats.org/drawingml/2006/main" xmlns:r="http://schemas.openxmlformats.org/officeDocument/2006/relationships" xmlns:p="http://schemas.openxmlformats.org/presentationml/2006/main">
   <p:cSld>
     <p:spTree>
@@ -28309,7 +29285,7 @@
             </a:pPr>
             <a:fld id="{00000000-1234-1234-1234-123412341234}" type="slidenum">
               <a:rPr lang="en"/>
-              <a:t>34</a:t>
+              <a:t>38</a:t>
             </a:fld>
             <a:endParaRPr/>
           </a:p>
@@ -28335,7 +29311,7 @@
 </p:sld>
 </file>
 
-<file path=ppt/slides/slide35.xml><?xml version="1.0" encoding="utf-8"?>
+<file path=ppt/slides/slide39.xml><?xml version="1.0" encoding="utf-8"?>
 <p:sld xmlns:a="http://schemas.openxmlformats.org/drawingml/2006/main" xmlns:r="http://schemas.openxmlformats.org/officeDocument/2006/relationships" xmlns:p="http://schemas.openxmlformats.org/presentationml/2006/main">
   <p:cSld>
     <p:spTree>
@@ -28430,7 +29406,7 @@
             </a:pPr>
             <a:fld id="{00000000-1234-1234-1234-123412341234}" type="slidenum">
               <a:rPr lang="en"/>
-              <a:t>35</a:t>
+              <a:t>39</a:t>
             </a:fld>
             <a:endParaRPr/>
           </a:p>
@@ -28456,7 +29432,513 @@
 </p:sld>
 </file>
 
-<file path=ppt/slides/slide36.xml><?xml version="1.0" encoding="utf-8"?>
+<file path=ppt/slides/slide4.xml><?xml version="1.0" encoding="utf-8"?>
+<p:sld xmlns:a="http://schemas.openxmlformats.org/drawingml/2006/main" xmlns:r="http://schemas.openxmlformats.org/officeDocument/2006/relationships" xmlns:p="http://schemas.openxmlformats.org/presentationml/2006/main">
+  <p:cSld>
+    <p:spTree>
+      <p:nvGrpSpPr>
+        <p:cNvPr id="1" name="Shape 520"/>
+        <p:cNvGrpSpPr/>
+        <p:nvPr/>
+      </p:nvGrpSpPr>
+      <p:grpSpPr>
+        <a:xfrm>
+          <a:off x="0" y="0"/>
+          <a:ext cx="0" cy="0"/>
+          <a:chOff x="0" y="0"/>
+          <a:chExt cx="0" cy="0"/>
+        </a:xfrm>
+      </p:grpSpPr>
+      <p:sp>
+        <p:nvSpPr>
+          <p:cNvPr id="521" name="Google Shape;521;p14"/>
+          <p:cNvSpPr txBox="1">
+            <a:spLocks noGrp="1"/>
+          </p:cNvSpPr>
+          <p:nvPr>
+            <p:ph type="title"/>
+          </p:nvPr>
+        </p:nvSpPr>
+        <p:spPr>
+          <a:xfrm>
+            <a:off x="661100" y="664300"/>
+            <a:ext cx="7843200" cy="653700"/>
+          </a:xfrm>
+          <a:prstGeom prst="rect">
+            <a:avLst/>
+          </a:prstGeom>
+        </p:spPr>
+        <p:txBody>
+          <a:bodyPr spcFirstLastPara="1" wrap="square" lIns="0" tIns="0" rIns="0" bIns="0" anchor="ctr" anchorCtr="0">
+            <a:noAutofit/>
+          </a:bodyPr>
+          <a:lstStyle/>
+          <a:p>
+            <a:pPr marL="0" lvl="0" indent="0" algn="l" rtl="0">
+              <a:spcBef>
+                <a:spcPts val="0"/>
+              </a:spcBef>
+              <a:spcAft>
+                <a:spcPts val="0"/>
+              </a:spcAft>
+              <a:buNone/>
+            </a:pPr>
+            <a:r>
+              <a:rPr lang="en" dirty="0" smtClean="0"/>
+              <a:t>Mục tiêu đồ án </a:t>
+            </a:r>
+            <a:endParaRPr dirty="0"/>
+          </a:p>
+        </p:txBody>
+      </p:sp>
+      <p:sp>
+        <p:nvSpPr>
+          <p:cNvPr id="523" name="Google Shape;523;p14"/>
+          <p:cNvSpPr txBox="1">
+            <a:spLocks noGrp="1"/>
+          </p:cNvSpPr>
+          <p:nvPr>
+            <p:ph type="body" idx="1"/>
+          </p:nvPr>
+        </p:nvSpPr>
+        <p:spPr>
+          <a:xfrm>
+            <a:off x="1187624" y="1851670"/>
+            <a:ext cx="6912768" cy="1944216"/>
+          </a:xfrm>
+          <a:prstGeom prst="rect">
+            <a:avLst/>
+          </a:prstGeom>
+        </p:spPr>
+        <p:txBody>
+          <a:bodyPr spcFirstLastPara="1" wrap="square" lIns="0" tIns="0" rIns="0" bIns="0" anchor="t" anchorCtr="0">
+            <a:noAutofit/>
+          </a:bodyPr>
+          <a:lstStyle/>
+          <a:p>
+            <a:pPr marL="285750" indent="-285750">
+              <a:buClr>
+                <a:schemeClr val="dk1"/>
+              </a:buClr>
+              <a:buSzPts val="1100"/>
+              <a:buFont typeface="Wingdings" pitchFamily="2" charset="2"/>
+              <a:buChar char="v"/>
+            </a:pPr>
+            <a:r>
+              <a:rPr lang="en-US" sz="1400" dirty="0" err="1" smtClean="0"/>
+              <a:t>Phát</a:t>
+            </a:r>
+            <a:r>
+              <a:rPr lang="en-US" sz="1400" dirty="0" smtClean="0"/>
+              <a:t> </a:t>
+            </a:r>
+            <a:r>
+              <a:rPr lang="en-US" sz="1400" dirty="0" err="1" smtClean="0"/>
+              <a:t>triển</a:t>
+            </a:r>
+            <a:r>
+              <a:rPr lang="en-US" sz="1400" dirty="0" smtClean="0"/>
+              <a:t> </a:t>
+            </a:r>
+            <a:r>
+              <a:rPr lang="en-US" sz="1400" dirty="0" err="1" smtClean="0"/>
+              <a:t>một</a:t>
+            </a:r>
+            <a:r>
+              <a:rPr lang="en-US" sz="1400" dirty="0" smtClean="0"/>
+              <a:t> </a:t>
+            </a:r>
+            <a:r>
+              <a:rPr lang="en-US" sz="1400" dirty="0" err="1" smtClean="0"/>
+              <a:t>ứng</a:t>
+            </a:r>
+            <a:r>
+              <a:rPr lang="en-US" sz="1400" dirty="0" smtClean="0"/>
+              <a:t> </a:t>
+            </a:r>
+            <a:r>
+              <a:rPr lang="en-US" sz="1400" dirty="0" err="1" smtClean="0"/>
+              <a:t>dụng</a:t>
+            </a:r>
+            <a:r>
+              <a:rPr lang="en-US" sz="1400" dirty="0" smtClean="0"/>
+              <a:t> </a:t>
+            </a:r>
+            <a:r>
+              <a:rPr lang="en-US" sz="1400" dirty="0" err="1" smtClean="0"/>
+              <a:t>quản</a:t>
+            </a:r>
+            <a:r>
+              <a:rPr lang="en-US" sz="1400" dirty="0" smtClean="0"/>
+              <a:t> </a:t>
+            </a:r>
+            <a:r>
+              <a:rPr lang="en-US" sz="1400" dirty="0" err="1" smtClean="0"/>
+              <a:t>lý</a:t>
+            </a:r>
+            <a:r>
+              <a:rPr lang="en-US" sz="1400" dirty="0" smtClean="0"/>
+              <a:t> </a:t>
+            </a:r>
+            <a:r>
+              <a:rPr lang="en-US" sz="1400" dirty="0" err="1" smtClean="0"/>
+              <a:t>giảng</a:t>
+            </a:r>
+            <a:r>
+              <a:rPr lang="en-US" sz="1400" dirty="0" smtClean="0"/>
+              <a:t> </a:t>
+            </a:r>
+            <a:r>
+              <a:rPr lang="en-US" sz="1400" dirty="0" err="1" smtClean="0"/>
+              <a:t>viên</a:t>
+            </a:r>
+            <a:r>
+              <a:rPr lang="en-US" sz="1400" dirty="0" smtClean="0"/>
+              <a:t> </a:t>
+            </a:r>
+            <a:r>
+              <a:rPr lang="en-US" sz="1400" dirty="0" err="1" smtClean="0"/>
+              <a:t>cho</a:t>
+            </a:r>
+            <a:r>
+              <a:rPr lang="en-US" sz="1400" dirty="0" smtClean="0"/>
+              <a:t> </a:t>
+            </a:r>
+            <a:r>
+              <a:rPr lang="en-US" sz="1400" dirty="0" err="1" smtClean="0"/>
+              <a:t>phòng</a:t>
+            </a:r>
+            <a:r>
+              <a:rPr lang="en-US" sz="1400" dirty="0" smtClean="0"/>
+              <a:t> </a:t>
+            </a:r>
+            <a:r>
+              <a:rPr lang="en-US" sz="1400" dirty="0" err="1" smtClean="0"/>
+              <a:t>giáo</a:t>
+            </a:r>
+            <a:r>
+              <a:rPr lang="en-US" sz="1400" dirty="0" smtClean="0"/>
+              <a:t> </a:t>
+            </a:r>
+            <a:r>
+              <a:rPr lang="en-US" sz="1400" dirty="0" err="1" smtClean="0"/>
+              <a:t>vụ</a:t>
+            </a:r>
+            <a:r>
+              <a:rPr lang="en-US" sz="1400" dirty="0" smtClean="0"/>
+              <a:t>.</a:t>
+            </a:r>
+          </a:p>
+          <a:p>
+            <a:pPr marL="285750" indent="-285750">
+              <a:buClr>
+                <a:schemeClr val="dk1"/>
+              </a:buClr>
+              <a:buSzPts val="1100"/>
+              <a:buFont typeface="Wingdings" pitchFamily="2" charset="2"/>
+              <a:buChar char="v"/>
+            </a:pPr>
+            <a:r>
+              <a:rPr lang="en-US" sz="1400" dirty="0" err="1" smtClean="0"/>
+              <a:t>Giúp</a:t>
+            </a:r>
+            <a:r>
+              <a:rPr lang="en-US" sz="1400" dirty="0" smtClean="0"/>
+              <a:t> </a:t>
+            </a:r>
+            <a:r>
+              <a:rPr lang="en-US" sz="1400" dirty="0" err="1" smtClean="0"/>
+              <a:t>bộ</a:t>
+            </a:r>
+            <a:r>
+              <a:rPr lang="en-US" sz="1400" dirty="0" smtClean="0"/>
+              <a:t> </a:t>
+            </a:r>
+            <a:r>
+              <a:rPr lang="en-US" sz="1400" dirty="0" err="1" smtClean="0"/>
+              <a:t>phận</a:t>
+            </a:r>
+            <a:r>
+              <a:rPr lang="en-US" sz="1400" dirty="0" smtClean="0"/>
+              <a:t> </a:t>
+            </a:r>
+            <a:r>
+              <a:rPr lang="en-US" sz="1400" dirty="0" err="1" smtClean="0"/>
+              <a:t>giáo</a:t>
+            </a:r>
+            <a:r>
+              <a:rPr lang="en-US" sz="1400" dirty="0" smtClean="0"/>
+              <a:t> </a:t>
+            </a:r>
+            <a:r>
+              <a:rPr lang="en-US" sz="1400" dirty="0" err="1" smtClean="0"/>
+              <a:t>vụ</a:t>
+            </a:r>
+            <a:r>
+              <a:rPr lang="en-US" sz="1400" dirty="0" smtClean="0"/>
+              <a:t> </a:t>
+            </a:r>
+            <a:r>
+              <a:rPr lang="en-US" sz="1400" dirty="0" err="1" smtClean="0"/>
+              <a:t>dễ</a:t>
+            </a:r>
+            <a:r>
+              <a:rPr lang="en-US" sz="1400" dirty="0" smtClean="0"/>
+              <a:t> </a:t>
+            </a:r>
+            <a:r>
+              <a:rPr lang="en-US" sz="1400" dirty="0" err="1" smtClean="0"/>
+              <a:t>dàng</a:t>
+            </a:r>
+            <a:r>
+              <a:rPr lang="en-US" sz="1400" dirty="0" smtClean="0"/>
+              <a:t> </a:t>
+            </a:r>
+            <a:r>
+              <a:rPr lang="en-US" sz="1400" dirty="0" err="1" smtClean="0"/>
+              <a:t>quản</a:t>
+            </a:r>
+            <a:r>
+              <a:rPr lang="en-US" sz="1400" dirty="0" smtClean="0"/>
+              <a:t> </a:t>
+            </a:r>
+            <a:r>
+              <a:rPr lang="en-US" sz="1400" dirty="0" err="1" smtClean="0"/>
+              <a:t>lý</a:t>
+            </a:r>
+            <a:r>
+              <a:rPr lang="en-US" sz="1400" dirty="0" smtClean="0"/>
+              <a:t> </a:t>
+            </a:r>
+            <a:r>
+              <a:rPr lang="en-US" sz="1400" dirty="0" err="1" smtClean="0"/>
+              <a:t>thông</a:t>
+            </a:r>
+            <a:r>
+              <a:rPr lang="en-US" sz="1400" dirty="0" smtClean="0"/>
+              <a:t> tin </a:t>
+            </a:r>
+            <a:r>
+              <a:rPr lang="en-US" sz="1400" dirty="0" err="1" smtClean="0"/>
+              <a:t>các</a:t>
+            </a:r>
+            <a:r>
+              <a:rPr lang="en-US" sz="1400" dirty="0" smtClean="0"/>
+              <a:t> </a:t>
+            </a:r>
+            <a:r>
+              <a:rPr lang="en-US" sz="1400" dirty="0" err="1" smtClean="0"/>
+              <a:t>giảng</a:t>
+            </a:r>
+            <a:r>
+              <a:rPr lang="en-US" sz="1400" dirty="0" smtClean="0"/>
+              <a:t> </a:t>
+            </a:r>
+            <a:r>
+              <a:rPr lang="en-US" sz="1400" dirty="0" err="1" smtClean="0"/>
+              <a:t>viên</a:t>
+            </a:r>
+            <a:r>
+              <a:rPr lang="en-US" sz="1400" dirty="0" smtClean="0"/>
+              <a:t> </a:t>
+            </a:r>
+            <a:r>
+              <a:rPr lang="en-US" sz="1400" dirty="0" err="1" smtClean="0"/>
+              <a:t>của</a:t>
+            </a:r>
+            <a:r>
+              <a:rPr lang="en-US" sz="1400" dirty="0"/>
+              <a:t> </a:t>
+            </a:r>
+            <a:r>
+              <a:rPr lang="en-US" sz="1400" dirty="0" err="1" smtClean="0"/>
+              <a:t>trường</a:t>
+            </a:r>
+            <a:r>
+              <a:rPr lang="en-US" sz="1400" dirty="0" smtClean="0"/>
+              <a:t>.</a:t>
+            </a:r>
+          </a:p>
+          <a:p>
+            <a:pPr marL="285750" indent="-285750">
+              <a:buClr>
+                <a:schemeClr val="dk1"/>
+              </a:buClr>
+              <a:buSzPts val="1100"/>
+              <a:buFont typeface="Wingdings" pitchFamily="2" charset="2"/>
+              <a:buChar char="v"/>
+            </a:pPr>
+            <a:r>
+              <a:rPr lang="en-US" sz="1400" dirty="0" err="1" smtClean="0"/>
+              <a:t>Ứng</a:t>
+            </a:r>
+            <a:r>
+              <a:rPr lang="en-US" sz="1400" dirty="0" smtClean="0"/>
+              <a:t> </a:t>
+            </a:r>
+            <a:r>
+              <a:rPr lang="en-US" sz="1400" dirty="0" err="1" smtClean="0"/>
+              <a:t>dụng</a:t>
+            </a:r>
+            <a:r>
+              <a:rPr lang="en-US" sz="1400" dirty="0" smtClean="0"/>
+              <a:t> </a:t>
+            </a:r>
+            <a:r>
+              <a:rPr lang="en-US" sz="1400" dirty="0" err="1" smtClean="0"/>
+              <a:t>đơn</a:t>
+            </a:r>
+            <a:r>
+              <a:rPr lang="en-US" sz="1400" dirty="0" smtClean="0"/>
+              <a:t> </a:t>
+            </a:r>
+            <a:r>
+              <a:rPr lang="en-US" sz="1400" dirty="0" err="1" smtClean="0"/>
+              <a:t>giản</a:t>
+            </a:r>
+            <a:r>
+              <a:rPr lang="en-US" sz="1400" dirty="0" smtClean="0"/>
+              <a:t> , </a:t>
+            </a:r>
+            <a:r>
+              <a:rPr lang="en-US" sz="1400" dirty="0" err="1" smtClean="0"/>
+              <a:t>dễ</a:t>
+            </a:r>
+            <a:r>
+              <a:rPr lang="en-US" sz="1400" dirty="0" smtClean="0"/>
+              <a:t> </a:t>
+            </a:r>
+            <a:r>
+              <a:rPr lang="en-US" sz="1400" dirty="0" err="1" smtClean="0"/>
+              <a:t>nhìn</a:t>
+            </a:r>
+            <a:r>
+              <a:rPr lang="en-US" sz="1400" dirty="0" smtClean="0"/>
+              <a:t> , </a:t>
+            </a:r>
+            <a:r>
+              <a:rPr lang="en-US" sz="1400" dirty="0" err="1" smtClean="0"/>
+              <a:t>phù</a:t>
+            </a:r>
+            <a:r>
+              <a:rPr lang="en-US" sz="1400" dirty="0" smtClean="0"/>
+              <a:t> </a:t>
+            </a:r>
+            <a:r>
+              <a:rPr lang="en-US" sz="1400" dirty="0" err="1" smtClean="0"/>
+              <a:t>hợp</a:t>
+            </a:r>
+            <a:r>
+              <a:rPr lang="en-US" sz="1400" dirty="0" smtClean="0"/>
+              <a:t> </a:t>
+            </a:r>
+            <a:r>
+              <a:rPr lang="en-US" sz="1400" dirty="0" err="1" smtClean="0"/>
+              <a:t>với</a:t>
+            </a:r>
+            <a:r>
+              <a:rPr lang="en-US" sz="1400" dirty="0" smtClean="0"/>
+              <a:t> </a:t>
+            </a:r>
+            <a:r>
+              <a:rPr lang="en-US" sz="1400" dirty="0" err="1" smtClean="0"/>
+              <a:t>môi</a:t>
+            </a:r>
+            <a:r>
+              <a:rPr lang="en-US" sz="1400" dirty="0" smtClean="0"/>
+              <a:t> </a:t>
+            </a:r>
+            <a:r>
+              <a:rPr lang="en-US" sz="1400" dirty="0" err="1" smtClean="0"/>
+              <a:t>trường</a:t>
+            </a:r>
+            <a:r>
+              <a:rPr lang="en-US" sz="1400" dirty="0" smtClean="0"/>
+              <a:t> </a:t>
+            </a:r>
+            <a:r>
+              <a:rPr lang="en-US" sz="1400" dirty="0" err="1" smtClean="0"/>
+              <a:t>làm</a:t>
+            </a:r>
+            <a:r>
+              <a:rPr lang="en-US" sz="1400" dirty="0" smtClean="0"/>
+              <a:t> </a:t>
+            </a:r>
+            <a:r>
+              <a:rPr lang="en-US" sz="1400" dirty="0" err="1" smtClean="0"/>
+              <a:t>việc</a:t>
+            </a:r>
+            <a:r>
+              <a:rPr lang="en-US" sz="1400" dirty="0" smtClean="0"/>
+              <a:t>.</a:t>
+            </a:r>
+            <a:endParaRPr sz="1400" dirty="0"/>
+          </a:p>
+        </p:txBody>
+      </p:sp>
+      <p:sp>
+        <p:nvSpPr>
+          <p:cNvPr id="525" name="Google Shape;525;p14"/>
+          <p:cNvSpPr txBox="1">
+            <a:spLocks noGrp="1"/>
+          </p:cNvSpPr>
+          <p:nvPr>
+            <p:ph type="sldNum" idx="12"/>
+          </p:nvPr>
+        </p:nvSpPr>
+        <p:spPr>
+          <a:xfrm>
+            <a:off x="8504254" y="4489800"/>
+            <a:ext cx="653700" cy="653700"/>
+          </a:xfrm>
+          <a:prstGeom prst="rect">
+            <a:avLst/>
+          </a:prstGeom>
+        </p:spPr>
+        <p:txBody>
+          <a:bodyPr spcFirstLastPara="1" wrap="square" lIns="0" tIns="0" rIns="0" bIns="0" anchor="ctr" anchorCtr="0">
+            <a:noAutofit/>
+          </a:bodyPr>
+          <a:lstStyle/>
+          <a:p>
+            <a:pPr marL="0" lvl="0" indent="0" algn="ctr" rtl="0">
+              <a:spcBef>
+                <a:spcPts val="0"/>
+              </a:spcBef>
+              <a:spcAft>
+                <a:spcPts val="0"/>
+              </a:spcAft>
+              <a:buNone/>
+            </a:pPr>
+            <a:fld id="{00000000-1234-1234-1234-123412341234}" type="slidenum">
+              <a:rPr lang="en"/>
+              <a:t>4</a:t>
+            </a:fld>
+            <a:endParaRPr/>
+          </a:p>
+        </p:txBody>
+      </p:sp>
+    </p:spTree>
+    <p:extLst>
+      <p:ext uri="{BB962C8B-B14F-4D97-AF65-F5344CB8AC3E}">
+        <p14:creationId xmlns:p14="http://schemas.microsoft.com/office/powerpoint/2010/main" val="2809102261"/>
+      </p:ext>
+    </p:extLst>
+  </p:cSld>
+  <p:clrMapOvr>
+    <a:masterClrMapping/>
+  </p:clrMapOvr>
+  <p:timing>
+    <p:tnLst>
+      <p:par>
+        <p:cTn id="1" dur="indefinite" restart="never" nodeType="tmRoot"/>
+      </p:par>
+    </p:tnLst>
+  </p:timing>
+</p:sld>
+</file>
+
+<file path=ppt/slides/slide40.xml><?xml version="1.0" encoding="utf-8"?>
 <p:sld xmlns:a="http://schemas.openxmlformats.org/drawingml/2006/main" xmlns:r="http://schemas.openxmlformats.org/officeDocument/2006/relationships" xmlns:p="http://schemas.openxmlformats.org/presentationml/2006/main">
   <p:cSld>
     <p:spTree>
@@ -28550,7 +30032,7 @@
             </a:pPr>
             <a:fld id="{00000000-1234-1234-1234-123412341234}" type="slidenum">
               <a:rPr lang="en"/>
-              <a:t>36</a:t>
+              <a:t>40</a:t>
             </a:fld>
             <a:endParaRPr/>
           </a:p>
@@ -28576,7 +30058,7 @@
 </p:sld>
 </file>
 
-<file path=ppt/slides/slide37.xml><?xml version="1.0" encoding="utf-8"?>
+<file path=ppt/slides/slide41.xml><?xml version="1.0" encoding="utf-8"?>
 <p:sld xmlns:a="http://schemas.openxmlformats.org/drawingml/2006/main" xmlns:r="http://schemas.openxmlformats.org/officeDocument/2006/relationships" xmlns:p="http://schemas.openxmlformats.org/presentationml/2006/main">
   <p:cSld>
     <p:spTree>
@@ -28633,7 +30115,7 @@
                   <a:schemeClr val="dk1"/>
                 </a:solidFill>
               </a:rPr>
-              <a:t>37</a:t>
+              <a:t>41</a:t>
             </a:fld>
             <a:endParaRPr>
               <a:solidFill>
@@ -29156,7 +30638,7 @@
 </p:sld>
 </file>
 
-<file path=ppt/slides/slide38.xml><?xml version="1.0" encoding="utf-8"?>
+<file path=ppt/slides/slide42.xml><?xml version="1.0" encoding="utf-8"?>
 <p:sld xmlns:a="http://schemas.openxmlformats.org/drawingml/2006/main" xmlns:r="http://schemas.openxmlformats.org/officeDocument/2006/relationships" xmlns:p="http://schemas.openxmlformats.org/presentationml/2006/main">
   <p:cSld>
     <p:bg>
@@ -30947,512 +32429,6 @@
         </p:grpSp>
       </p:grpSp>
     </p:spTree>
-  </p:cSld>
-  <p:clrMapOvr>
-    <a:masterClrMapping/>
-  </p:clrMapOvr>
-  <p:timing>
-    <p:tnLst>
-      <p:par>
-        <p:cTn id="1" dur="indefinite" restart="never" nodeType="tmRoot"/>
-      </p:par>
-    </p:tnLst>
-  </p:timing>
-</p:sld>
-</file>
-
-<file path=ppt/slides/slide4.xml><?xml version="1.0" encoding="utf-8"?>
-<p:sld xmlns:a="http://schemas.openxmlformats.org/drawingml/2006/main" xmlns:r="http://schemas.openxmlformats.org/officeDocument/2006/relationships" xmlns:p="http://schemas.openxmlformats.org/presentationml/2006/main">
-  <p:cSld>
-    <p:spTree>
-      <p:nvGrpSpPr>
-        <p:cNvPr id="1" name="Shape 520"/>
-        <p:cNvGrpSpPr/>
-        <p:nvPr/>
-      </p:nvGrpSpPr>
-      <p:grpSpPr>
-        <a:xfrm>
-          <a:off x="0" y="0"/>
-          <a:ext cx="0" cy="0"/>
-          <a:chOff x="0" y="0"/>
-          <a:chExt cx="0" cy="0"/>
-        </a:xfrm>
-      </p:grpSpPr>
-      <p:sp>
-        <p:nvSpPr>
-          <p:cNvPr id="521" name="Google Shape;521;p14"/>
-          <p:cNvSpPr txBox="1">
-            <a:spLocks noGrp="1"/>
-          </p:cNvSpPr>
-          <p:nvPr>
-            <p:ph type="title"/>
-          </p:nvPr>
-        </p:nvSpPr>
-        <p:spPr>
-          <a:xfrm>
-            <a:off x="661100" y="664300"/>
-            <a:ext cx="7843200" cy="653700"/>
-          </a:xfrm>
-          <a:prstGeom prst="rect">
-            <a:avLst/>
-          </a:prstGeom>
-        </p:spPr>
-        <p:txBody>
-          <a:bodyPr spcFirstLastPara="1" wrap="square" lIns="0" tIns="0" rIns="0" bIns="0" anchor="ctr" anchorCtr="0">
-            <a:noAutofit/>
-          </a:bodyPr>
-          <a:lstStyle/>
-          <a:p>
-            <a:pPr marL="0" lvl="0" indent="0" algn="l" rtl="0">
-              <a:spcBef>
-                <a:spcPts val="0"/>
-              </a:spcBef>
-              <a:spcAft>
-                <a:spcPts val="0"/>
-              </a:spcAft>
-              <a:buNone/>
-            </a:pPr>
-            <a:r>
-              <a:rPr lang="en" dirty="0" smtClean="0"/>
-              <a:t>Mục tiêu đồ án </a:t>
-            </a:r>
-            <a:endParaRPr dirty="0"/>
-          </a:p>
-        </p:txBody>
-      </p:sp>
-      <p:sp>
-        <p:nvSpPr>
-          <p:cNvPr id="523" name="Google Shape;523;p14"/>
-          <p:cNvSpPr txBox="1">
-            <a:spLocks noGrp="1"/>
-          </p:cNvSpPr>
-          <p:nvPr>
-            <p:ph type="body" idx="1"/>
-          </p:nvPr>
-        </p:nvSpPr>
-        <p:spPr>
-          <a:xfrm>
-            <a:off x="1187624" y="1851670"/>
-            <a:ext cx="6912768" cy="1944216"/>
-          </a:xfrm>
-          <a:prstGeom prst="rect">
-            <a:avLst/>
-          </a:prstGeom>
-        </p:spPr>
-        <p:txBody>
-          <a:bodyPr spcFirstLastPara="1" wrap="square" lIns="0" tIns="0" rIns="0" bIns="0" anchor="t" anchorCtr="0">
-            <a:noAutofit/>
-          </a:bodyPr>
-          <a:lstStyle/>
-          <a:p>
-            <a:pPr marL="285750" indent="-285750">
-              <a:buClr>
-                <a:schemeClr val="dk1"/>
-              </a:buClr>
-              <a:buSzPts val="1100"/>
-              <a:buFont typeface="Wingdings" pitchFamily="2" charset="2"/>
-              <a:buChar char="v"/>
-            </a:pPr>
-            <a:r>
-              <a:rPr lang="en-US" sz="1400" dirty="0" err="1" smtClean="0"/>
-              <a:t>Phát</a:t>
-            </a:r>
-            <a:r>
-              <a:rPr lang="en-US" sz="1400" dirty="0" smtClean="0"/>
-              <a:t> </a:t>
-            </a:r>
-            <a:r>
-              <a:rPr lang="en-US" sz="1400" dirty="0" err="1" smtClean="0"/>
-              <a:t>triển</a:t>
-            </a:r>
-            <a:r>
-              <a:rPr lang="en-US" sz="1400" dirty="0" smtClean="0"/>
-              <a:t> </a:t>
-            </a:r>
-            <a:r>
-              <a:rPr lang="en-US" sz="1400" dirty="0" err="1" smtClean="0"/>
-              <a:t>một</a:t>
-            </a:r>
-            <a:r>
-              <a:rPr lang="en-US" sz="1400" dirty="0" smtClean="0"/>
-              <a:t> </a:t>
-            </a:r>
-            <a:r>
-              <a:rPr lang="en-US" sz="1400" dirty="0" err="1" smtClean="0"/>
-              <a:t>ứng</a:t>
-            </a:r>
-            <a:r>
-              <a:rPr lang="en-US" sz="1400" dirty="0" smtClean="0"/>
-              <a:t> </a:t>
-            </a:r>
-            <a:r>
-              <a:rPr lang="en-US" sz="1400" dirty="0" err="1" smtClean="0"/>
-              <a:t>dụng</a:t>
-            </a:r>
-            <a:r>
-              <a:rPr lang="en-US" sz="1400" dirty="0" smtClean="0"/>
-              <a:t> </a:t>
-            </a:r>
-            <a:r>
-              <a:rPr lang="en-US" sz="1400" dirty="0" err="1" smtClean="0"/>
-              <a:t>quản</a:t>
-            </a:r>
-            <a:r>
-              <a:rPr lang="en-US" sz="1400" dirty="0" smtClean="0"/>
-              <a:t> </a:t>
-            </a:r>
-            <a:r>
-              <a:rPr lang="en-US" sz="1400" dirty="0" err="1" smtClean="0"/>
-              <a:t>lý</a:t>
-            </a:r>
-            <a:r>
-              <a:rPr lang="en-US" sz="1400" dirty="0" smtClean="0"/>
-              <a:t> </a:t>
-            </a:r>
-            <a:r>
-              <a:rPr lang="en-US" sz="1400" dirty="0" err="1" smtClean="0"/>
-              <a:t>giảng</a:t>
-            </a:r>
-            <a:r>
-              <a:rPr lang="en-US" sz="1400" dirty="0" smtClean="0"/>
-              <a:t> </a:t>
-            </a:r>
-            <a:r>
-              <a:rPr lang="en-US" sz="1400" dirty="0" err="1" smtClean="0"/>
-              <a:t>viên</a:t>
-            </a:r>
-            <a:r>
-              <a:rPr lang="en-US" sz="1400" dirty="0" smtClean="0"/>
-              <a:t> </a:t>
-            </a:r>
-            <a:r>
-              <a:rPr lang="en-US" sz="1400" dirty="0" err="1" smtClean="0"/>
-              <a:t>cho</a:t>
-            </a:r>
-            <a:r>
-              <a:rPr lang="en-US" sz="1400" dirty="0" smtClean="0"/>
-              <a:t> </a:t>
-            </a:r>
-            <a:r>
-              <a:rPr lang="en-US" sz="1400" dirty="0" err="1" smtClean="0"/>
-              <a:t>phòng</a:t>
-            </a:r>
-            <a:r>
-              <a:rPr lang="en-US" sz="1400" dirty="0" smtClean="0"/>
-              <a:t> </a:t>
-            </a:r>
-            <a:r>
-              <a:rPr lang="en-US" sz="1400" dirty="0" err="1" smtClean="0"/>
-              <a:t>giáo</a:t>
-            </a:r>
-            <a:r>
-              <a:rPr lang="en-US" sz="1400" dirty="0" smtClean="0"/>
-              <a:t> </a:t>
-            </a:r>
-            <a:r>
-              <a:rPr lang="en-US" sz="1400" dirty="0" err="1" smtClean="0"/>
-              <a:t>vụ</a:t>
-            </a:r>
-            <a:r>
-              <a:rPr lang="en-US" sz="1400" dirty="0" smtClean="0"/>
-              <a:t>.</a:t>
-            </a:r>
-          </a:p>
-          <a:p>
-            <a:pPr marL="285750" indent="-285750">
-              <a:buClr>
-                <a:schemeClr val="dk1"/>
-              </a:buClr>
-              <a:buSzPts val="1100"/>
-              <a:buFont typeface="Wingdings" pitchFamily="2" charset="2"/>
-              <a:buChar char="v"/>
-            </a:pPr>
-            <a:r>
-              <a:rPr lang="en-US" sz="1400" dirty="0" err="1" smtClean="0"/>
-              <a:t>Giúp</a:t>
-            </a:r>
-            <a:r>
-              <a:rPr lang="en-US" sz="1400" dirty="0" smtClean="0"/>
-              <a:t> </a:t>
-            </a:r>
-            <a:r>
-              <a:rPr lang="en-US" sz="1400" dirty="0" err="1" smtClean="0"/>
-              <a:t>bộ</a:t>
-            </a:r>
-            <a:r>
-              <a:rPr lang="en-US" sz="1400" dirty="0" smtClean="0"/>
-              <a:t> </a:t>
-            </a:r>
-            <a:r>
-              <a:rPr lang="en-US" sz="1400" dirty="0" err="1" smtClean="0"/>
-              <a:t>phận</a:t>
-            </a:r>
-            <a:r>
-              <a:rPr lang="en-US" sz="1400" dirty="0" smtClean="0"/>
-              <a:t> </a:t>
-            </a:r>
-            <a:r>
-              <a:rPr lang="en-US" sz="1400" dirty="0" err="1" smtClean="0"/>
-              <a:t>giáo</a:t>
-            </a:r>
-            <a:r>
-              <a:rPr lang="en-US" sz="1400" dirty="0" smtClean="0"/>
-              <a:t> </a:t>
-            </a:r>
-            <a:r>
-              <a:rPr lang="en-US" sz="1400" dirty="0" err="1" smtClean="0"/>
-              <a:t>vụ</a:t>
-            </a:r>
-            <a:r>
-              <a:rPr lang="en-US" sz="1400" dirty="0" smtClean="0"/>
-              <a:t> </a:t>
-            </a:r>
-            <a:r>
-              <a:rPr lang="en-US" sz="1400" dirty="0" err="1" smtClean="0"/>
-              <a:t>dễ</a:t>
-            </a:r>
-            <a:r>
-              <a:rPr lang="en-US" sz="1400" dirty="0" smtClean="0"/>
-              <a:t> </a:t>
-            </a:r>
-            <a:r>
-              <a:rPr lang="en-US" sz="1400" dirty="0" err="1" smtClean="0"/>
-              <a:t>dàng</a:t>
-            </a:r>
-            <a:r>
-              <a:rPr lang="en-US" sz="1400" dirty="0" smtClean="0"/>
-              <a:t> </a:t>
-            </a:r>
-            <a:r>
-              <a:rPr lang="en-US" sz="1400" dirty="0" err="1" smtClean="0"/>
-              <a:t>quản</a:t>
-            </a:r>
-            <a:r>
-              <a:rPr lang="en-US" sz="1400" dirty="0" smtClean="0"/>
-              <a:t> </a:t>
-            </a:r>
-            <a:r>
-              <a:rPr lang="en-US" sz="1400" dirty="0" err="1" smtClean="0"/>
-              <a:t>lý</a:t>
-            </a:r>
-            <a:r>
-              <a:rPr lang="en-US" sz="1400" dirty="0" smtClean="0"/>
-              <a:t> </a:t>
-            </a:r>
-            <a:r>
-              <a:rPr lang="en-US" sz="1400" dirty="0" err="1" smtClean="0"/>
-              <a:t>thông</a:t>
-            </a:r>
-            <a:r>
-              <a:rPr lang="en-US" sz="1400" dirty="0" smtClean="0"/>
-              <a:t> tin </a:t>
-            </a:r>
-            <a:r>
-              <a:rPr lang="en-US" sz="1400" dirty="0" err="1" smtClean="0"/>
-              <a:t>các</a:t>
-            </a:r>
-            <a:r>
-              <a:rPr lang="en-US" sz="1400" dirty="0" smtClean="0"/>
-              <a:t> </a:t>
-            </a:r>
-            <a:r>
-              <a:rPr lang="en-US" sz="1400" dirty="0" err="1" smtClean="0"/>
-              <a:t>giảng</a:t>
-            </a:r>
-            <a:r>
-              <a:rPr lang="en-US" sz="1400" dirty="0" smtClean="0"/>
-              <a:t> </a:t>
-            </a:r>
-            <a:r>
-              <a:rPr lang="en-US" sz="1400" dirty="0" err="1" smtClean="0"/>
-              <a:t>viên</a:t>
-            </a:r>
-            <a:r>
-              <a:rPr lang="en-US" sz="1400" dirty="0" smtClean="0"/>
-              <a:t> </a:t>
-            </a:r>
-            <a:r>
-              <a:rPr lang="en-US" sz="1400" dirty="0" err="1" smtClean="0"/>
-              <a:t>của</a:t>
-            </a:r>
-            <a:r>
-              <a:rPr lang="en-US" sz="1400" dirty="0"/>
-              <a:t> </a:t>
-            </a:r>
-            <a:r>
-              <a:rPr lang="en-US" sz="1400" dirty="0" err="1" smtClean="0"/>
-              <a:t>trường</a:t>
-            </a:r>
-            <a:r>
-              <a:rPr lang="en-US" sz="1400" dirty="0" smtClean="0"/>
-              <a:t>.</a:t>
-            </a:r>
-          </a:p>
-          <a:p>
-            <a:pPr marL="285750" indent="-285750">
-              <a:buClr>
-                <a:schemeClr val="dk1"/>
-              </a:buClr>
-              <a:buSzPts val="1100"/>
-              <a:buFont typeface="Wingdings" pitchFamily="2" charset="2"/>
-              <a:buChar char="v"/>
-            </a:pPr>
-            <a:r>
-              <a:rPr lang="en-US" sz="1400" dirty="0" err="1" smtClean="0"/>
-              <a:t>Ứng</a:t>
-            </a:r>
-            <a:r>
-              <a:rPr lang="en-US" sz="1400" dirty="0" smtClean="0"/>
-              <a:t> </a:t>
-            </a:r>
-            <a:r>
-              <a:rPr lang="en-US" sz="1400" dirty="0" err="1" smtClean="0"/>
-              <a:t>dụng</a:t>
-            </a:r>
-            <a:r>
-              <a:rPr lang="en-US" sz="1400" dirty="0" smtClean="0"/>
-              <a:t> </a:t>
-            </a:r>
-            <a:r>
-              <a:rPr lang="en-US" sz="1400" dirty="0" err="1" smtClean="0"/>
-              <a:t>đơn</a:t>
-            </a:r>
-            <a:r>
-              <a:rPr lang="en-US" sz="1400" dirty="0" smtClean="0"/>
-              <a:t> </a:t>
-            </a:r>
-            <a:r>
-              <a:rPr lang="en-US" sz="1400" dirty="0" err="1" smtClean="0"/>
-              <a:t>giản</a:t>
-            </a:r>
-            <a:r>
-              <a:rPr lang="en-US" sz="1400" dirty="0" smtClean="0"/>
-              <a:t> , </a:t>
-            </a:r>
-            <a:r>
-              <a:rPr lang="en-US" sz="1400" dirty="0" err="1" smtClean="0"/>
-              <a:t>dễ</a:t>
-            </a:r>
-            <a:r>
-              <a:rPr lang="en-US" sz="1400" dirty="0" smtClean="0"/>
-              <a:t> </a:t>
-            </a:r>
-            <a:r>
-              <a:rPr lang="en-US" sz="1400" dirty="0" err="1" smtClean="0"/>
-              <a:t>nhìn</a:t>
-            </a:r>
-            <a:r>
-              <a:rPr lang="en-US" sz="1400" dirty="0" smtClean="0"/>
-              <a:t> , </a:t>
-            </a:r>
-            <a:r>
-              <a:rPr lang="en-US" sz="1400" dirty="0" err="1" smtClean="0"/>
-              <a:t>phù</a:t>
-            </a:r>
-            <a:r>
-              <a:rPr lang="en-US" sz="1400" dirty="0" smtClean="0"/>
-              <a:t> </a:t>
-            </a:r>
-            <a:r>
-              <a:rPr lang="en-US" sz="1400" dirty="0" err="1" smtClean="0"/>
-              <a:t>hợp</a:t>
-            </a:r>
-            <a:r>
-              <a:rPr lang="en-US" sz="1400" dirty="0" smtClean="0"/>
-              <a:t> </a:t>
-            </a:r>
-            <a:r>
-              <a:rPr lang="en-US" sz="1400" dirty="0" err="1" smtClean="0"/>
-              <a:t>với</a:t>
-            </a:r>
-            <a:r>
-              <a:rPr lang="en-US" sz="1400" dirty="0" smtClean="0"/>
-              <a:t> </a:t>
-            </a:r>
-            <a:r>
-              <a:rPr lang="en-US" sz="1400" dirty="0" err="1" smtClean="0"/>
-              <a:t>môi</a:t>
-            </a:r>
-            <a:r>
-              <a:rPr lang="en-US" sz="1400" dirty="0" smtClean="0"/>
-              <a:t> </a:t>
-            </a:r>
-            <a:r>
-              <a:rPr lang="en-US" sz="1400" dirty="0" err="1" smtClean="0"/>
-              <a:t>trường</a:t>
-            </a:r>
-            <a:r>
-              <a:rPr lang="en-US" sz="1400" dirty="0" smtClean="0"/>
-              <a:t> </a:t>
-            </a:r>
-            <a:r>
-              <a:rPr lang="en-US" sz="1400" dirty="0" err="1" smtClean="0"/>
-              <a:t>làm</a:t>
-            </a:r>
-            <a:r>
-              <a:rPr lang="en-US" sz="1400" dirty="0" smtClean="0"/>
-              <a:t> </a:t>
-            </a:r>
-            <a:r>
-              <a:rPr lang="en-US" sz="1400" dirty="0" err="1" smtClean="0"/>
-              <a:t>việc</a:t>
-            </a:r>
-            <a:r>
-              <a:rPr lang="en-US" sz="1400" dirty="0" smtClean="0"/>
-              <a:t>.</a:t>
-            </a:r>
-            <a:endParaRPr sz="1400" dirty="0"/>
-          </a:p>
-        </p:txBody>
-      </p:sp>
-      <p:sp>
-        <p:nvSpPr>
-          <p:cNvPr id="525" name="Google Shape;525;p14"/>
-          <p:cNvSpPr txBox="1">
-            <a:spLocks noGrp="1"/>
-          </p:cNvSpPr>
-          <p:nvPr>
-            <p:ph type="sldNum" idx="12"/>
-          </p:nvPr>
-        </p:nvSpPr>
-        <p:spPr>
-          <a:xfrm>
-            <a:off x="8504254" y="4489800"/>
-            <a:ext cx="653700" cy="653700"/>
-          </a:xfrm>
-          <a:prstGeom prst="rect">
-            <a:avLst/>
-          </a:prstGeom>
-        </p:spPr>
-        <p:txBody>
-          <a:bodyPr spcFirstLastPara="1" wrap="square" lIns="0" tIns="0" rIns="0" bIns="0" anchor="ctr" anchorCtr="0">
-            <a:noAutofit/>
-          </a:bodyPr>
-          <a:lstStyle/>
-          <a:p>
-            <a:pPr marL="0" lvl="0" indent="0" algn="ctr" rtl="0">
-              <a:spcBef>
-                <a:spcPts val="0"/>
-              </a:spcBef>
-              <a:spcAft>
-                <a:spcPts val="0"/>
-              </a:spcAft>
-              <a:buNone/>
-            </a:pPr>
-            <a:fld id="{00000000-1234-1234-1234-123412341234}" type="slidenum">
-              <a:rPr lang="en"/>
-              <a:t>4</a:t>
-            </a:fld>
-            <a:endParaRPr/>
-          </a:p>
-        </p:txBody>
-      </p:sp>
-    </p:spTree>
-    <p:extLst>
-      <p:ext uri="{BB962C8B-B14F-4D97-AF65-F5344CB8AC3E}">
-        <p14:creationId xmlns:p14="http://schemas.microsoft.com/office/powerpoint/2010/main" val="2809102261"/>
-      </p:ext>
-    </p:extLst>
   </p:cSld>
   <p:clrMapOvr>
     <a:masterClrMapping/>

</xml_diff>

<commit_message>
update tài liệu and fix code
</commit_message>
<xml_diff>
--- a/nhom1.pptx
+++ b/nhom1.pptx
@@ -5,7 +5,7 @@
     <p:sldMasterId id="2147483659" r:id="rId1"/>
   </p:sldMasterIdLst>
   <p:notesMasterIdLst>
-    <p:notesMasterId r:id="rId43"/>
+    <p:notesMasterId r:id="rId53"/>
   </p:notesMasterIdLst>
   <p:sldIdLst>
     <p:sldId id="256" r:id="rId2"/>
@@ -47,25 +47,35 @@
     <p:sldId id="319" r:id="rId38"/>
     <p:sldId id="307" r:id="rId39"/>
     <p:sldId id="328" r:id="rId40"/>
-    <p:sldId id="308" r:id="rId41"/>
-    <p:sldId id="278" r:id="rId42"/>
+    <p:sldId id="330" r:id="rId41"/>
+    <p:sldId id="331" r:id="rId42"/>
+    <p:sldId id="332" r:id="rId43"/>
+    <p:sldId id="333" r:id="rId44"/>
+    <p:sldId id="334" r:id="rId45"/>
+    <p:sldId id="335" r:id="rId46"/>
+    <p:sldId id="336" r:id="rId47"/>
+    <p:sldId id="337" r:id="rId48"/>
+    <p:sldId id="338" r:id="rId49"/>
+    <p:sldId id="329" r:id="rId50"/>
+    <p:sldId id="308" r:id="rId51"/>
+    <p:sldId id="278" r:id="rId52"/>
   </p:sldIdLst>
   <p:sldSz cx="9144000" cy="5143500" type="screen16x9"/>
   <p:notesSz cx="6858000" cy="9144000"/>
   <p:embeddedFontLst>
     <p:embeddedFont>
-      <p:font typeface="Barlow Light" charset="0"/>
-      <p:regular r:id="rId44"/>
-      <p:bold r:id="rId45"/>
-      <p:italic r:id="rId46"/>
-      <p:boldItalic r:id="rId47"/>
+      <p:font typeface="Barlow SemiBold" charset="0"/>
+      <p:regular r:id="rId54"/>
+      <p:bold r:id="rId55"/>
+      <p:italic r:id="rId56"/>
+      <p:boldItalic r:id="rId57"/>
     </p:embeddedFont>
     <p:embeddedFont>
-      <p:font typeface="Barlow SemiBold" charset="0"/>
-      <p:regular r:id="rId48"/>
-      <p:bold r:id="rId49"/>
-      <p:italic r:id="rId50"/>
-      <p:boldItalic r:id="rId51"/>
+      <p:font typeface="Barlow Light" charset="0"/>
+      <p:regular r:id="rId58"/>
+      <p:bold r:id="rId59"/>
+      <p:italic r:id="rId60"/>
+      <p:boldItalic r:id="rId61"/>
     </p:embeddedFont>
   </p:embeddedFontLst>
   <p:defaultTextStyle>
@@ -4391,7 +4401,7 @@
   <p:cSld>
     <p:spTree>
       <p:nvGrpSpPr>
-        <p:cNvPr id="1" name="Shape 765"/>
+        <p:cNvPr id="1" name="Shape 573"/>
         <p:cNvGrpSpPr/>
         <p:nvPr/>
       </p:nvGrpSpPr>
@@ -4405,7 +4415,7 @@
       </p:grpSpPr>
       <p:sp>
         <p:nvSpPr>
-          <p:cNvPr id="766" name="Google Shape;766;g35ed75ccf_022:notes"/>
+          <p:cNvPr id="574" name="Google Shape;574;g35f391192_017:notes"/>
           <p:cNvSpPr>
             <a:spLocks noGrp="1" noRot="1" noChangeAspect="1"/>
           </p:cNvSpPr>
@@ -4446,7 +4456,839 @@
       </p:sp>
       <p:sp>
         <p:nvSpPr>
-          <p:cNvPr id="767" name="Google Shape;767;g35ed75ccf_022:notes"/>
+          <p:cNvPr id="575" name="Google Shape;575;g35f391192_017:notes"/>
+          <p:cNvSpPr txBox="1">
+            <a:spLocks noGrp="1"/>
+          </p:cNvSpPr>
+          <p:nvPr>
+            <p:ph type="body" idx="1"/>
+          </p:nvPr>
+        </p:nvSpPr>
+        <p:spPr>
+          <a:xfrm>
+            <a:off x="685800" y="4343400"/>
+            <a:ext cx="5486400" cy="4114800"/>
+          </a:xfrm>
+          <a:prstGeom prst="rect">
+            <a:avLst/>
+          </a:prstGeom>
+        </p:spPr>
+        <p:txBody>
+          <a:bodyPr spcFirstLastPara="1" wrap="square" lIns="91425" tIns="91425" rIns="91425" bIns="91425" anchor="t" anchorCtr="0">
+            <a:noAutofit/>
+          </a:bodyPr>
+          <a:lstStyle/>
+          <a:p>
+            <a:pPr marL="0" lvl="0" indent="0" algn="l" rtl="0">
+              <a:spcBef>
+                <a:spcPts val="0"/>
+              </a:spcBef>
+              <a:spcAft>
+                <a:spcPts val="0"/>
+              </a:spcAft>
+              <a:buNone/>
+            </a:pPr>
+            <a:endParaRPr/>
+          </a:p>
+        </p:txBody>
+      </p:sp>
+    </p:spTree>
+  </p:cSld>
+  <p:clrMapOvr>
+    <a:masterClrMapping/>
+  </p:clrMapOvr>
+</p:notes>
+</file>
+
+<file path=ppt/notesSlides/notesSlide42.xml><?xml version="1.0" encoding="utf-8"?>
+<p:notes xmlns:a="http://schemas.openxmlformats.org/drawingml/2006/main" xmlns:r="http://schemas.openxmlformats.org/officeDocument/2006/relationships" xmlns:p="http://schemas.openxmlformats.org/presentationml/2006/main" showMasterSp="0" showMasterPhAnim="0">
+  <p:cSld>
+    <p:spTree>
+      <p:nvGrpSpPr>
+        <p:cNvPr id="1" name="Shape 573"/>
+        <p:cNvGrpSpPr/>
+        <p:nvPr/>
+      </p:nvGrpSpPr>
+      <p:grpSpPr>
+        <a:xfrm>
+          <a:off x="0" y="0"/>
+          <a:ext cx="0" cy="0"/>
+          <a:chOff x="0" y="0"/>
+          <a:chExt cx="0" cy="0"/>
+        </a:xfrm>
+      </p:grpSpPr>
+      <p:sp>
+        <p:nvSpPr>
+          <p:cNvPr id="574" name="Google Shape;574;g35f391192_017:notes"/>
+          <p:cNvSpPr>
+            <a:spLocks noGrp="1" noRot="1" noChangeAspect="1"/>
+          </p:cNvSpPr>
+          <p:nvPr>
+            <p:ph type="sldImg" idx="2"/>
+          </p:nvPr>
+        </p:nvSpPr>
+        <p:spPr>
+          <a:xfrm>
+            <a:off x="381000" y="685800"/>
+            <a:ext cx="6096000" cy="3429000"/>
+          </a:xfrm>
+          <a:custGeom>
+            <a:avLst/>
+            <a:gdLst/>
+            <a:ahLst/>
+            <a:cxnLst/>
+            <a:rect l="l" t="t" r="r" b="b"/>
+            <a:pathLst>
+              <a:path w="120000" h="120000" extrusionOk="0">
+                <a:moveTo>
+                  <a:pt x="0" y="0"/>
+                </a:moveTo>
+                <a:lnTo>
+                  <a:pt x="120000" y="0"/>
+                </a:lnTo>
+                <a:lnTo>
+                  <a:pt x="120000" y="120000"/>
+                </a:lnTo>
+                <a:lnTo>
+                  <a:pt x="0" y="120000"/>
+                </a:lnTo>
+                <a:close/>
+              </a:path>
+            </a:pathLst>
+          </a:custGeom>
+        </p:spPr>
+      </p:sp>
+      <p:sp>
+        <p:nvSpPr>
+          <p:cNvPr id="575" name="Google Shape;575;g35f391192_017:notes"/>
+          <p:cNvSpPr txBox="1">
+            <a:spLocks noGrp="1"/>
+          </p:cNvSpPr>
+          <p:nvPr>
+            <p:ph type="body" idx="1"/>
+          </p:nvPr>
+        </p:nvSpPr>
+        <p:spPr>
+          <a:xfrm>
+            <a:off x="685800" y="4343400"/>
+            <a:ext cx="5486400" cy="4114800"/>
+          </a:xfrm>
+          <a:prstGeom prst="rect">
+            <a:avLst/>
+          </a:prstGeom>
+        </p:spPr>
+        <p:txBody>
+          <a:bodyPr spcFirstLastPara="1" wrap="square" lIns="91425" tIns="91425" rIns="91425" bIns="91425" anchor="t" anchorCtr="0">
+            <a:noAutofit/>
+          </a:bodyPr>
+          <a:lstStyle/>
+          <a:p>
+            <a:pPr marL="0" lvl="0" indent="0" algn="l" rtl="0">
+              <a:spcBef>
+                <a:spcPts val="0"/>
+              </a:spcBef>
+              <a:spcAft>
+                <a:spcPts val="0"/>
+              </a:spcAft>
+              <a:buNone/>
+            </a:pPr>
+            <a:endParaRPr/>
+          </a:p>
+        </p:txBody>
+      </p:sp>
+    </p:spTree>
+  </p:cSld>
+  <p:clrMapOvr>
+    <a:masterClrMapping/>
+  </p:clrMapOvr>
+</p:notes>
+</file>
+
+<file path=ppt/notesSlides/notesSlide43.xml><?xml version="1.0" encoding="utf-8"?>
+<p:notes xmlns:a="http://schemas.openxmlformats.org/drawingml/2006/main" xmlns:r="http://schemas.openxmlformats.org/officeDocument/2006/relationships" xmlns:p="http://schemas.openxmlformats.org/presentationml/2006/main" showMasterSp="0" showMasterPhAnim="0">
+  <p:cSld>
+    <p:spTree>
+      <p:nvGrpSpPr>
+        <p:cNvPr id="1" name="Shape 573"/>
+        <p:cNvGrpSpPr/>
+        <p:nvPr/>
+      </p:nvGrpSpPr>
+      <p:grpSpPr>
+        <a:xfrm>
+          <a:off x="0" y="0"/>
+          <a:ext cx="0" cy="0"/>
+          <a:chOff x="0" y="0"/>
+          <a:chExt cx="0" cy="0"/>
+        </a:xfrm>
+      </p:grpSpPr>
+      <p:sp>
+        <p:nvSpPr>
+          <p:cNvPr id="574" name="Google Shape;574;g35f391192_017:notes"/>
+          <p:cNvSpPr>
+            <a:spLocks noGrp="1" noRot="1" noChangeAspect="1"/>
+          </p:cNvSpPr>
+          <p:nvPr>
+            <p:ph type="sldImg" idx="2"/>
+          </p:nvPr>
+        </p:nvSpPr>
+        <p:spPr>
+          <a:xfrm>
+            <a:off x="381000" y="685800"/>
+            <a:ext cx="6096000" cy="3429000"/>
+          </a:xfrm>
+          <a:custGeom>
+            <a:avLst/>
+            <a:gdLst/>
+            <a:ahLst/>
+            <a:cxnLst/>
+            <a:rect l="l" t="t" r="r" b="b"/>
+            <a:pathLst>
+              <a:path w="120000" h="120000" extrusionOk="0">
+                <a:moveTo>
+                  <a:pt x="0" y="0"/>
+                </a:moveTo>
+                <a:lnTo>
+                  <a:pt x="120000" y="0"/>
+                </a:lnTo>
+                <a:lnTo>
+                  <a:pt x="120000" y="120000"/>
+                </a:lnTo>
+                <a:lnTo>
+                  <a:pt x="0" y="120000"/>
+                </a:lnTo>
+                <a:close/>
+              </a:path>
+            </a:pathLst>
+          </a:custGeom>
+        </p:spPr>
+      </p:sp>
+      <p:sp>
+        <p:nvSpPr>
+          <p:cNvPr id="575" name="Google Shape;575;g35f391192_017:notes"/>
+          <p:cNvSpPr txBox="1">
+            <a:spLocks noGrp="1"/>
+          </p:cNvSpPr>
+          <p:nvPr>
+            <p:ph type="body" idx="1"/>
+          </p:nvPr>
+        </p:nvSpPr>
+        <p:spPr>
+          <a:xfrm>
+            <a:off x="685800" y="4343400"/>
+            <a:ext cx="5486400" cy="4114800"/>
+          </a:xfrm>
+          <a:prstGeom prst="rect">
+            <a:avLst/>
+          </a:prstGeom>
+        </p:spPr>
+        <p:txBody>
+          <a:bodyPr spcFirstLastPara="1" wrap="square" lIns="91425" tIns="91425" rIns="91425" bIns="91425" anchor="t" anchorCtr="0">
+            <a:noAutofit/>
+          </a:bodyPr>
+          <a:lstStyle/>
+          <a:p>
+            <a:pPr marL="0" lvl="0" indent="0" algn="l" rtl="0">
+              <a:spcBef>
+                <a:spcPts val="0"/>
+              </a:spcBef>
+              <a:spcAft>
+                <a:spcPts val="0"/>
+              </a:spcAft>
+              <a:buNone/>
+            </a:pPr>
+            <a:endParaRPr/>
+          </a:p>
+        </p:txBody>
+      </p:sp>
+    </p:spTree>
+  </p:cSld>
+  <p:clrMapOvr>
+    <a:masterClrMapping/>
+  </p:clrMapOvr>
+</p:notes>
+</file>
+
+<file path=ppt/notesSlides/notesSlide44.xml><?xml version="1.0" encoding="utf-8"?>
+<p:notes xmlns:a="http://schemas.openxmlformats.org/drawingml/2006/main" xmlns:r="http://schemas.openxmlformats.org/officeDocument/2006/relationships" xmlns:p="http://schemas.openxmlformats.org/presentationml/2006/main" showMasterSp="0" showMasterPhAnim="0">
+  <p:cSld>
+    <p:spTree>
+      <p:nvGrpSpPr>
+        <p:cNvPr id="1" name="Shape 573"/>
+        <p:cNvGrpSpPr/>
+        <p:nvPr/>
+      </p:nvGrpSpPr>
+      <p:grpSpPr>
+        <a:xfrm>
+          <a:off x="0" y="0"/>
+          <a:ext cx="0" cy="0"/>
+          <a:chOff x="0" y="0"/>
+          <a:chExt cx="0" cy="0"/>
+        </a:xfrm>
+      </p:grpSpPr>
+      <p:sp>
+        <p:nvSpPr>
+          <p:cNvPr id="574" name="Google Shape;574;g35f391192_017:notes"/>
+          <p:cNvSpPr>
+            <a:spLocks noGrp="1" noRot="1" noChangeAspect="1"/>
+          </p:cNvSpPr>
+          <p:nvPr>
+            <p:ph type="sldImg" idx="2"/>
+          </p:nvPr>
+        </p:nvSpPr>
+        <p:spPr>
+          <a:xfrm>
+            <a:off x="381000" y="685800"/>
+            <a:ext cx="6096000" cy="3429000"/>
+          </a:xfrm>
+          <a:custGeom>
+            <a:avLst/>
+            <a:gdLst/>
+            <a:ahLst/>
+            <a:cxnLst/>
+            <a:rect l="l" t="t" r="r" b="b"/>
+            <a:pathLst>
+              <a:path w="120000" h="120000" extrusionOk="0">
+                <a:moveTo>
+                  <a:pt x="0" y="0"/>
+                </a:moveTo>
+                <a:lnTo>
+                  <a:pt x="120000" y="0"/>
+                </a:lnTo>
+                <a:lnTo>
+                  <a:pt x="120000" y="120000"/>
+                </a:lnTo>
+                <a:lnTo>
+                  <a:pt x="0" y="120000"/>
+                </a:lnTo>
+                <a:close/>
+              </a:path>
+            </a:pathLst>
+          </a:custGeom>
+        </p:spPr>
+      </p:sp>
+      <p:sp>
+        <p:nvSpPr>
+          <p:cNvPr id="575" name="Google Shape;575;g35f391192_017:notes"/>
+          <p:cNvSpPr txBox="1">
+            <a:spLocks noGrp="1"/>
+          </p:cNvSpPr>
+          <p:nvPr>
+            <p:ph type="body" idx="1"/>
+          </p:nvPr>
+        </p:nvSpPr>
+        <p:spPr>
+          <a:xfrm>
+            <a:off x="685800" y="4343400"/>
+            <a:ext cx="5486400" cy="4114800"/>
+          </a:xfrm>
+          <a:prstGeom prst="rect">
+            <a:avLst/>
+          </a:prstGeom>
+        </p:spPr>
+        <p:txBody>
+          <a:bodyPr spcFirstLastPara="1" wrap="square" lIns="91425" tIns="91425" rIns="91425" bIns="91425" anchor="t" anchorCtr="0">
+            <a:noAutofit/>
+          </a:bodyPr>
+          <a:lstStyle/>
+          <a:p>
+            <a:pPr marL="0" lvl="0" indent="0" algn="l" rtl="0">
+              <a:spcBef>
+                <a:spcPts val="0"/>
+              </a:spcBef>
+              <a:spcAft>
+                <a:spcPts val="0"/>
+              </a:spcAft>
+              <a:buNone/>
+            </a:pPr>
+            <a:endParaRPr/>
+          </a:p>
+        </p:txBody>
+      </p:sp>
+    </p:spTree>
+  </p:cSld>
+  <p:clrMapOvr>
+    <a:masterClrMapping/>
+  </p:clrMapOvr>
+</p:notes>
+</file>
+
+<file path=ppt/notesSlides/notesSlide45.xml><?xml version="1.0" encoding="utf-8"?>
+<p:notes xmlns:a="http://schemas.openxmlformats.org/drawingml/2006/main" xmlns:r="http://schemas.openxmlformats.org/officeDocument/2006/relationships" xmlns:p="http://schemas.openxmlformats.org/presentationml/2006/main" showMasterSp="0" showMasterPhAnim="0">
+  <p:cSld>
+    <p:spTree>
+      <p:nvGrpSpPr>
+        <p:cNvPr id="1" name="Shape 573"/>
+        <p:cNvGrpSpPr/>
+        <p:nvPr/>
+      </p:nvGrpSpPr>
+      <p:grpSpPr>
+        <a:xfrm>
+          <a:off x="0" y="0"/>
+          <a:ext cx="0" cy="0"/>
+          <a:chOff x="0" y="0"/>
+          <a:chExt cx="0" cy="0"/>
+        </a:xfrm>
+      </p:grpSpPr>
+      <p:sp>
+        <p:nvSpPr>
+          <p:cNvPr id="574" name="Google Shape;574;g35f391192_017:notes"/>
+          <p:cNvSpPr>
+            <a:spLocks noGrp="1" noRot="1" noChangeAspect="1"/>
+          </p:cNvSpPr>
+          <p:nvPr>
+            <p:ph type="sldImg" idx="2"/>
+          </p:nvPr>
+        </p:nvSpPr>
+        <p:spPr>
+          <a:xfrm>
+            <a:off x="381000" y="685800"/>
+            <a:ext cx="6096000" cy="3429000"/>
+          </a:xfrm>
+          <a:custGeom>
+            <a:avLst/>
+            <a:gdLst/>
+            <a:ahLst/>
+            <a:cxnLst/>
+            <a:rect l="l" t="t" r="r" b="b"/>
+            <a:pathLst>
+              <a:path w="120000" h="120000" extrusionOk="0">
+                <a:moveTo>
+                  <a:pt x="0" y="0"/>
+                </a:moveTo>
+                <a:lnTo>
+                  <a:pt x="120000" y="0"/>
+                </a:lnTo>
+                <a:lnTo>
+                  <a:pt x="120000" y="120000"/>
+                </a:lnTo>
+                <a:lnTo>
+                  <a:pt x="0" y="120000"/>
+                </a:lnTo>
+                <a:close/>
+              </a:path>
+            </a:pathLst>
+          </a:custGeom>
+        </p:spPr>
+      </p:sp>
+      <p:sp>
+        <p:nvSpPr>
+          <p:cNvPr id="575" name="Google Shape;575;g35f391192_017:notes"/>
+          <p:cNvSpPr txBox="1">
+            <a:spLocks noGrp="1"/>
+          </p:cNvSpPr>
+          <p:nvPr>
+            <p:ph type="body" idx="1"/>
+          </p:nvPr>
+        </p:nvSpPr>
+        <p:spPr>
+          <a:xfrm>
+            <a:off x="685800" y="4343400"/>
+            <a:ext cx="5486400" cy="4114800"/>
+          </a:xfrm>
+          <a:prstGeom prst="rect">
+            <a:avLst/>
+          </a:prstGeom>
+        </p:spPr>
+        <p:txBody>
+          <a:bodyPr spcFirstLastPara="1" wrap="square" lIns="91425" tIns="91425" rIns="91425" bIns="91425" anchor="t" anchorCtr="0">
+            <a:noAutofit/>
+          </a:bodyPr>
+          <a:lstStyle/>
+          <a:p>
+            <a:pPr marL="0" lvl="0" indent="0" algn="l" rtl="0">
+              <a:spcBef>
+                <a:spcPts val="0"/>
+              </a:spcBef>
+              <a:spcAft>
+                <a:spcPts val="0"/>
+              </a:spcAft>
+              <a:buNone/>
+            </a:pPr>
+            <a:endParaRPr/>
+          </a:p>
+        </p:txBody>
+      </p:sp>
+    </p:spTree>
+  </p:cSld>
+  <p:clrMapOvr>
+    <a:masterClrMapping/>
+  </p:clrMapOvr>
+</p:notes>
+</file>
+
+<file path=ppt/notesSlides/notesSlide46.xml><?xml version="1.0" encoding="utf-8"?>
+<p:notes xmlns:a="http://schemas.openxmlformats.org/drawingml/2006/main" xmlns:r="http://schemas.openxmlformats.org/officeDocument/2006/relationships" xmlns:p="http://schemas.openxmlformats.org/presentationml/2006/main" showMasterSp="0" showMasterPhAnim="0">
+  <p:cSld>
+    <p:spTree>
+      <p:nvGrpSpPr>
+        <p:cNvPr id="1" name="Shape 573"/>
+        <p:cNvGrpSpPr/>
+        <p:nvPr/>
+      </p:nvGrpSpPr>
+      <p:grpSpPr>
+        <a:xfrm>
+          <a:off x="0" y="0"/>
+          <a:ext cx="0" cy="0"/>
+          <a:chOff x="0" y="0"/>
+          <a:chExt cx="0" cy="0"/>
+        </a:xfrm>
+      </p:grpSpPr>
+      <p:sp>
+        <p:nvSpPr>
+          <p:cNvPr id="574" name="Google Shape;574;g35f391192_017:notes"/>
+          <p:cNvSpPr>
+            <a:spLocks noGrp="1" noRot="1" noChangeAspect="1"/>
+          </p:cNvSpPr>
+          <p:nvPr>
+            <p:ph type="sldImg" idx="2"/>
+          </p:nvPr>
+        </p:nvSpPr>
+        <p:spPr>
+          <a:xfrm>
+            <a:off x="381000" y="685800"/>
+            <a:ext cx="6096000" cy="3429000"/>
+          </a:xfrm>
+          <a:custGeom>
+            <a:avLst/>
+            <a:gdLst/>
+            <a:ahLst/>
+            <a:cxnLst/>
+            <a:rect l="l" t="t" r="r" b="b"/>
+            <a:pathLst>
+              <a:path w="120000" h="120000" extrusionOk="0">
+                <a:moveTo>
+                  <a:pt x="0" y="0"/>
+                </a:moveTo>
+                <a:lnTo>
+                  <a:pt x="120000" y="0"/>
+                </a:lnTo>
+                <a:lnTo>
+                  <a:pt x="120000" y="120000"/>
+                </a:lnTo>
+                <a:lnTo>
+                  <a:pt x="0" y="120000"/>
+                </a:lnTo>
+                <a:close/>
+              </a:path>
+            </a:pathLst>
+          </a:custGeom>
+        </p:spPr>
+      </p:sp>
+      <p:sp>
+        <p:nvSpPr>
+          <p:cNvPr id="575" name="Google Shape;575;g35f391192_017:notes"/>
+          <p:cNvSpPr txBox="1">
+            <a:spLocks noGrp="1"/>
+          </p:cNvSpPr>
+          <p:nvPr>
+            <p:ph type="body" idx="1"/>
+          </p:nvPr>
+        </p:nvSpPr>
+        <p:spPr>
+          <a:xfrm>
+            <a:off x="685800" y="4343400"/>
+            <a:ext cx="5486400" cy="4114800"/>
+          </a:xfrm>
+          <a:prstGeom prst="rect">
+            <a:avLst/>
+          </a:prstGeom>
+        </p:spPr>
+        <p:txBody>
+          <a:bodyPr spcFirstLastPara="1" wrap="square" lIns="91425" tIns="91425" rIns="91425" bIns="91425" anchor="t" anchorCtr="0">
+            <a:noAutofit/>
+          </a:bodyPr>
+          <a:lstStyle/>
+          <a:p>
+            <a:pPr marL="0" lvl="0" indent="0" algn="l" rtl="0">
+              <a:spcBef>
+                <a:spcPts val="0"/>
+              </a:spcBef>
+              <a:spcAft>
+                <a:spcPts val="0"/>
+              </a:spcAft>
+              <a:buNone/>
+            </a:pPr>
+            <a:endParaRPr/>
+          </a:p>
+        </p:txBody>
+      </p:sp>
+    </p:spTree>
+  </p:cSld>
+  <p:clrMapOvr>
+    <a:masterClrMapping/>
+  </p:clrMapOvr>
+</p:notes>
+</file>
+
+<file path=ppt/notesSlides/notesSlide47.xml><?xml version="1.0" encoding="utf-8"?>
+<p:notes xmlns:a="http://schemas.openxmlformats.org/drawingml/2006/main" xmlns:r="http://schemas.openxmlformats.org/officeDocument/2006/relationships" xmlns:p="http://schemas.openxmlformats.org/presentationml/2006/main" showMasterSp="0" showMasterPhAnim="0">
+  <p:cSld>
+    <p:spTree>
+      <p:nvGrpSpPr>
+        <p:cNvPr id="1" name="Shape 573"/>
+        <p:cNvGrpSpPr/>
+        <p:nvPr/>
+      </p:nvGrpSpPr>
+      <p:grpSpPr>
+        <a:xfrm>
+          <a:off x="0" y="0"/>
+          <a:ext cx="0" cy="0"/>
+          <a:chOff x="0" y="0"/>
+          <a:chExt cx="0" cy="0"/>
+        </a:xfrm>
+      </p:grpSpPr>
+      <p:sp>
+        <p:nvSpPr>
+          <p:cNvPr id="574" name="Google Shape;574;g35f391192_017:notes"/>
+          <p:cNvSpPr>
+            <a:spLocks noGrp="1" noRot="1" noChangeAspect="1"/>
+          </p:cNvSpPr>
+          <p:nvPr>
+            <p:ph type="sldImg" idx="2"/>
+          </p:nvPr>
+        </p:nvSpPr>
+        <p:spPr>
+          <a:xfrm>
+            <a:off x="381000" y="685800"/>
+            <a:ext cx="6096000" cy="3429000"/>
+          </a:xfrm>
+          <a:custGeom>
+            <a:avLst/>
+            <a:gdLst/>
+            <a:ahLst/>
+            <a:cxnLst/>
+            <a:rect l="l" t="t" r="r" b="b"/>
+            <a:pathLst>
+              <a:path w="120000" h="120000" extrusionOk="0">
+                <a:moveTo>
+                  <a:pt x="0" y="0"/>
+                </a:moveTo>
+                <a:lnTo>
+                  <a:pt x="120000" y="0"/>
+                </a:lnTo>
+                <a:lnTo>
+                  <a:pt x="120000" y="120000"/>
+                </a:lnTo>
+                <a:lnTo>
+                  <a:pt x="0" y="120000"/>
+                </a:lnTo>
+                <a:close/>
+              </a:path>
+            </a:pathLst>
+          </a:custGeom>
+        </p:spPr>
+      </p:sp>
+      <p:sp>
+        <p:nvSpPr>
+          <p:cNvPr id="575" name="Google Shape;575;g35f391192_017:notes"/>
+          <p:cNvSpPr txBox="1">
+            <a:spLocks noGrp="1"/>
+          </p:cNvSpPr>
+          <p:nvPr>
+            <p:ph type="body" idx="1"/>
+          </p:nvPr>
+        </p:nvSpPr>
+        <p:spPr>
+          <a:xfrm>
+            <a:off x="685800" y="4343400"/>
+            <a:ext cx="5486400" cy="4114800"/>
+          </a:xfrm>
+          <a:prstGeom prst="rect">
+            <a:avLst/>
+          </a:prstGeom>
+        </p:spPr>
+        <p:txBody>
+          <a:bodyPr spcFirstLastPara="1" wrap="square" lIns="91425" tIns="91425" rIns="91425" bIns="91425" anchor="t" anchorCtr="0">
+            <a:noAutofit/>
+          </a:bodyPr>
+          <a:lstStyle/>
+          <a:p>
+            <a:pPr marL="0" lvl="0" indent="0" algn="l" rtl="0">
+              <a:spcBef>
+                <a:spcPts val="0"/>
+              </a:spcBef>
+              <a:spcAft>
+                <a:spcPts val="0"/>
+              </a:spcAft>
+              <a:buNone/>
+            </a:pPr>
+            <a:endParaRPr/>
+          </a:p>
+        </p:txBody>
+      </p:sp>
+    </p:spTree>
+  </p:cSld>
+  <p:clrMapOvr>
+    <a:masterClrMapping/>
+  </p:clrMapOvr>
+</p:notes>
+</file>
+
+<file path=ppt/notesSlides/notesSlide48.xml><?xml version="1.0" encoding="utf-8"?>
+<p:notes xmlns:a="http://schemas.openxmlformats.org/drawingml/2006/main" xmlns:r="http://schemas.openxmlformats.org/officeDocument/2006/relationships" xmlns:p="http://schemas.openxmlformats.org/presentationml/2006/main" showMasterSp="0" showMasterPhAnim="0">
+  <p:cSld>
+    <p:spTree>
+      <p:nvGrpSpPr>
+        <p:cNvPr id="1" name="Shape 573"/>
+        <p:cNvGrpSpPr/>
+        <p:nvPr/>
+      </p:nvGrpSpPr>
+      <p:grpSpPr>
+        <a:xfrm>
+          <a:off x="0" y="0"/>
+          <a:ext cx="0" cy="0"/>
+          <a:chOff x="0" y="0"/>
+          <a:chExt cx="0" cy="0"/>
+        </a:xfrm>
+      </p:grpSpPr>
+      <p:sp>
+        <p:nvSpPr>
+          <p:cNvPr id="574" name="Google Shape;574;g35f391192_017:notes"/>
+          <p:cNvSpPr>
+            <a:spLocks noGrp="1" noRot="1" noChangeAspect="1"/>
+          </p:cNvSpPr>
+          <p:nvPr>
+            <p:ph type="sldImg" idx="2"/>
+          </p:nvPr>
+        </p:nvSpPr>
+        <p:spPr>
+          <a:xfrm>
+            <a:off x="381000" y="685800"/>
+            <a:ext cx="6096000" cy="3429000"/>
+          </a:xfrm>
+          <a:custGeom>
+            <a:avLst/>
+            <a:gdLst/>
+            <a:ahLst/>
+            <a:cxnLst/>
+            <a:rect l="l" t="t" r="r" b="b"/>
+            <a:pathLst>
+              <a:path w="120000" h="120000" extrusionOk="0">
+                <a:moveTo>
+                  <a:pt x="0" y="0"/>
+                </a:moveTo>
+                <a:lnTo>
+                  <a:pt x="120000" y="0"/>
+                </a:lnTo>
+                <a:lnTo>
+                  <a:pt x="120000" y="120000"/>
+                </a:lnTo>
+                <a:lnTo>
+                  <a:pt x="0" y="120000"/>
+                </a:lnTo>
+                <a:close/>
+              </a:path>
+            </a:pathLst>
+          </a:custGeom>
+        </p:spPr>
+      </p:sp>
+      <p:sp>
+        <p:nvSpPr>
+          <p:cNvPr id="575" name="Google Shape;575;g35f391192_017:notes"/>
+          <p:cNvSpPr txBox="1">
+            <a:spLocks noGrp="1"/>
+          </p:cNvSpPr>
+          <p:nvPr>
+            <p:ph type="body" idx="1"/>
+          </p:nvPr>
+        </p:nvSpPr>
+        <p:spPr>
+          <a:xfrm>
+            <a:off x="685800" y="4343400"/>
+            <a:ext cx="5486400" cy="4114800"/>
+          </a:xfrm>
+          <a:prstGeom prst="rect">
+            <a:avLst/>
+          </a:prstGeom>
+        </p:spPr>
+        <p:txBody>
+          <a:bodyPr spcFirstLastPara="1" wrap="square" lIns="91425" tIns="91425" rIns="91425" bIns="91425" anchor="t" anchorCtr="0">
+            <a:noAutofit/>
+          </a:bodyPr>
+          <a:lstStyle/>
+          <a:p>
+            <a:pPr marL="0" lvl="0" indent="0" algn="l" rtl="0">
+              <a:spcBef>
+                <a:spcPts val="0"/>
+              </a:spcBef>
+              <a:spcAft>
+                <a:spcPts val="0"/>
+              </a:spcAft>
+              <a:buNone/>
+            </a:pPr>
+            <a:endParaRPr/>
+          </a:p>
+        </p:txBody>
+      </p:sp>
+    </p:spTree>
+  </p:cSld>
+  <p:clrMapOvr>
+    <a:masterClrMapping/>
+  </p:clrMapOvr>
+</p:notes>
+</file>
+
+<file path=ppt/notesSlides/notesSlide49.xml><?xml version="1.0" encoding="utf-8"?>
+<p:notes xmlns:a="http://schemas.openxmlformats.org/drawingml/2006/main" xmlns:r="http://schemas.openxmlformats.org/officeDocument/2006/relationships" xmlns:p="http://schemas.openxmlformats.org/presentationml/2006/main" showMasterSp="0" showMasterPhAnim="0">
+  <p:cSld>
+    <p:spTree>
+      <p:nvGrpSpPr>
+        <p:cNvPr id="1" name="Shape 573"/>
+        <p:cNvGrpSpPr/>
+        <p:nvPr/>
+      </p:nvGrpSpPr>
+      <p:grpSpPr>
+        <a:xfrm>
+          <a:off x="0" y="0"/>
+          <a:ext cx="0" cy="0"/>
+          <a:chOff x="0" y="0"/>
+          <a:chExt cx="0" cy="0"/>
+        </a:xfrm>
+      </p:grpSpPr>
+      <p:sp>
+        <p:nvSpPr>
+          <p:cNvPr id="574" name="Google Shape;574;g35f391192_017:notes"/>
+          <p:cNvSpPr>
+            <a:spLocks noGrp="1" noRot="1" noChangeAspect="1"/>
+          </p:cNvSpPr>
+          <p:nvPr>
+            <p:ph type="sldImg" idx="2"/>
+          </p:nvPr>
+        </p:nvSpPr>
+        <p:spPr>
+          <a:xfrm>
+            <a:off x="381000" y="685800"/>
+            <a:ext cx="6096000" cy="3429000"/>
+          </a:xfrm>
+          <a:custGeom>
+            <a:avLst/>
+            <a:gdLst/>
+            <a:ahLst/>
+            <a:cxnLst/>
+            <a:rect l="l" t="t" r="r" b="b"/>
+            <a:pathLst>
+              <a:path w="120000" h="120000" extrusionOk="0">
+                <a:moveTo>
+                  <a:pt x="0" y="0"/>
+                </a:moveTo>
+                <a:lnTo>
+                  <a:pt x="120000" y="0"/>
+                </a:lnTo>
+                <a:lnTo>
+                  <a:pt x="120000" y="120000"/>
+                </a:lnTo>
+                <a:lnTo>
+                  <a:pt x="0" y="120000"/>
+                </a:lnTo>
+                <a:close/>
+              </a:path>
+            </a:pathLst>
+          </a:custGeom>
+        </p:spPr>
+      </p:sp>
+      <p:sp>
+        <p:nvSpPr>
+          <p:cNvPr id="575" name="Google Shape;575;g35f391192_017:notes"/>
           <p:cNvSpPr txBox="1">
             <a:spLocks noGrp="1"/>
           </p:cNvSpPr>
@@ -4551,6 +5393,214 @@
       <p:sp>
         <p:nvSpPr>
           <p:cNvPr id="528" name="Google Shape;528;g35f391192_029:notes"/>
+          <p:cNvSpPr txBox="1">
+            <a:spLocks noGrp="1"/>
+          </p:cNvSpPr>
+          <p:nvPr>
+            <p:ph type="body" idx="1"/>
+          </p:nvPr>
+        </p:nvSpPr>
+        <p:spPr>
+          <a:xfrm>
+            <a:off x="685800" y="4343400"/>
+            <a:ext cx="5486400" cy="4114800"/>
+          </a:xfrm>
+          <a:prstGeom prst="rect">
+            <a:avLst/>
+          </a:prstGeom>
+        </p:spPr>
+        <p:txBody>
+          <a:bodyPr spcFirstLastPara="1" wrap="square" lIns="91425" tIns="91425" rIns="91425" bIns="91425" anchor="t" anchorCtr="0">
+            <a:noAutofit/>
+          </a:bodyPr>
+          <a:lstStyle/>
+          <a:p>
+            <a:pPr marL="0" lvl="0" indent="0" algn="l" rtl="0">
+              <a:spcBef>
+                <a:spcPts val="0"/>
+              </a:spcBef>
+              <a:spcAft>
+                <a:spcPts val="0"/>
+              </a:spcAft>
+              <a:buNone/>
+            </a:pPr>
+            <a:endParaRPr/>
+          </a:p>
+        </p:txBody>
+      </p:sp>
+    </p:spTree>
+  </p:cSld>
+  <p:clrMapOvr>
+    <a:masterClrMapping/>
+  </p:clrMapOvr>
+</p:notes>
+</file>
+
+<file path=ppt/notesSlides/notesSlide50.xml><?xml version="1.0" encoding="utf-8"?>
+<p:notes xmlns:a="http://schemas.openxmlformats.org/drawingml/2006/main" xmlns:r="http://schemas.openxmlformats.org/officeDocument/2006/relationships" xmlns:p="http://schemas.openxmlformats.org/presentationml/2006/main" showMasterSp="0" showMasterPhAnim="0">
+  <p:cSld>
+    <p:spTree>
+      <p:nvGrpSpPr>
+        <p:cNvPr id="1" name="Shape 573"/>
+        <p:cNvGrpSpPr/>
+        <p:nvPr/>
+      </p:nvGrpSpPr>
+      <p:grpSpPr>
+        <a:xfrm>
+          <a:off x="0" y="0"/>
+          <a:ext cx="0" cy="0"/>
+          <a:chOff x="0" y="0"/>
+          <a:chExt cx="0" cy="0"/>
+        </a:xfrm>
+      </p:grpSpPr>
+      <p:sp>
+        <p:nvSpPr>
+          <p:cNvPr id="574" name="Google Shape;574;g35f391192_017:notes"/>
+          <p:cNvSpPr>
+            <a:spLocks noGrp="1" noRot="1" noChangeAspect="1"/>
+          </p:cNvSpPr>
+          <p:nvPr>
+            <p:ph type="sldImg" idx="2"/>
+          </p:nvPr>
+        </p:nvSpPr>
+        <p:spPr>
+          <a:xfrm>
+            <a:off x="381000" y="685800"/>
+            <a:ext cx="6096000" cy="3429000"/>
+          </a:xfrm>
+          <a:custGeom>
+            <a:avLst/>
+            <a:gdLst/>
+            <a:ahLst/>
+            <a:cxnLst/>
+            <a:rect l="l" t="t" r="r" b="b"/>
+            <a:pathLst>
+              <a:path w="120000" h="120000" extrusionOk="0">
+                <a:moveTo>
+                  <a:pt x="0" y="0"/>
+                </a:moveTo>
+                <a:lnTo>
+                  <a:pt x="120000" y="0"/>
+                </a:lnTo>
+                <a:lnTo>
+                  <a:pt x="120000" y="120000"/>
+                </a:lnTo>
+                <a:lnTo>
+                  <a:pt x="0" y="120000"/>
+                </a:lnTo>
+                <a:close/>
+              </a:path>
+            </a:pathLst>
+          </a:custGeom>
+        </p:spPr>
+      </p:sp>
+      <p:sp>
+        <p:nvSpPr>
+          <p:cNvPr id="575" name="Google Shape;575;g35f391192_017:notes"/>
+          <p:cNvSpPr txBox="1">
+            <a:spLocks noGrp="1"/>
+          </p:cNvSpPr>
+          <p:nvPr>
+            <p:ph type="body" idx="1"/>
+          </p:nvPr>
+        </p:nvSpPr>
+        <p:spPr>
+          <a:xfrm>
+            <a:off x="685800" y="4343400"/>
+            <a:ext cx="5486400" cy="4114800"/>
+          </a:xfrm>
+          <a:prstGeom prst="rect">
+            <a:avLst/>
+          </a:prstGeom>
+        </p:spPr>
+        <p:txBody>
+          <a:bodyPr spcFirstLastPara="1" wrap="square" lIns="91425" tIns="91425" rIns="91425" bIns="91425" anchor="t" anchorCtr="0">
+            <a:noAutofit/>
+          </a:bodyPr>
+          <a:lstStyle/>
+          <a:p>
+            <a:pPr marL="0" lvl="0" indent="0" algn="l" rtl="0">
+              <a:spcBef>
+                <a:spcPts val="0"/>
+              </a:spcBef>
+              <a:spcAft>
+                <a:spcPts val="0"/>
+              </a:spcAft>
+              <a:buNone/>
+            </a:pPr>
+            <a:endParaRPr/>
+          </a:p>
+        </p:txBody>
+      </p:sp>
+    </p:spTree>
+  </p:cSld>
+  <p:clrMapOvr>
+    <a:masterClrMapping/>
+  </p:clrMapOvr>
+</p:notes>
+</file>
+
+<file path=ppt/notesSlides/notesSlide51.xml><?xml version="1.0" encoding="utf-8"?>
+<p:notes xmlns:a="http://schemas.openxmlformats.org/drawingml/2006/main" xmlns:r="http://schemas.openxmlformats.org/officeDocument/2006/relationships" xmlns:p="http://schemas.openxmlformats.org/presentationml/2006/main" showMasterSp="0" showMasterPhAnim="0">
+  <p:cSld>
+    <p:spTree>
+      <p:nvGrpSpPr>
+        <p:cNvPr id="1" name="Shape 765"/>
+        <p:cNvGrpSpPr/>
+        <p:nvPr/>
+      </p:nvGrpSpPr>
+      <p:grpSpPr>
+        <a:xfrm>
+          <a:off x="0" y="0"/>
+          <a:ext cx="0" cy="0"/>
+          <a:chOff x="0" y="0"/>
+          <a:chExt cx="0" cy="0"/>
+        </a:xfrm>
+      </p:grpSpPr>
+      <p:sp>
+        <p:nvSpPr>
+          <p:cNvPr id="766" name="Google Shape;766;g35ed75ccf_022:notes"/>
+          <p:cNvSpPr>
+            <a:spLocks noGrp="1" noRot="1" noChangeAspect="1"/>
+          </p:cNvSpPr>
+          <p:nvPr>
+            <p:ph type="sldImg" idx="2"/>
+          </p:nvPr>
+        </p:nvSpPr>
+        <p:spPr>
+          <a:xfrm>
+            <a:off x="381000" y="685800"/>
+            <a:ext cx="6096000" cy="3429000"/>
+          </a:xfrm>
+          <a:custGeom>
+            <a:avLst/>
+            <a:gdLst/>
+            <a:ahLst/>
+            <a:cxnLst/>
+            <a:rect l="l" t="t" r="r" b="b"/>
+            <a:pathLst>
+              <a:path w="120000" h="120000" extrusionOk="0">
+                <a:moveTo>
+                  <a:pt x="0" y="0"/>
+                </a:moveTo>
+                <a:lnTo>
+                  <a:pt x="120000" y="0"/>
+                </a:lnTo>
+                <a:lnTo>
+                  <a:pt x="120000" y="120000"/>
+                </a:lnTo>
+                <a:lnTo>
+                  <a:pt x="0" y="120000"/>
+                </a:lnTo>
+                <a:close/>
+              </a:path>
+            </a:pathLst>
+          </a:custGeom>
+        </p:spPr>
+      </p:sp>
+      <p:sp>
+        <p:nvSpPr>
+          <p:cNvPr id="767" name="Google Shape;767;g35ed75ccf_022:notes"/>
           <p:cNvSpPr txBox="1">
             <a:spLocks noGrp="1"/>
           </p:cNvSpPr>
@@ -28154,7 +29204,7 @@
             </a:r>
             <a:r>
               <a:rPr lang="en-US" dirty="0" err="1" smtClean="0"/>
-              <a:t>Công</a:t>
+              <a:t>Các</a:t>
             </a:r>
             <a:r>
               <a:rPr lang="en-US" dirty="0" smtClean="0"/>
@@ -28162,7 +29212,7 @@
             </a:r>
             <a:r>
               <a:rPr lang="en-US" dirty="0" err="1" smtClean="0"/>
-              <a:t>nghệ</a:t>
+              <a:t>bước</a:t>
             </a:r>
             <a:r>
               <a:rPr lang="en-US" dirty="0" smtClean="0"/>
@@ -28170,7 +29220,7 @@
             </a:r>
             <a:r>
               <a:rPr lang="en-US" dirty="0" err="1" smtClean="0"/>
-              <a:t>áp</a:t>
+              <a:t>cài</a:t>
             </a:r>
             <a:r>
               <a:rPr lang="en-US" dirty="0" smtClean="0"/>
@@ -28178,7 +29228,7 @@
             </a:r>
             <a:r>
               <a:rPr lang="en-US" dirty="0" err="1" smtClean="0"/>
-              <a:t>dụng</a:t>
+              <a:t>đặt</a:t>
             </a:r>
             <a:endParaRPr lang="en-US" dirty="0"/>
           </a:p>
@@ -28206,7 +29256,7 @@
           <a:p>
             <a:r>
               <a:rPr lang="en-US" dirty="0" err="1" smtClean="0"/>
-              <a:t>Các</a:t>
+              <a:t>Sử</a:t>
             </a:r>
             <a:r>
               <a:rPr lang="en-US" dirty="0" smtClean="0"/>
@@ -28214,7 +29264,15 @@
             </a:r>
             <a:r>
               <a:rPr lang="en-US" dirty="0" err="1" smtClean="0"/>
-              <a:t>công</a:t>
+              <a:t>dụng</a:t>
+            </a:r>
+            <a:r>
+              <a:rPr lang="en-US" dirty="0" smtClean="0"/>
+              <a:t> hosting </a:t>
+            </a:r>
+            <a:r>
+              <a:rPr lang="en-US" dirty="0" err="1" smtClean="0"/>
+              <a:t>của</a:t>
             </a:r>
             <a:r>
               <a:rPr lang="en-US" dirty="0" smtClean="0"/>
@@ -28222,67 +29280,11 @@
             </a:r>
             <a:r>
               <a:rPr lang="en-US" dirty="0" err="1" smtClean="0"/>
-              <a:t>nghệ</a:t>
+              <a:t>heroku</a:t>
             </a:r>
             <a:r>
               <a:rPr lang="en-US" dirty="0" smtClean="0"/>
-              <a:t> </a:t>
-            </a:r>
-            <a:r>
-              <a:rPr lang="en-US" dirty="0" err="1" smtClean="0"/>
-              <a:t>sử</a:t>
-            </a:r>
-            <a:r>
-              <a:rPr lang="en-US" dirty="0" smtClean="0"/>
-              <a:t> </a:t>
-            </a:r>
-            <a:r>
-              <a:rPr lang="en-US" dirty="0" err="1" smtClean="0"/>
-              <a:t>dụng</a:t>
-            </a:r>
-            <a:r>
-              <a:rPr lang="en-US" dirty="0" smtClean="0"/>
-              <a:t> </a:t>
-            </a:r>
-            <a:r>
-              <a:rPr lang="en-US" dirty="0" err="1" smtClean="0"/>
-              <a:t>để</a:t>
-            </a:r>
-            <a:r>
-              <a:rPr lang="en-US" dirty="0" smtClean="0"/>
-              <a:t> </a:t>
-            </a:r>
-            <a:r>
-              <a:rPr lang="en-US" dirty="0" err="1" smtClean="0"/>
-              <a:t>xây</a:t>
-            </a:r>
-            <a:r>
-              <a:rPr lang="en-US" dirty="0" smtClean="0"/>
-              <a:t> </a:t>
-            </a:r>
-            <a:r>
-              <a:rPr lang="en-US" dirty="0" err="1" smtClean="0"/>
-              <a:t>dựng</a:t>
-            </a:r>
-            <a:r>
-              <a:rPr lang="en-US" dirty="0" smtClean="0"/>
-              <a:t> </a:t>
-            </a:r>
-            <a:r>
-              <a:rPr lang="en-US" dirty="0" err="1" smtClean="0"/>
-              <a:t>phần</a:t>
-            </a:r>
-            <a:r>
-              <a:rPr lang="en-US" dirty="0" smtClean="0"/>
-              <a:t> </a:t>
-            </a:r>
-            <a:r>
-              <a:rPr lang="en-US" dirty="0" err="1" smtClean="0"/>
-              <a:t>mền</a:t>
-            </a:r>
-            <a:r>
-              <a:rPr lang="en-US" dirty="0" smtClean="0"/>
-              <a:t>.</a:t>
+              <a:t> .</a:t>
             </a:r>
             <a:endParaRPr lang="en-US" dirty="0"/>
           </a:p>
@@ -28868,6 +29870,2596 @@
       </p:grpSpPr>
       <p:sp>
         <p:nvSpPr>
+          <p:cNvPr id="580" name="Google Shape;580;p20"/>
+          <p:cNvSpPr txBox="1">
+            <a:spLocks noGrp="1"/>
+          </p:cNvSpPr>
+          <p:nvPr>
+            <p:ph type="sldNum" idx="12"/>
+          </p:nvPr>
+        </p:nvSpPr>
+        <p:spPr>
+          <a:prstGeom prst="rect">
+            <a:avLst/>
+          </a:prstGeom>
+        </p:spPr>
+        <p:txBody>
+          <a:bodyPr spcFirstLastPara="1" wrap="square" lIns="0" tIns="0" rIns="0" bIns="0" anchor="ctr" anchorCtr="0">
+            <a:noAutofit/>
+          </a:bodyPr>
+          <a:lstStyle/>
+          <a:p>
+            <a:pPr marL="0" lvl="0" indent="0" algn="ctr" rtl="0">
+              <a:spcBef>
+                <a:spcPts val="0"/>
+              </a:spcBef>
+              <a:spcAft>
+                <a:spcPts val="0"/>
+              </a:spcAft>
+              <a:buNone/>
+            </a:pPr>
+            <a:fld id="{00000000-1234-1234-1234-123412341234}" type="slidenum">
+              <a:rPr lang="en"/>
+              <a:t>40</a:t>
+            </a:fld>
+            <a:endParaRPr/>
+          </a:p>
+        </p:txBody>
+      </p:sp>
+      <p:sp>
+        <p:nvSpPr>
+          <p:cNvPr id="2" name="TextBox 1"/>
+          <p:cNvSpPr txBox="1"/>
+          <p:nvPr/>
+        </p:nvSpPr>
+        <p:spPr>
+          <a:xfrm>
+            <a:off x="899592" y="1851670"/>
+            <a:ext cx="2284600" cy="523220"/>
+          </a:xfrm>
+          <a:prstGeom prst="rect">
+            <a:avLst/>
+          </a:prstGeom>
+          <a:noFill/>
+        </p:spPr>
+        <p:txBody>
+          <a:bodyPr wrap="none" rtlCol="0">
+            <a:spAutoFit/>
+          </a:bodyPr>
+          <a:lstStyle/>
+          <a:p>
+            <a:r>
+              <a:rPr lang="en-US" dirty="0"/>
+              <a:t>B1 : </a:t>
+            </a:r>
+            <a:r>
+              <a:rPr lang="en-US" dirty="0" err="1"/>
+              <a:t>Cài</a:t>
+            </a:r>
+            <a:r>
+              <a:rPr lang="en-US" dirty="0"/>
+              <a:t> </a:t>
+            </a:r>
+            <a:r>
+              <a:rPr lang="en-US" dirty="0" err="1"/>
+              <a:t>đặt</a:t>
+            </a:r>
+            <a:r>
+              <a:rPr lang="en-US" dirty="0"/>
+              <a:t> app </a:t>
+            </a:r>
+            <a:r>
+              <a:rPr lang="en-US" dirty="0" err="1"/>
+              <a:t>heroku</a:t>
+            </a:r>
+            <a:r>
+              <a:rPr lang="en-US" dirty="0"/>
+              <a:t> cli</a:t>
+            </a:r>
+          </a:p>
+          <a:p>
+            <a:endParaRPr lang="en-US" dirty="0"/>
+          </a:p>
+        </p:txBody>
+      </p:sp>
+      <p:pic>
+        <p:nvPicPr>
+          <p:cNvPr id="6" name="Picture 5"/>
+          <p:cNvPicPr/>
+          <p:nvPr/>
+        </p:nvPicPr>
+        <p:blipFill>
+          <a:blip r:embed="rId3" cstate="print">
+            <a:extLst>
+              <a:ext uri="{28A0092B-C50C-407E-A947-70E740481C1C}">
+                <a14:useLocalDpi xmlns:a14="http://schemas.microsoft.com/office/drawing/2010/main" val="0"/>
+              </a:ext>
+            </a:extLst>
+          </a:blip>
+          <a:stretch>
+            <a:fillRect/>
+          </a:stretch>
+        </p:blipFill>
+        <p:spPr>
+          <a:xfrm>
+            <a:off x="1763688" y="2374890"/>
+            <a:ext cx="4965065" cy="2304256"/>
+          </a:xfrm>
+          <a:prstGeom prst="rect">
+            <a:avLst/>
+          </a:prstGeom>
+          <a:effectLst>
+            <a:outerShdw blurRad="50800" dist="50800" dir="5400000" algn="ctr" rotWithShape="0">
+              <a:schemeClr val="bg2">
+                <a:lumMod val="90000"/>
+              </a:schemeClr>
+            </a:outerShdw>
+          </a:effectLst>
+        </p:spPr>
+      </p:pic>
+    </p:spTree>
+    <p:extLst>
+      <p:ext uri="{BB962C8B-B14F-4D97-AF65-F5344CB8AC3E}">
+        <p14:creationId xmlns:p14="http://schemas.microsoft.com/office/powerpoint/2010/main" val="3942815994"/>
+      </p:ext>
+    </p:extLst>
+  </p:cSld>
+  <p:clrMapOvr>
+    <a:masterClrMapping/>
+  </p:clrMapOvr>
+  <p:timing>
+    <p:tnLst>
+      <p:par>
+        <p:cTn id="1" dur="indefinite" restart="never" nodeType="tmRoot"/>
+      </p:par>
+    </p:tnLst>
+  </p:timing>
+</p:sld>
+</file>
+
+<file path=ppt/slides/slide41.xml><?xml version="1.0" encoding="utf-8"?>
+<p:sld xmlns:a="http://schemas.openxmlformats.org/drawingml/2006/main" xmlns:r="http://schemas.openxmlformats.org/officeDocument/2006/relationships" xmlns:p="http://schemas.openxmlformats.org/presentationml/2006/main">
+  <p:cSld>
+    <p:spTree>
+      <p:nvGrpSpPr>
+        <p:cNvPr id="1" name="Shape 576"/>
+        <p:cNvGrpSpPr/>
+        <p:nvPr/>
+      </p:nvGrpSpPr>
+      <p:grpSpPr>
+        <a:xfrm>
+          <a:off x="0" y="0"/>
+          <a:ext cx="0" cy="0"/>
+          <a:chOff x="0" y="0"/>
+          <a:chExt cx="0" cy="0"/>
+        </a:xfrm>
+      </p:grpSpPr>
+      <p:sp>
+        <p:nvSpPr>
+          <p:cNvPr id="580" name="Google Shape;580;p20"/>
+          <p:cNvSpPr txBox="1">
+            <a:spLocks noGrp="1"/>
+          </p:cNvSpPr>
+          <p:nvPr>
+            <p:ph type="sldNum" idx="12"/>
+          </p:nvPr>
+        </p:nvSpPr>
+        <p:spPr>
+          <a:prstGeom prst="rect">
+            <a:avLst/>
+          </a:prstGeom>
+        </p:spPr>
+        <p:txBody>
+          <a:bodyPr spcFirstLastPara="1" wrap="square" lIns="0" tIns="0" rIns="0" bIns="0" anchor="ctr" anchorCtr="0">
+            <a:noAutofit/>
+          </a:bodyPr>
+          <a:lstStyle/>
+          <a:p>
+            <a:pPr marL="0" lvl="0" indent="0" algn="ctr" rtl="0">
+              <a:spcBef>
+                <a:spcPts val="0"/>
+              </a:spcBef>
+              <a:spcAft>
+                <a:spcPts val="0"/>
+              </a:spcAft>
+              <a:buNone/>
+            </a:pPr>
+            <a:fld id="{00000000-1234-1234-1234-123412341234}" type="slidenum">
+              <a:rPr lang="en"/>
+              <a:t>41</a:t>
+            </a:fld>
+            <a:endParaRPr/>
+          </a:p>
+        </p:txBody>
+      </p:sp>
+      <p:sp>
+        <p:nvSpPr>
+          <p:cNvPr id="2" name="TextBox 1"/>
+          <p:cNvSpPr txBox="1"/>
+          <p:nvPr/>
+        </p:nvSpPr>
+        <p:spPr>
+          <a:xfrm>
+            <a:off x="899592" y="1851670"/>
+            <a:ext cx="2890535" cy="523220"/>
+          </a:xfrm>
+          <a:prstGeom prst="rect">
+            <a:avLst/>
+          </a:prstGeom>
+          <a:noFill/>
+        </p:spPr>
+        <p:txBody>
+          <a:bodyPr wrap="none" rtlCol="0">
+            <a:spAutoFit/>
+          </a:bodyPr>
+          <a:lstStyle/>
+          <a:p>
+            <a:r>
+              <a:rPr lang="en-US" dirty="0"/>
+              <a:t>B2: </a:t>
+            </a:r>
+            <a:r>
+              <a:rPr lang="en-US" dirty="0" err="1"/>
+              <a:t>Truy</a:t>
+            </a:r>
+            <a:r>
+              <a:rPr lang="en-US" dirty="0"/>
+              <a:t> </a:t>
+            </a:r>
+            <a:r>
+              <a:rPr lang="en-US" dirty="0" err="1"/>
+              <a:t>cập</a:t>
+            </a:r>
+            <a:r>
+              <a:rPr lang="en-US" dirty="0"/>
+              <a:t> web site heroku.com</a:t>
+            </a:r>
+          </a:p>
+          <a:p>
+            <a:endParaRPr lang="en-US" dirty="0"/>
+          </a:p>
+        </p:txBody>
+      </p:sp>
+      <p:pic>
+        <p:nvPicPr>
+          <p:cNvPr id="5" name="Picture 4"/>
+          <p:cNvPicPr/>
+          <p:nvPr/>
+        </p:nvPicPr>
+        <p:blipFill>
+          <a:blip r:embed="rId3"/>
+          <a:stretch>
+            <a:fillRect/>
+          </a:stretch>
+        </p:blipFill>
+        <p:spPr>
+          <a:xfrm>
+            <a:off x="1763688" y="2223646"/>
+            <a:ext cx="5467350" cy="2370316"/>
+          </a:xfrm>
+          <a:prstGeom prst="rect">
+            <a:avLst/>
+          </a:prstGeom>
+          <a:effectLst>
+            <a:outerShdw blurRad="50800" dist="50800" dir="5400000" algn="ctr" rotWithShape="0">
+              <a:schemeClr val="bg2">
+                <a:lumMod val="90000"/>
+              </a:schemeClr>
+            </a:outerShdw>
+          </a:effectLst>
+        </p:spPr>
+      </p:pic>
+    </p:spTree>
+    <p:extLst>
+      <p:ext uri="{BB962C8B-B14F-4D97-AF65-F5344CB8AC3E}">
+        <p14:creationId xmlns:p14="http://schemas.microsoft.com/office/powerpoint/2010/main" val="1225242995"/>
+      </p:ext>
+    </p:extLst>
+  </p:cSld>
+  <p:clrMapOvr>
+    <a:masterClrMapping/>
+  </p:clrMapOvr>
+  <p:timing>
+    <p:tnLst>
+      <p:par>
+        <p:cTn id="1" dur="indefinite" restart="never" nodeType="tmRoot"/>
+      </p:par>
+    </p:tnLst>
+  </p:timing>
+</p:sld>
+</file>
+
+<file path=ppt/slides/slide42.xml><?xml version="1.0" encoding="utf-8"?>
+<p:sld xmlns:a="http://schemas.openxmlformats.org/drawingml/2006/main" xmlns:r="http://schemas.openxmlformats.org/officeDocument/2006/relationships" xmlns:p="http://schemas.openxmlformats.org/presentationml/2006/main">
+  <p:cSld>
+    <p:spTree>
+      <p:nvGrpSpPr>
+        <p:cNvPr id="1" name="Shape 576"/>
+        <p:cNvGrpSpPr/>
+        <p:nvPr/>
+      </p:nvGrpSpPr>
+      <p:grpSpPr>
+        <a:xfrm>
+          <a:off x="0" y="0"/>
+          <a:ext cx="0" cy="0"/>
+          <a:chOff x="0" y="0"/>
+          <a:chExt cx="0" cy="0"/>
+        </a:xfrm>
+      </p:grpSpPr>
+      <p:sp>
+        <p:nvSpPr>
+          <p:cNvPr id="580" name="Google Shape;580;p20"/>
+          <p:cNvSpPr txBox="1">
+            <a:spLocks noGrp="1"/>
+          </p:cNvSpPr>
+          <p:nvPr>
+            <p:ph type="sldNum" idx="12"/>
+          </p:nvPr>
+        </p:nvSpPr>
+        <p:spPr>
+          <a:prstGeom prst="rect">
+            <a:avLst/>
+          </a:prstGeom>
+        </p:spPr>
+        <p:txBody>
+          <a:bodyPr spcFirstLastPara="1" wrap="square" lIns="0" tIns="0" rIns="0" bIns="0" anchor="ctr" anchorCtr="0">
+            <a:noAutofit/>
+          </a:bodyPr>
+          <a:lstStyle/>
+          <a:p>
+            <a:pPr marL="0" lvl="0" indent="0" algn="ctr" rtl="0">
+              <a:spcBef>
+                <a:spcPts val="0"/>
+              </a:spcBef>
+              <a:spcAft>
+                <a:spcPts val="0"/>
+              </a:spcAft>
+              <a:buNone/>
+            </a:pPr>
+            <a:fld id="{00000000-1234-1234-1234-123412341234}" type="slidenum">
+              <a:rPr lang="en"/>
+              <a:t>42</a:t>
+            </a:fld>
+            <a:endParaRPr/>
+          </a:p>
+        </p:txBody>
+      </p:sp>
+      <p:sp>
+        <p:nvSpPr>
+          <p:cNvPr id="2" name="TextBox 1"/>
+          <p:cNvSpPr txBox="1"/>
+          <p:nvPr/>
+        </p:nvSpPr>
+        <p:spPr>
+          <a:xfrm>
+            <a:off x="899592" y="1851670"/>
+            <a:ext cx="2879314" cy="523220"/>
+          </a:xfrm>
+          <a:prstGeom prst="rect">
+            <a:avLst/>
+          </a:prstGeom>
+          <a:noFill/>
+        </p:spPr>
+        <p:txBody>
+          <a:bodyPr wrap="none" rtlCol="0">
+            <a:spAutoFit/>
+          </a:bodyPr>
+          <a:lstStyle/>
+          <a:p>
+            <a:r>
+              <a:rPr lang="en-US" dirty="0"/>
+              <a:t>B3: </a:t>
+            </a:r>
+            <a:r>
+              <a:rPr lang="en-US" dirty="0" err="1"/>
+              <a:t>Tạo</a:t>
+            </a:r>
+            <a:r>
+              <a:rPr lang="en-US" dirty="0"/>
+              <a:t> </a:t>
+            </a:r>
+            <a:r>
+              <a:rPr lang="en-US" dirty="0" err="1"/>
+              <a:t>và</a:t>
+            </a:r>
+            <a:r>
+              <a:rPr lang="en-US" dirty="0"/>
+              <a:t> </a:t>
+            </a:r>
+            <a:r>
+              <a:rPr lang="en-US" dirty="0" err="1"/>
+              <a:t>đăng</a:t>
+            </a:r>
+            <a:r>
+              <a:rPr lang="en-US" dirty="0"/>
+              <a:t> </a:t>
+            </a:r>
+            <a:r>
+              <a:rPr lang="en-US" dirty="0" err="1"/>
+              <a:t>nhập</a:t>
+            </a:r>
+            <a:r>
+              <a:rPr lang="en-US" dirty="0"/>
+              <a:t> </a:t>
+            </a:r>
+            <a:r>
+              <a:rPr lang="en-US" dirty="0" err="1"/>
+              <a:t>vào</a:t>
+            </a:r>
+            <a:r>
+              <a:rPr lang="en-US" dirty="0"/>
+              <a:t> </a:t>
+            </a:r>
+            <a:r>
+              <a:rPr lang="en-US" dirty="0" err="1"/>
+              <a:t>heroku</a:t>
+            </a:r>
+            <a:endParaRPr lang="en-US" dirty="0"/>
+          </a:p>
+          <a:p>
+            <a:endParaRPr lang="en-US" dirty="0"/>
+          </a:p>
+        </p:txBody>
+      </p:sp>
+      <p:pic>
+        <p:nvPicPr>
+          <p:cNvPr id="6" name="Picture 5"/>
+          <p:cNvPicPr/>
+          <p:nvPr/>
+        </p:nvPicPr>
+        <p:blipFill>
+          <a:blip r:embed="rId3"/>
+          <a:stretch>
+            <a:fillRect/>
+          </a:stretch>
+        </p:blipFill>
+        <p:spPr>
+          <a:xfrm>
+            <a:off x="1691680" y="2407652"/>
+            <a:ext cx="5226050" cy="2304256"/>
+          </a:xfrm>
+          <a:prstGeom prst="rect">
+            <a:avLst/>
+          </a:prstGeom>
+          <a:effectLst>
+            <a:outerShdw blurRad="50800" dist="50800" dir="5400000" algn="ctr" rotWithShape="0">
+              <a:schemeClr val="bg2">
+                <a:lumMod val="90000"/>
+              </a:schemeClr>
+            </a:outerShdw>
+          </a:effectLst>
+        </p:spPr>
+      </p:pic>
+    </p:spTree>
+    <p:extLst>
+      <p:ext uri="{BB962C8B-B14F-4D97-AF65-F5344CB8AC3E}">
+        <p14:creationId xmlns:p14="http://schemas.microsoft.com/office/powerpoint/2010/main" val="692741814"/>
+      </p:ext>
+    </p:extLst>
+  </p:cSld>
+  <p:clrMapOvr>
+    <a:masterClrMapping/>
+  </p:clrMapOvr>
+  <p:timing>
+    <p:tnLst>
+      <p:par>
+        <p:cTn id="1" dur="indefinite" restart="never" nodeType="tmRoot"/>
+      </p:par>
+    </p:tnLst>
+  </p:timing>
+</p:sld>
+</file>
+
+<file path=ppt/slides/slide43.xml><?xml version="1.0" encoding="utf-8"?>
+<p:sld xmlns:a="http://schemas.openxmlformats.org/drawingml/2006/main" xmlns:r="http://schemas.openxmlformats.org/officeDocument/2006/relationships" xmlns:p="http://schemas.openxmlformats.org/presentationml/2006/main">
+  <p:cSld>
+    <p:spTree>
+      <p:nvGrpSpPr>
+        <p:cNvPr id="1" name="Shape 576"/>
+        <p:cNvGrpSpPr/>
+        <p:nvPr/>
+      </p:nvGrpSpPr>
+      <p:grpSpPr>
+        <a:xfrm>
+          <a:off x="0" y="0"/>
+          <a:ext cx="0" cy="0"/>
+          <a:chOff x="0" y="0"/>
+          <a:chExt cx="0" cy="0"/>
+        </a:xfrm>
+      </p:grpSpPr>
+      <p:sp>
+        <p:nvSpPr>
+          <p:cNvPr id="580" name="Google Shape;580;p20"/>
+          <p:cNvSpPr txBox="1">
+            <a:spLocks noGrp="1"/>
+          </p:cNvSpPr>
+          <p:nvPr>
+            <p:ph type="sldNum" idx="12"/>
+          </p:nvPr>
+        </p:nvSpPr>
+        <p:spPr>
+          <a:prstGeom prst="rect">
+            <a:avLst/>
+          </a:prstGeom>
+        </p:spPr>
+        <p:txBody>
+          <a:bodyPr spcFirstLastPara="1" wrap="square" lIns="0" tIns="0" rIns="0" bIns="0" anchor="ctr" anchorCtr="0">
+            <a:noAutofit/>
+          </a:bodyPr>
+          <a:lstStyle/>
+          <a:p>
+            <a:pPr marL="0" lvl="0" indent="0" algn="ctr" rtl="0">
+              <a:spcBef>
+                <a:spcPts val="0"/>
+              </a:spcBef>
+              <a:spcAft>
+                <a:spcPts val="0"/>
+              </a:spcAft>
+              <a:buNone/>
+            </a:pPr>
+            <a:fld id="{00000000-1234-1234-1234-123412341234}" type="slidenum">
+              <a:rPr lang="en"/>
+              <a:t>43</a:t>
+            </a:fld>
+            <a:endParaRPr/>
+          </a:p>
+        </p:txBody>
+      </p:sp>
+      <p:sp>
+        <p:nvSpPr>
+          <p:cNvPr id="2" name="TextBox 1"/>
+          <p:cNvSpPr txBox="1"/>
+          <p:nvPr/>
+        </p:nvSpPr>
+        <p:spPr>
+          <a:xfrm>
+            <a:off x="899592" y="1851670"/>
+            <a:ext cx="4873450" cy="738664"/>
+          </a:xfrm>
+          <a:prstGeom prst="rect">
+            <a:avLst/>
+          </a:prstGeom>
+          <a:noFill/>
+        </p:spPr>
+        <p:txBody>
+          <a:bodyPr wrap="none" rtlCol="0">
+            <a:spAutoFit/>
+          </a:bodyPr>
+          <a:lstStyle/>
+          <a:p>
+            <a:r>
+              <a:rPr lang="en-US" dirty="0" smtClean="0"/>
+              <a:t>B4</a:t>
+            </a:r>
+            <a:r>
+              <a:rPr lang="en-US" dirty="0"/>
+              <a:t>: </a:t>
+            </a:r>
+            <a:r>
+              <a:rPr lang="en-US" dirty="0" err="1"/>
+              <a:t>Cài</a:t>
+            </a:r>
+            <a:r>
+              <a:rPr lang="en-US" dirty="0"/>
+              <a:t> </a:t>
+            </a:r>
+            <a:r>
+              <a:rPr lang="en-US" dirty="0" err="1"/>
+              <a:t>đặt</a:t>
+            </a:r>
+            <a:r>
+              <a:rPr lang="en-US" dirty="0"/>
+              <a:t> </a:t>
+            </a:r>
+            <a:r>
+              <a:rPr lang="en-US" dirty="0" err="1"/>
+              <a:t>môi</a:t>
+            </a:r>
+            <a:r>
+              <a:rPr lang="en-US" dirty="0"/>
+              <a:t> </a:t>
+            </a:r>
+            <a:r>
+              <a:rPr lang="en-US" dirty="0" err="1"/>
+              <a:t>trường</a:t>
+            </a:r>
+            <a:r>
+              <a:rPr lang="en-US" dirty="0"/>
+              <a:t> </a:t>
+            </a:r>
+            <a:r>
+              <a:rPr lang="en-US" dirty="0" err="1"/>
+              <a:t>C</a:t>
+            </a:r>
+            <a:r>
+              <a:rPr lang="en-US" dirty="0" err="1" smtClean="0"/>
+              <a:t>hỉ</a:t>
+            </a:r>
+            <a:r>
+              <a:rPr lang="en-US" dirty="0" smtClean="0"/>
+              <a:t> </a:t>
+            </a:r>
+            <a:r>
+              <a:rPr lang="en-US" dirty="0" err="1"/>
+              <a:t>cần</a:t>
+            </a:r>
+            <a:r>
+              <a:rPr lang="en-US" dirty="0"/>
+              <a:t> </a:t>
+            </a:r>
+            <a:r>
+              <a:rPr lang="en-US" dirty="0" err="1"/>
+              <a:t>dùng</a:t>
+            </a:r>
+            <a:r>
+              <a:rPr lang="en-US" dirty="0"/>
+              <a:t> </a:t>
+            </a:r>
+            <a:r>
+              <a:rPr lang="en-US" dirty="0" err="1"/>
+              <a:t>cho</a:t>
+            </a:r>
+            <a:r>
+              <a:rPr lang="en-US" dirty="0"/>
+              <a:t> </a:t>
+            </a:r>
+            <a:r>
+              <a:rPr lang="en-US" dirty="0" err="1"/>
+              <a:t>lần</a:t>
+            </a:r>
+            <a:r>
+              <a:rPr lang="en-US" dirty="0"/>
+              <a:t> </a:t>
+            </a:r>
+            <a:r>
+              <a:rPr lang="en-US" dirty="0" err="1"/>
+              <a:t>đầu</a:t>
+            </a:r>
+            <a:r>
+              <a:rPr lang="en-US" dirty="0"/>
+              <a:t> deploy </a:t>
+            </a:r>
+            <a:r>
+              <a:rPr lang="en-US" dirty="0" smtClean="0"/>
+              <a:t>:</a:t>
+            </a:r>
+          </a:p>
+          <a:p>
+            <a:r>
+              <a:rPr lang="en-US" dirty="0" smtClean="0"/>
+              <a:t>          + </a:t>
+            </a:r>
+            <a:r>
+              <a:rPr lang="en-US" dirty="0" err="1" smtClean="0"/>
+              <a:t>Vào</a:t>
+            </a:r>
+            <a:r>
+              <a:rPr lang="en-US" dirty="0" smtClean="0"/>
+              <a:t> </a:t>
+            </a:r>
+            <a:r>
+              <a:rPr lang="en-US" dirty="0" err="1"/>
+              <a:t>cmd</a:t>
+            </a:r>
+            <a:r>
+              <a:rPr lang="en-US" dirty="0"/>
+              <a:t> </a:t>
+            </a:r>
+            <a:r>
+              <a:rPr lang="en-US" dirty="0" err="1"/>
+              <a:t>gõ</a:t>
+            </a:r>
+            <a:r>
+              <a:rPr lang="en-US" dirty="0"/>
+              <a:t> </a:t>
+            </a:r>
+            <a:r>
+              <a:rPr lang="en-US" dirty="0" err="1"/>
+              <a:t>lệnh</a:t>
+            </a:r>
+            <a:r>
+              <a:rPr lang="en-US" dirty="0"/>
+              <a:t> ” </a:t>
+            </a:r>
+            <a:r>
+              <a:rPr lang="en-US" dirty="0" err="1"/>
+              <a:t>heroku</a:t>
+            </a:r>
+            <a:r>
+              <a:rPr lang="en-US" dirty="0"/>
+              <a:t> </a:t>
+            </a:r>
+            <a:r>
+              <a:rPr lang="en-US" dirty="0" err="1"/>
+              <a:t>plugins:install</a:t>
+            </a:r>
+            <a:r>
+              <a:rPr lang="en-US" dirty="0"/>
+              <a:t> java”</a:t>
+            </a:r>
+          </a:p>
+          <a:p>
+            <a:endParaRPr lang="en-US" dirty="0"/>
+          </a:p>
+        </p:txBody>
+      </p:sp>
+      <p:sp>
+        <p:nvSpPr>
+          <p:cNvPr id="3" name="TextBox 2"/>
+          <p:cNvSpPr txBox="1"/>
+          <p:nvPr/>
+        </p:nvSpPr>
+        <p:spPr>
+          <a:xfrm>
+            <a:off x="971599" y="2734110"/>
+            <a:ext cx="3207929" cy="307777"/>
+          </a:xfrm>
+          <a:prstGeom prst="rect">
+            <a:avLst/>
+          </a:prstGeom>
+          <a:noFill/>
+        </p:spPr>
+        <p:txBody>
+          <a:bodyPr wrap="none" rtlCol="0">
+            <a:spAutoFit/>
+          </a:bodyPr>
+          <a:lstStyle/>
+          <a:p>
+            <a:r>
+              <a:rPr lang="en-US" dirty="0"/>
+              <a:t>B5: </a:t>
+            </a:r>
+            <a:r>
+              <a:rPr lang="en-US" dirty="0" err="1"/>
+              <a:t>Đăng</a:t>
+            </a:r>
+            <a:r>
+              <a:rPr lang="en-US" dirty="0"/>
+              <a:t> </a:t>
+            </a:r>
+            <a:r>
+              <a:rPr lang="en-US" dirty="0" err="1"/>
+              <a:t>nhập</a:t>
+            </a:r>
+            <a:r>
+              <a:rPr lang="en-US" dirty="0"/>
+              <a:t>  </a:t>
+            </a:r>
+            <a:r>
+              <a:rPr lang="en-US" dirty="0" err="1"/>
+              <a:t>gõ</a:t>
+            </a:r>
+            <a:r>
+              <a:rPr lang="en-US" dirty="0"/>
+              <a:t> </a:t>
+            </a:r>
+            <a:r>
+              <a:rPr lang="en-US" dirty="0" err="1"/>
+              <a:t>lệnh</a:t>
+            </a:r>
+            <a:r>
+              <a:rPr lang="en-US" dirty="0"/>
+              <a:t> “</a:t>
+            </a:r>
+            <a:r>
+              <a:rPr lang="en-US" dirty="0" err="1"/>
+              <a:t>heroku</a:t>
+            </a:r>
+            <a:r>
+              <a:rPr lang="en-US" dirty="0"/>
+              <a:t> login”</a:t>
+            </a:r>
+          </a:p>
+        </p:txBody>
+      </p:sp>
+      <p:sp>
+        <p:nvSpPr>
+          <p:cNvPr id="4" name="TextBox 3"/>
+          <p:cNvSpPr txBox="1"/>
+          <p:nvPr/>
+        </p:nvSpPr>
+        <p:spPr>
+          <a:xfrm>
+            <a:off x="1115616" y="3651870"/>
+            <a:ext cx="4514377" cy="523220"/>
+          </a:xfrm>
+          <a:prstGeom prst="rect">
+            <a:avLst/>
+          </a:prstGeom>
+          <a:noFill/>
+        </p:spPr>
+        <p:txBody>
+          <a:bodyPr wrap="none" rtlCol="0">
+            <a:spAutoFit/>
+          </a:bodyPr>
+          <a:lstStyle/>
+          <a:p>
+            <a:r>
+              <a:rPr lang="en-US" dirty="0"/>
+              <a:t>B6 : </a:t>
+            </a:r>
+            <a:r>
+              <a:rPr lang="en-US" dirty="0" err="1"/>
+              <a:t>Tạo</a:t>
+            </a:r>
+            <a:r>
+              <a:rPr lang="en-US" dirty="0"/>
+              <a:t> app </a:t>
+            </a:r>
+            <a:r>
+              <a:rPr lang="en-US" dirty="0" err="1"/>
+              <a:t>mới</a:t>
+            </a:r>
+            <a:r>
+              <a:rPr lang="en-US" dirty="0"/>
+              <a:t> </a:t>
+            </a:r>
+            <a:r>
+              <a:rPr lang="en-US" dirty="0" err="1"/>
+              <a:t>với</a:t>
+            </a:r>
+            <a:r>
+              <a:rPr lang="en-US" dirty="0"/>
+              <a:t> </a:t>
+            </a:r>
+            <a:r>
+              <a:rPr lang="en-US" dirty="0" err="1"/>
+              <a:t>lệnh</a:t>
+            </a:r>
+            <a:r>
+              <a:rPr lang="en-US" dirty="0"/>
+              <a:t> “</a:t>
+            </a:r>
+            <a:r>
+              <a:rPr lang="en-US" dirty="0" err="1"/>
+              <a:t>heroku</a:t>
+            </a:r>
+            <a:r>
+              <a:rPr lang="en-US" dirty="0"/>
+              <a:t> create </a:t>
+            </a:r>
+            <a:r>
+              <a:rPr lang="en-US" dirty="0" smtClean="0"/>
+              <a:t>&lt;</a:t>
+            </a:r>
+            <a:r>
+              <a:rPr lang="en-US" dirty="0" err="1" smtClean="0"/>
+              <a:t>tên</a:t>
+            </a:r>
+            <a:r>
+              <a:rPr lang="en-US" dirty="0" smtClean="0"/>
+              <a:t> app&gt;” </a:t>
+            </a:r>
+            <a:endParaRPr lang="en-US" dirty="0"/>
+          </a:p>
+          <a:p>
+            <a:endParaRPr lang="en-US" dirty="0"/>
+          </a:p>
+        </p:txBody>
+      </p:sp>
+    </p:spTree>
+    <p:extLst>
+      <p:ext uri="{BB962C8B-B14F-4D97-AF65-F5344CB8AC3E}">
+        <p14:creationId xmlns:p14="http://schemas.microsoft.com/office/powerpoint/2010/main" val="1120227565"/>
+      </p:ext>
+    </p:extLst>
+  </p:cSld>
+  <p:clrMapOvr>
+    <a:masterClrMapping/>
+  </p:clrMapOvr>
+  <p:timing>
+    <p:tnLst>
+      <p:par>
+        <p:cTn id="1" dur="indefinite" restart="never" nodeType="tmRoot"/>
+      </p:par>
+    </p:tnLst>
+  </p:timing>
+</p:sld>
+</file>
+
+<file path=ppt/slides/slide44.xml><?xml version="1.0" encoding="utf-8"?>
+<p:sld xmlns:a="http://schemas.openxmlformats.org/drawingml/2006/main" xmlns:r="http://schemas.openxmlformats.org/officeDocument/2006/relationships" xmlns:p="http://schemas.openxmlformats.org/presentationml/2006/main">
+  <p:cSld>
+    <p:spTree>
+      <p:nvGrpSpPr>
+        <p:cNvPr id="1" name="Shape 576"/>
+        <p:cNvGrpSpPr/>
+        <p:nvPr/>
+      </p:nvGrpSpPr>
+      <p:grpSpPr>
+        <a:xfrm>
+          <a:off x="0" y="0"/>
+          <a:ext cx="0" cy="0"/>
+          <a:chOff x="0" y="0"/>
+          <a:chExt cx="0" cy="0"/>
+        </a:xfrm>
+      </p:grpSpPr>
+      <p:sp>
+        <p:nvSpPr>
+          <p:cNvPr id="580" name="Google Shape;580;p20"/>
+          <p:cNvSpPr txBox="1">
+            <a:spLocks noGrp="1"/>
+          </p:cNvSpPr>
+          <p:nvPr>
+            <p:ph type="sldNum" idx="12"/>
+          </p:nvPr>
+        </p:nvSpPr>
+        <p:spPr>
+          <a:prstGeom prst="rect">
+            <a:avLst/>
+          </a:prstGeom>
+        </p:spPr>
+        <p:txBody>
+          <a:bodyPr spcFirstLastPara="1" wrap="square" lIns="0" tIns="0" rIns="0" bIns="0" anchor="ctr" anchorCtr="0">
+            <a:noAutofit/>
+          </a:bodyPr>
+          <a:lstStyle/>
+          <a:p>
+            <a:pPr marL="0" lvl="0" indent="0" algn="ctr" rtl="0">
+              <a:spcBef>
+                <a:spcPts val="0"/>
+              </a:spcBef>
+              <a:spcAft>
+                <a:spcPts val="0"/>
+              </a:spcAft>
+              <a:buNone/>
+            </a:pPr>
+            <a:fld id="{00000000-1234-1234-1234-123412341234}" type="slidenum">
+              <a:rPr lang="en"/>
+              <a:t>44</a:t>
+            </a:fld>
+            <a:endParaRPr/>
+          </a:p>
+        </p:txBody>
+      </p:sp>
+      <p:sp>
+        <p:nvSpPr>
+          <p:cNvPr id="2" name="TextBox 1"/>
+          <p:cNvSpPr txBox="1"/>
+          <p:nvPr/>
+        </p:nvSpPr>
+        <p:spPr>
+          <a:xfrm>
+            <a:off x="899592" y="1851670"/>
+            <a:ext cx="6340197" cy="523220"/>
+          </a:xfrm>
+          <a:prstGeom prst="rect">
+            <a:avLst/>
+          </a:prstGeom>
+          <a:noFill/>
+        </p:spPr>
+        <p:txBody>
+          <a:bodyPr wrap="none" rtlCol="0">
+            <a:spAutoFit/>
+          </a:bodyPr>
+          <a:lstStyle/>
+          <a:p>
+            <a:r>
+              <a:rPr lang="en-US" dirty="0"/>
+              <a:t>B7: </a:t>
+            </a:r>
+            <a:r>
+              <a:rPr lang="en-US" dirty="0" err="1"/>
+              <a:t>Vào</a:t>
+            </a:r>
+            <a:r>
+              <a:rPr lang="en-US" dirty="0"/>
+              <a:t> website </a:t>
+            </a:r>
+            <a:r>
+              <a:rPr lang="en-US" b="1" u="sng" dirty="0">
+                <a:hlinkClick r:id="rId3"/>
+              </a:rPr>
+              <a:t>https://remotemysql.com/databases.php</a:t>
+            </a:r>
+            <a:r>
+              <a:rPr lang="en-US" b="1" u="sng" dirty="0"/>
+              <a:t>  </a:t>
+            </a:r>
+            <a:r>
+              <a:rPr lang="en-US" dirty="0" err="1"/>
+              <a:t>để</a:t>
+            </a:r>
+            <a:r>
+              <a:rPr lang="en-US" dirty="0"/>
+              <a:t> </a:t>
+            </a:r>
+            <a:r>
+              <a:rPr lang="en-US" dirty="0" err="1"/>
+              <a:t>tạo</a:t>
+            </a:r>
+            <a:r>
+              <a:rPr lang="en-US" dirty="0"/>
+              <a:t> database</a:t>
+            </a:r>
+          </a:p>
+          <a:p>
+            <a:endParaRPr lang="en-US" dirty="0"/>
+          </a:p>
+        </p:txBody>
+      </p:sp>
+      <p:pic>
+        <p:nvPicPr>
+          <p:cNvPr id="6" name="Picture 5"/>
+          <p:cNvPicPr/>
+          <p:nvPr/>
+        </p:nvPicPr>
+        <p:blipFill>
+          <a:blip r:embed="rId4"/>
+          <a:stretch>
+            <a:fillRect/>
+          </a:stretch>
+        </p:blipFill>
+        <p:spPr>
+          <a:xfrm>
+            <a:off x="1905888" y="2211710"/>
+            <a:ext cx="5308600" cy="2245350"/>
+          </a:xfrm>
+          <a:prstGeom prst="rect">
+            <a:avLst/>
+          </a:prstGeom>
+          <a:effectLst>
+            <a:outerShdw blurRad="50800" dist="50800" dir="5400000" algn="ctr" rotWithShape="0">
+              <a:schemeClr val="bg2">
+                <a:lumMod val="90000"/>
+              </a:schemeClr>
+            </a:outerShdw>
+          </a:effectLst>
+        </p:spPr>
+      </p:pic>
+    </p:spTree>
+    <p:extLst>
+      <p:ext uri="{BB962C8B-B14F-4D97-AF65-F5344CB8AC3E}">
+        <p14:creationId xmlns:p14="http://schemas.microsoft.com/office/powerpoint/2010/main" val="4019429284"/>
+      </p:ext>
+    </p:extLst>
+  </p:cSld>
+  <p:clrMapOvr>
+    <a:masterClrMapping/>
+  </p:clrMapOvr>
+  <p:timing>
+    <p:tnLst>
+      <p:par>
+        <p:cTn id="1" dur="indefinite" restart="never" nodeType="tmRoot"/>
+      </p:par>
+    </p:tnLst>
+  </p:timing>
+</p:sld>
+</file>
+
+<file path=ppt/slides/slide45.xml><?xml version="1.0" encoding="utf-8"?>
+<p:sld xmlns:a="http://schemas.openxmlformats.org/drawingml/2006/main" xmlns:r="http://schemas.openxmlformats.org/officeDocument/2006/relationships" xmlns:p="http://schemas.openxmlformats.org/presentationml/2006/main">
+  <p:cSld>
+    <p:spTree>
+      <p:nvGrpSpPr>
+        <p:cNvPr id="1" name="Shape 576"/>
+        <p:cNvGrpSpPr/>
+        <p:nvPr/>
+      </p:nvGrpSpPr>
+      <p:grpSpPr>
+        <a:xfrm>
+          <a:off x="0" y="0"/>
+          <a:ext cx="0" cy="0"/>
+          <a:chOff x="0" y="0"/>
+          <a:chExt cx="0" cy="0"/>
+        </a:xfrm>
+      </p:grpSpPr>
+      <p:sp>
+        <p:nvSpPr>
+          <p:cNvPr id="580" name="Google Shape;580;p20"/>
+          <p:cNvSpPr txBox="1">
+            <a:spLocks noGrp="1"/>
+          </p:cNvSpPr>
+          <p:nvPr>
+            <p:ph type="sldNum" idx="12"/>
+          </p:nvPr>
+        </p:nvSpPr>
+        <p:spPr>
+          <a:prstGeom prst="rect">
+            <a:avLst/>
+          </a:prstGeom>
+        </p:spPr>
+        <p:txBody>
+          <a:bodyPr spcFirstLastPara="1" wrap="square" lIns="0" tIns="0" rIns="0" bIns="0" anchor="ctr" anchorCtr="0">
+            <a:noAutofit/>
+          </a:bodyPr>
+          <a:lstStyle/>
+          <a:p>
+            <a:pPr marL="0" lvl="0" indent="0" algn="ctr" rtl="0">
+              <a:spcBef>
+                <a:spcPts val="0"/>
+              </a:spcBef>
+              <a:spcAft>
+                <a:spcPts val="0"/>
+              </a:spcAft>
+              <a:buNone/>
+            </a:pPr>
+            <a:fld id="{00000000-1234-1234-1234-123412341234}" type="slidenum">
+              <a:rPr lang="en"/>
+              <a:t>45</a:t>
+            </a:fld>
+            <a:endParaRPr/>
+          </a:p>
+        </p:txBody>
+      </p:sp>
+      <p:sp>
+        <p:nvSpPr>
+          <p:cNvPr id="2" name="TextBox 1"/>
+          <p:cNvSpPr txBox="1"/>
+          <p:nvPr/>
+        </p:nvSpPr>
+        <p:spPr>
+          <a:xfrm>
+            <a:off x="899592" y="1851670"/>
+            <a:ext cx="5883342" cy="307777"/>
+          </a:xfrm>
+          <a:prstGeom prst="rect">
+            <a:avLst/>
+          </a:prstGeom>
+          <a:noFill/>
+        </p:spPr>
+        <p:txBody>
+          <a:bodyPr wrap="none" rtlCol="0">
+            <a:spAutoFit/>
+          </a:bodyPr>
+          <a:lstStyle/>
+          <a:p>
+            <a:r>
+              <a:rPr lang="en-US" dirty="0"/>
+              <a:t>B8: </a:t>
+            </a:r>
+            <a:r>
+              <a:rPr lang="en-US" dirty="0" err="1"/>
+              <a:t>Tạo</a:t>
+            </a:r>
+            <a:r>
+              <a:rPr lang="en-US" dirty="0"/>
+              <a:t> database </a:t>
+            </a:r>
+            <a:r>
+              <a:rPr lang="en-US" dirty="0" err="1"/>
+              <a:t>có</a:t>
+            </a:r>
+            <a:r>
+              <a:rPr lang="en-US" dirty="0"/>
+              <a:t> name , </a:t>
+            </a:r>
+            <a:r>
+              <a:rPr lang="en-US" dirty="0" err="1"/>
+              <a:t>user,password</a:t>
+            </a:r>
+            <a:r>
+              <a:rPr lang="en-US" dirty="0"/>
+              <a:t> </a:t>
+            </a:r>
+            <a:r>
+              <a:rPr lang="en-US" dirty="0" err="1"/>
+              <a:t>theo</a:t>
+            </a:r>
+            <a:r>
+              <a:rPr lang="en-US" dirty="0"/>
+              <a:t> </a:t>
+            </a:r>
+            <a:r>
+              <a:rPr lang="en-US" dirty="0" err="1"/>
+              <a:t>ảnh</a:t>
+            </a:r>
+            <a:r>
+              <a:rPr lang="en-US" dirty="0"/>
+              <a:t> </a:t>
+            </a:r>
+            <a:r>
+              <a:rPr lang="en-US" dirty="0" err="1"/>
+              <a:t>để</a:t>
+            </a:r>
+            <a:r>
+              <a:rPr lang="en-US" dirty="0"/>
+              <a:t> </a:t>
+            </a:r>
+            <a:r>
+              <a:rPr lang="en-US" dirty="0" err="1"/>
+              <a:t>có</a:t>
+            </a:r>
+            <a:r>
+              <a:rPr lang="en-US" dirty="0"/>
+              <a:t> </a:t>
+            </a:r>
+            <a:r>
+              <a:rPr lang="en-US" dirty="0" err="1"/>
+              <a:t>thể</a:t>
+            </a:r>
+            <a:r>
+              <a:rPr lang="en-US" dirty="0"/>
+              <a:t> </a:t>
+            </a:r>
+            <a:r>
+              <a:rPr lang="en-US" dirty="0" err="1"/>
+              <a:t>sử</a:t>
+            </a:r>
+            <a:r>
+              <a:rPr lang="en-US" dirty="0"/>
+              <a:t> </a:t>
+            </a:r>
+            <a:r>
+              <a:rPr lang="en-US" dirty="0" err="1" smtClean="0"/>
+              <a:t>dụng</a:t>
+            </a:r>
+            <a:endParaRPr lang="en-US" dirty="0"/>
+          </a:p>
+        </p:txBody>
+      </p:sp>
+      <p:pic>
+        <p:nvPicPr>
+          <p:cNvPr id="5" name="Picture 4"/>
+          <p:cNvPicPr/>
+          <p:nvPr/>
+        </p:nvPicPr>
+        <p:blipFill>
+          <a:blip r:embed="rId3"/>
+          <a:stretch>
+            <a:fillRect/>
+          </a:stretch>
+        </p:blipFill>
+        <p:spPr>
+          <a:xfrm>
+            <a:off x="1734684" y="2283718"/>
+            <a:ext cx="5048250" cy="2232248"/>
+          </a:xfrm>
+          <a:prstGeom prst="rect">
+            <a:avLst/>
+          </a:prstGeom>
+          <a:effectLst>
+            <a:outerShdw blurRad="50800" dist="50800" dir="5400000" algn="ctr" rotWithShape="0">
+              <a:schemeClr val="bg2">
+                <a:lumMod val="90000"/>
+              </a:schemeClr>
+            </a:outerShdw>
+          </a:effectLst>
+        </p:spPr>
+      </p:pic>
+    </p:spTree>
+    <p:extLst>
+      <p:ext uri="{BB962C8B-B14F-4D97-AF65-F5344CB8AC3E}">
+        <p14:creationId xmlns:p14="http://schemas.microsoft.com/office/powerpoint/2010/main" val="2471598704"/>
+      </p:ext>
+    </p:extLst>
+  </p:cSld>
+  <p:clrMapOvr>
+    <a:masterClrMapping/>
+  </p:clrMapOvr>
+  <p:timing>
+    <p:tnLst>
+      <p:par>
+        <p:cTn id="1" dur="indefinite" restart="never" nodeType="tmRoot"/>
+      </p:par>
+    </p:tnLst>
+  </p:timing>
+</p:sld>
+</file>
+
+<file path=ppt/slides/slide46.xml><?xml version="1.0" encoding="utf-8"?>
+<p:sld xmlns:a="http://schemas.openxmlformats.org/drawingml/2006/main" xmlns:r="http://schemas.openxmlformats.org/officeDocument/2006/relationships" xmlns:p="http://schemas.openxmlformats.org/presentationml/2006/main">
+  <p:cSld>
+    <p:spTree>
+      <p:nvGrpSpPr>
+        <p:cNvPr id="1" name="Shape 576"/>
+        <p:cNvGrpSpPr/>
+        <p:nvPr/>
+      </p:nvGrpSpPr>
+      <p:grpSpPr>
+        <a:xfrm>
+          <a:off x="0" y="0"/>
+          <a:ext cx="0" cy="0"/>
+          <a:chOff x="0" y="0"/>
+          <a:chExt cx="0" cy="0"/>
+        </a:xfrm>
+      </p:grpSpPr>
+      <p:sp>
+        <p:nvSpPr>
+          <p:cNvPr id="580" name="Google Shape;580;p20"/>
+          <p:cNvSpPr txBox="1">
+            <a:spLocks noGrp="1"/>
+          </p:cNvSpPr>
+          <p:nvPr>
+            <p:ph type="sldNum" idx="12"/>
+          </p:nvPr>
+        </p:nvSpPr>
+        <p:spPr>
+          <a:prstGeom prst="rect">
+            <a:avLst/>
+          </a:prstGeom>
+        </p:spPr>
+        <p:txBody>
+          <a:bodyPr spcFirstLastPara="1" wrap="square" lIns="0" tIns="0" rIns="0" bIns="0" anchor="ctr" anchorCtr="0">
+            <a:noAutofit/>
+          </a:bodyPr>
+          <a:lstStyle/>
+          <a:p>
+            <a:pPr marL="0" lvl="0" indent="0" algn="ctr" rtl="0">
+              <a:spcBef>
+                <a:spcPts val="0"/>
+              </a:spcBef>
+              <a:spcAft>
+                <a:spcPts val="0"/>
+              </a:spcAft>
+              <a:buNone/>
+            </a:pPr>
+            <a:fld id="{00000000-1234-1234-1234-123412341234}" type="slidenum">
+              <a:rPr lang="en"/>
+              <a:t>46</a:t>
+            </a:fld>
+            <a:endParaRPr/>
+          </a:p>
+        </p:txBody>
+      </p:sp>
+      <p:sp>
+        <p:nvSpPr>
+          <p:cNvPr id="2" name="TextBox 1"/>
+          <p:cNvSpPr txBox="1"/>
+          <p:nvPr/>
+        </p:nvSpPr>
+        <p:spPr>
+          <a:xfrm>
+            <a:off x="899592" y="1851670"/>
+            <a:ext cx="4602542" cy="307777"/>
+          </a:xfrm>
+          <a:prstGeom prst="rect">
+            <a:avLst/>
+          </a:prstGeom>
+          <a:noFill/>
+        </p:spPr>
+        <p:txBody>
+          <a:bodyPr wrap="none" rtlCol="0">
+            <a:spAutoFit/>
+          </a:bodyPr>
+          <a:lstStyle/>
+          <a:p>
+            <a:r>
+              <a:rPr lang="en-US" dirty="0"/>
+              <a:t>B9: </a:t>
+            </a:r>
+            <a:r>
+              <a:rPr lang="en-US" dirty="0" err="1"/>
+              <a:t>Truy</a:t>
+            </a:r>
+            <a:r>
+              <a:rPr lang="en-US" dirty="0"/>
+              <a:t> </a:t>
+            </a:r>
+            <a:r>
+              <a:rPr lang="en-US" dirty="0" err="1"/>
+              <a:t>cập</a:t>
+            </a:r>
+            <a:r>
+              <a:rPr lang="en-US" dirty="0"/>
+              <a:t> </a:t>
+            </a:r>
+            <a:r>
+              <a:rPr lang="en-US" dirty="0" err="1" smtClean="0"/>
+              <a:t>phpMyadmin</a:t>
+            </a:r>
+            <a:r>
+              <a:rPr lang="en-US" dirty="0" smtClean="0"/>
+              <a:t> </a:t>
+            </a:r>
+            <a:r>
+              <a:rPr lang="en-US" dirty="0" err="1" smtClean="0"/>
+              <a:t>để</a:t>
+            </a:r>
+            <a:r>
+              <a:rPr lang="en-US" dirty="0" smtClean="0"/>
+              <a:t> </a:t>
+            </a:r>
+            <a:r>
+              <a:rPr lang="en-US" dirty="0" err="1"/>
+              <a:t>xây</a:t>
+            </a:r>
+            <a:r>
+              <a:rPr lang="en-US" dirty="0"/>
+              <a:t> </a:t>
+            </a:r>
+            <a:r>
+              <a:rPr lang="en-US" dirty="0" err="1"/>
+              <a:t>dựng</a:t>
+            </a:r>
+            <a:r>
+              <a:rPr lang="en-US" dirty="0"/>
+              <a:t> </a:t>
+            </a:r>
+            <a:r>
+              <a:rPr lang="en-US" dirty="0" err="1"/>
+              <a:t>dữ</a:t>
+            </a:r>
+            <a:r>
+              <a:rPr lang="en-US" dirty="0"/>
+              <a:t> </a:t>
+            </a:r>
+            <a:r>
+              <a:rPr lang="en-US" dirty="0" err="1"/>
+              <a:t>liệu</a:t>
+            </a:r>
+            <a:r>
+              <a:rPr lang="en-US" dirty="0"/>
+              <a:t> </a:t>
+            </a:r>
+            <a:r>
+              <a:rPr lang="en-US" dirty="0" err="1"/>
+              <a:t>cho</a:t>
+            </a:r>
+            <a:r>
+              <a:rPr lang="en-US" dirty="0"/>
+              <a:t> app</a:t>
+            </a:r>
+          </a:p>
+        </p:txBody>
+      </p:sp>
+      <p:pic>
+        <p:nvPicPr>
+          <p:cNvPr id="1026" name="Picture 2"/>
+          <p:cNvPicPr>
+            <a:picLocks noChangeAspect="1" noChangeArrowheads="1"/>
+          </p:cNvPicPr>
+          <p:nvPr/>
+        </p:nvPicPr>
+        <p:blipFill>
+          <a:blip r:embed="rId3">
+            <a:extLst>
+              <a:ext uri="{28A0092B-C50C-407E-A947-70E740481C1C}">
+                <a14:useLocalDpi xmlns:a14="http://schemas.microsoft.com/office/drawing/2010/main" val="0"/>
+              </a:ext>
+            </a:extLst>
+          </a:blip>
+          <a:srcRect/>
+          <a:stretch>
+            <a:fillRect/>
+          </a:stretch>
+        </p:blipFill>
+        <p:spPr bwMode="auto">
+          <a:xfrm>
+            <a:off x="1691680" y="2211710"/>
+            <a:ext cx="5394630" cy="2354570"/>
+          </a:xfrm>
+          <a:prstGeom prst="rect">
+            <a:avLst/>
+          </a:prstGeom>
+          <a:noFill/>
+          <a:ln>
+            <a:noFill/>
+          </a:ln>
+          <a:effectLst/>
+          <a:extLst>
+            <a:ext uri="{909E8E84-426E-40DD-AFC4-6F175D3DCCD1}">
+              <a14:hiddenFill xmlns:a14="http://schemas.microsoft.com/office/drawing/2010/main">
+                <a:solidFill>
+                  <a:schemeClr val="accent1"/>
+                </a:solidFill>
+              </a14:hiddenFill>
+            </a:ext>
+            <a:ext uri="{91240B29-F687-4F45-9708-019B960494DF}">
+              <a14:hiddenLine xmlns:a14="http://schemas.microsoft.com/office/drawing/2010/main" w="9525">
+                <a:solidFill>
+                  <a:schemeClr val="tx1"/>
+                </a:solidFill>
+                <a:miter lim="800000"/>
+                <a:headEnd/>
+                <a:tailEnd/>
+              </a14:hiddenLine>
+            </a:ext>
+            <a:ext uri="{AF507438-7753-43E0-B8FC-AC1667EBCBE1}">
+              <a14:hiddenEffects xmlns:a14="http://schemas.microsoft.com/office/drawing/2010/main">
+                <a:effectLst>
+                  <a:outerShdw dist="35921" dir="2700000" algn="ctr" rotWithShape="0">
+                    <a:schemeClr val="bg2"/>
+                  </a:outerShdw>
+                </a:effectLst>
+              </a14:hiddenEffects>
+            </a:ext>
+          </a:extLst>
+        </p:spPr>
+      </p:pic>
+    </p:spTree>
+    <p:extLst>
+      <p:ext uri="{BB962C8B-B14F-4D97-AF65-F5344CB8AC3E}">
+        <p14:creationId xmlns:p14="http://schemas.microsoft.com/office/powerpoint/2010/main" val="912301137"/>
+      </p:ext>
+    </p:extLst>
+  </p:cSld>
+  <p:clrMapOvr>
+    <a:masterClrMapping/>
+  </p:clrMapOvr>
+  <p:timing>
+    <p:tnLst>
+      <p:par>
+        <p:cTn id="1" dur="indefinite" restart="never" nodeType="tmRoot"/>
+      </p:par>
+    </p:tnLst>
+  </p:timing>
+</p:sld>
+</file>
+
+<file path=ppt/slides/slide47.xml><?xml version="1.0" encoding="utf-8"?>
+<p:sld xmlns:a="http://schemas.openxmlformats.org/drawingml/2006/main" xmlns:r="http://schemas.openxmlformats.org/officeDocument/2006/relationships" xmlns:p="http://schemas.openxmlformats.org/presentationml/2006/main">
+  <p:cSld>
+    <p:spTree>
+      <p:nvGrpSpPr>
+        <p:cNvPr id="1" name="Shape 576"/>
+        <p:cNvGrpSpPr/>
+        <p:nvPr/>
+      </p:nvGrpSpPr>
+      <p:grpSpPr>
+        <a:xfrm>
+          <a:off x="0" y="0"/>
+          <a:ext cx="0" cy="0"/>
+          <a:chOff x="0" y="0"/>
+          <a:chExt cx="0" cy="0"/>
+        </a:xfrm>
+      </p:grpSpPr>
+      <p:sp>
+        <p:nvSpPr>
+          <p:cNvPr id="580" name="Google Shape;580;p20"/>
+          <p:cNvSpPr txBox="1">
+            <a:spLocks noGrp="1"/>
+          </p:cNvSpPr>
+          <p:nvPr>
+            <p:ph type="sldNum" idx="12"/>
+          </p:nvPr>
+        </p:nvSpPr>
+        <p:spPr>
+          <a:prstGeom prst="rect">
+            <a:avLst/>
+          </a:prstGeom>
+        </p:spPr>
+        <p:txBody>
+          <a:bodyPr spcFirstLastPara="1" wrap="square" lIns="0" tIns="0" rIns="0" bIns="0" anchor="ctr" anchorCtr="0">
+            <a:noAutofit/>
+          </a:bodyPr>
+          <a:lstStyle/>
+          <a:p>
+            <a:pPr marL="0" lvl="0" indent="0" algn="ctr" rtl="0">
+              <a:spcBef>
+                <a:spcPts val="0"/>
+              </a:spcBef>
+              <a:spcAft>
+                <a:spcPts val="0"/>
+              </a:spcAft>
+              <a:buNone/>
+            </a:pPr>
+            <a:fld id="{00000000-1234-1234-1234-123412341234}" type="slidenum">
+              <a:rPr lang="en"/>
+              <a:t>47</a:t>
+            </a:fld>
+            <a:endParaRPr/>
+          </a:p>
+        </p:txBody>
+      </p:sp>
+      <p:sp>
+        <p:nvSpPr>
+          <p:cNvPr id="2" name="TextBox 1"/>
+          <p:cNvSpPr txBox="1"/>
+          <p:nvPr/>
+        </p:nvSpPr>
+        <p:spPr>
+          <a:xfrm>
+            <a:off x="899592" y="1821200"/>
+            <a:ext cx="5913798" cy="523220"/>
+          </a:xfrm>
+          <a:prstGeom prst="rect">
+            <a:avLst/>
+          </a:prstGeom>
+          <a:noFill/>
+        </p:spPr>
+        <p:txBody>
+          <a:bodyPr wrap="none" rtlCol="0">
+            <a:spAutoFit/>
+          </a:bodyPr>
+          <a:lstStyle/>
+          <a:p>
+            <a:r>
+              <a:rPr lang="en-US" dirty="0"/>
+              <a:t>B10 : </a:t>
+            </a:r>
+            <a:r>
+              <a:rPr lang="en-US" dirty="0" err="1"/>
+              <a:t>Xuất</a:t>
+            </a:r>
+            <a:r>
+              <a:rPr lang="en-US" dirty="0"/>
+              <a:t> file war </a:t>
+            </a:r>
+            <a:r>
+              <a:rPr lang="en-US" dirty="0" err="1"/>
+              <a:t>và</a:t>
+            </a:r>
+            <a:r>
+              <a:rPr lang="en-US" dirty="0"/>
+              <a:t> Deploy file </a:t>
+            </a:r>
+            <a:r>
+              <a:rPr lang="en-US" dirty="0" err="1"/>
+              <a:t>ra</a:t>
+            </a:r>
+            <a:r>
+              <a:rPr lang="en-US" dirty="0"/>
+              <a:t> </a:t>
+            </a:r>
+            <a:r>
+              <a:rPr lang="en-US" dirty="0" err="1"/>
+              <a:t>lên</a:t>
+            </a:r>
+            <a:r>
+              <a:rPr lang="en-US" dirty="0"/>
+              <a:t> app </a:t>
+            </a:r>
+            <a:r>
+              <a:rPr lang="en-US" dirty="0" err="1"/>
+              <a:t>với</a:t>
+            </a:r>
+            <a:r>
+              <a:rPr lang="en-US" dirty="0"/>
+              <a:t> </a:t>
+            </a:r>
+            <a:r>
+              <a:rPr lang="en-US" dirty="0" err="1"/>
+              <a:t>lệnh</a:t>
+            </a:r>
+            <a:r>
+              <a:rPr lang="en-US" dirty="0"/>
+              <a:t> “</a:t>
+            </a:r>
+            <a:r>
+              <a:rPr lang="en-US" dirty="0" err="1"/>
+              <a:t>heroku</a:t>
+            </a:r>
+            <a:r>
+              <a:rPr lang="en-US" dirty="0"/>
+              <a:t> </a:t>
+            </a:r>
+            <a:r>
+              <a:rPr lang="en-US" dirty="0" err="1"/>
+              <a:t>war:deploy</a:t>
+            </a:r>
+            <a:r>
+              <a:rPr lang="en-US" dirty="0"/>
+              <a:t> </a:t>
+            </a:r>
+            <a:endParaRPr lang="en-US" dirty="0" smtClean="0"/>
+          </a:p>
+          <a:p>
+            <a:r>
+              <a:rPr lang="en-US" dirty="0"/>
+              <a:t>	</a:t>
+            </a:r>
+            <a:r>
+              <a:rPr lang="en-US" dirty="0" smtClean="0"/>
+              <a:t>	 </a:t>
+            </a:r>
+            <a:r>
+              <a:rPr lang="en-US" dirty="0"/>
+              <a:t>&lt;</a:t>
+            </a:r>
+            <a:r>
+              <a:rPr lang="en-US" dirty="0" err="1"/>
+              <a:t>Đường</a:t>
+            </a:r>
+            <a:r>
+              <a:rPr lang="en-US" dirty="0"/>
+              <a:t> </a:t>
+            </a:r>
+            <a:r>
+              <a:rPr lang="en-US" dirty="0" err="1"/>
+              <a:t>dẫn</a:t>
+            </a:r>
+            <a:r>
+              <a:rPr lang="en-US" dirty="0"/>
+              <a:t> </a:t>
+            </a:r>
+            <a:r>
+              <a:rPr lang="en-US" dirty="0" err="1"/>
+              <a:t>đến</a:t>
+            </a:r>
+            <a:r>
+              <a:rPr lang="en-US" dirty="0"/>
+              <a:t> file war&gt;  --app  &lt;</a:t>
+            </a:r>
+            <a:r>
+              <a:rPr lang="en-US" dirty="0" err="1"/>
+              <a:t>tên</a:t>
+            </a:r>
+            <a:r>
+              <a:rPr lang="en-US" dirty="0"/>
+              <a:t> app&gt;”</a:t>
+            </a:r>
+          </a:p>
+        </p:txBody>
+      </p:sp>
+      <p:pic>
+        <p:nvPicPr>
+          <p:cNvPr id="5" name="Picture 4"/>
+          <p:cNvPicPr/>
+          <p:nvPr/>
+        </p:nvPicPr>
+        <p:blipFill>
+          <a:blip r:embed="rId3"/>
+          <a:stretch>
+            <a:fillRect/>
+          </a:stretch>
+        </p:blipFill>
+        <p:spPr>
+          <a:xfrm>
+            <a:off x="1835696" y="2344420"/>
+            <a:ext cx="5257800" cy="2037715"/>
+          </a:xfrm>
+          <a:prstGeom prst="rect">
+            <a:avLst/>
+          </a:prstGeom>
+          <a:effectLst>
+            <a:outerShdw blurRad="50800" dist="50800" dir="5400000" algn="ctr" rotWithShape="0">
+              <a:schemeClr val="bg2">
+                <a:lumMod val="90000"/>
+              </a:schemeClr>
+            </a:outerShdw>
+          </a:effectLst>
+        </p:spPr>
+      </p:pic>
+    </p:spTree>
+    <p:extLst>
+      <p:ext uri="{BB962C8B-B14F-4D97-AF65-F5344CB8AC3E}">
+        <p14:creationId xmlns:p14="http://schemas.microsoft.com/office/powerpoint/2010/main" val="3460257269"/>
+      </p:ext>
+    </p:extLst>
+  </p:cSld>
+  <p:clrMapOvr>
+    <a:masterClrMapping/>
+  </p:clrMapOvr>
+  <p:timing>
+    <p:tnLst>
+      <p:par>
+        <p:cTn id="1" dur="indefinite" restart="never" nodeType="tmRoot"/>
+      </p:par>
+    </p:tnLst>
+  </p:timing>
+</p:sld>
+</file>
+
+<file path=ppt/slides/slide48.xml><?xml version="1.0" encoding="utf-8"?>
+<p:sld xmlns:a="http://schemas.openxmlformats.org/drawingml/2006/main" xmlns:r="http://schemas.openxmlformats.org/officeDocument/2006/relationships" xmlns:p="http://schemas.openxmlformats.org/presentationml/2006/main">
+  <p:cSld>
+    <p:spTree>
+      <p:nvGrpSpPr>
+        <p:cNvPr id="1" name="Shape 576"/>
+        <p:cNvGrpSpPr/>
+        <p:nvPr/>
+      </p:nvGrpSpPr>
+      <p:grpSpPr>
+        <a:xfrm>
+          <a:off x="0" y="0"/>
+          <a:ext cx="0" cy="0"/>
+          <a:chOff x="0" y="0"/>
+          <a:chExt cx="0" cy="0"/>
+        </a:xfrm>
+      </p:grpSpPr>
+      <p:sp>
+        <p:nvSpPr>
+          <p:cNvPr id="580" name="Google Shape;580;p20"/>
+          <p:cNvSpPr txBox="1">
+            <a:spLocks noGrp="1"/>
+          </p:cNvSpPr>
+          <p:nvPr>
+            <p:ph type="sldNum" idx="12"/>
+          </p:nvPr>
+        </p:nvSpPr>
+        <p:spPr>
+          <a:prstGeom prst="rect">
+            <a:avLst/>
+          </a:prstGeom>
+        </p:spPr>
+        <p:txBody>
+          <a:bodyPr spcFirstLastPara="1" wrap="square" lIns="0" tIns="0" rIns="0" bIns="0" anchor="ctr" anchorCtr="0">
+            <a:noAutofit/>
+          </a:bodyPr>
+          <a:lstStyle/>
+          <a:p>
+            <a:pPr marL="0" lvl="0" indent="0" algn="ctr" rtl="0">
+              <a:spcBef>
+                <a:spcPts val="0"/>
+              </a:spcBef>
+              <a:spcAft>
+                <a:spcPts val="0"/>
+              </a:spcAft>
+              <a:buNone/>
+            </a:pPr>
+            <a:fld id="{00000000-1234-1234-1234-123412341234}" type="slidenum">
+              <a:rPr lang="en"/>
+              <a:t>48</a:t>
+            </a:fld>
+            <a:endParaRPr/>
+          </a:p>
+        </p:txBody>
+      </p:sp>
+      <p:sp>
+        <p:nvSpPr>
+          <p:cNvPr id="2" name="TextBox 1"/>
+          <p:cNvSpPr txBox="1"/>
+          <p:nvPr/>
+        </p:nvSpPr>
+        <p:spPr>
+          <a:xfrm>
+            <a:off x="899592" y="1821200"/>
+            <a:ext cx="6019597" cy="307777"/>
+          </a:xfrm>
+          <a:prstGeom prst="rect">
+            <a:avLst/>
+          </a:prstGeom>
+          <a:noFill/>
+        </p:spPr>
+        <p:txBody>
+          <a:bodyPr wrap="none" rtlCol="0">
+            <a:spAutoFit/>
+          </a:bodyPr>
+          <a:lstStyle/>
+          <a:p>
+            <a:r>
+              <a:rPr lang="en-US" dirty="0"/>
+              <a:t>B11 : </a:t>
+            </a:r>
+            <a:r>
+              <a:rPr lang="en-US" dirty="0" err="1"/>
+              <a:t>Truy</a:t>
+            </a:r>
+            <a:r>
+              <a:rPr lang="en-US" dirty="0"/>
+              <a:t> </a:t>
+            </a:r>
+            <a:r>
+              <a:rPr lang="en-US" dirty="0" err="1"/>
+              <a:t>cập</a:t>
+            </a:r>
+            <a:r>
+              <a:rPr lang="en-US" dirty="0"/>
+              <a:t> </a:t>
+            </a:r>
+            <a:r>
+              <a:rPr lang="en-US" dirty="0" err="1"/>
+              <a:t>đường</a:t>
+            </a:r>
+            <a:r>
+              <a:rPr lang="en-US" dirty="0"/>
+              <a:t> </a:t>
+            </a:r>
+            <a:r>
+              <a:rPr lang="en-US" dirty="0" err="1"/>
+              <a:t>dẫn</a:t>
+            </a:r>
+            <a:r>
+              <a:rPr lang="en-US" dirty="0"/>
+              <a:t>  </a:t>
+            </a:r>
+            <a:r>
+              <a:rPr lang="en-US" u="sng" dirty="0">
+                <a:hlinkClick r:id="rId3"/>
+              </a:rPr>
+              <a:t>https://tranvandoi.herokuapp.com/</a:t>
+            </a:r>
+            <a:r>
+              <a:rPr lang="en-US" dirty="0"/>
+              <a:t> </a:t>
+            </a:r>
+            <a:r>
+              <a:rPr lang="en-US" dirty="0" err="1"/>
+              <a:t>để</a:t>
+            </a:r>
+            <a:r>
+              <a:rPr lang="en-US" dirty="0"/>
+              <a:t> </a:t>
+            </a:r>
+            <a:r>
+              <a:rPr lang="en-US" dirty="0" err="1"/>
+              <a:t>vào</a:t>
+            </a:r>
+            <a:r>
+              <a:rPr lang="en-US" dirty="0"/>
+              <a:t> app</a:t>
+            </a:r>
+          </a:p>
+        </p:txBody>
+      </p:sp>
+      <p:pic>
+        <p:nvPicPr>
+          <p:cNvPr id="2050" name="Picture 2"/>
+          <p:cNvPicPr>
+            <a:picLocks noChangeAspect="1" noChangeArrowheads="1"/>
+          </p:cNvPicPr>
+          <p:nvPr/>
+        </p:nvPicPr>
+        <p:blipFill>
+          <a:blip r:embed="rId4">
+            <a:extLst>
+              <a:ext uri="{28A0092B-C50C-407E-A947-70E740481C1C}">
+                <a14:useLocalDpi xmlns:a14="http://schemas.microsoft.com/office/drawing/2010/main" val="0"/>
+              </a:ext>
+            </a:extLst>
+          </a:blip>
+          <a:srcRect/>
+          <a:stretch>
+            <a:fillRect/>
+          </a:stretch>
+        </p:blipFill>
+        <p:spPr bwMode="auto">
+          <a:xfrm>
+            <a:off x="1331640" y="2128977"/>
+            <a:ext cx="6192688" cy="2438370"/>
+          </a:xfrm>
+          <a:prstGeom prst="rect">
+            <a:avLst/>
+          </a:prstGeom>
+          <a:noFill/>
+          <a:ln>
+            <a:noFill/>
+          </a:ln>
+          <a:effectLst/>
+          <a:extLst>
+            <a:ext uri="{909E8E84-426E-40DD-AFC4-6F175D3DCCD1}">
+              <a14:hiddenFill xmlns:a14="http://schemas.microsoft.com/office/drawing/2010/main">
+                <a:solidFill>
+                  <a:schemeClr val="accent1"/>
+                </a:solidFill>
+              </a14:hiddenFill>
+            </a:ext>
+            <a:ext uri="{91240B29-F687-4F45-9708-019B960494DF}">
+              <a14:hiddenLine xmlns:a14="http://schemas.microsoft.com/office/drawing/2010/main" w="9525">
+                <a:solidFill>
+                  <a:schemeClr val="tx1"/>
+                </a:solidFill>
+                <a:miter lim="800000"/>
+                <a:headEnd/>
+                <a:tailEnd/>
+              </a14:hiddenLine>
+            </a:ext>
+            <a:ext uri="{AF507438-7753-43E0-B8FC-AC1667EBCBE1}">
+              <a14:hiddenEffects xmlns:a14="http://schemas.microsoft.com/office/drawing/2010/main">
+                <a:effectLst>
+                  <a:outerShdw dist="35921" dir="2700000" algn="ctr" rotWithShape="0">
+                    <a:schemeClr val="bg2"/>
+                  </a:outerShdw>
+                </a:effectLst>
+              </a14:hiddenEffects>
+            </a:ext>
+          </a:extLst>
+        </p:spPr>
+      </p:pic>
+    </p:spTree>
+    <p:extLst>
+      <p:ext uri="{BB962C8B-B14F-4D97-AF65-F5344CB8AC3E}">
+        <p14:creationId xmlns:p14="http://schemas.microsoft.com/office/powerpoint/2010/main" val="10579467"/>
+      </p:ext>
+    </p:extLst>
+  </p:cSld>
+  <p:clrMapOvr>
+    <a:masterClrMapping/>
+  </p:clrMapOvr>
+  <p:timing>
+    <p:tnLst>
+      <p:par>
+        <p:cTn id="1" dur="indefinite" restart="never" nodeType="tmRoot"/>
+      </p:par>
+    </p:tnLst>
+  </p:timing>
+</p:sld>
+</file>
+
+<file path=ppt/slides/slide49.xml><?xml version="1.0" encoding="utf-8"?>
+<p:sld xmlns:a="http://schemas.openxmlformats.org/drawingml/2006/main" xmlns:r="http://schemas.openxmlformats.org/officeDocument/2006/relationships" xmlns:p="http://schemas.openxmlformats.org/presentationml/2006/main">
+  <p:cSld>
+    <p:spTree>
+      <p:nvGrpSpPr>
+        <p:cNvPr id="1" name="Shape 576"/>
+        <p:cNvGrpSpPr/>
+        <p:nvPr/>
+      </p:nvGrpSpPr>
+      <p:grpSpPr>
+        <a:xfrm>
+          <a:off x="0" y="0"/>
+          <a:ext cx="0" cy="0"/>
+          <a:chOff x="0" y="0"/>
+          <a:chExt cx="0" cy="0"/>
+        </a:xfrm>
+      </p:grpSpPr>
+      <p:sp>
+        <p:nvSpPr>
+          <p:cNvPr id="5" name="Title 4"/>
+          <p:cNvSpPr>
+            <a:spLocks noGrp="1"/>
+          </p:cNvSpPr>
+          <p:nvPr>
+            <p:ph type="ctrTitle"/>
+          </p:nvPr>
+        </p:nvSpPr>
+        <p:spPr/>
+        <p:txBody>
+          <a:bodyPr/>
+          <a:lstStyle/>
+          <a:p>
+            <a:r>
+              <a:rPr lang="en-US" dirty="0"/>
+              <a:t>7</a:t>
+            </a:r>
+            <a:r>
+              <a:rPr lang="en-US" dirty="0" smtClean="0"/>
+              <a:t>. </a:t>
+            </a:r>
+            <a:r>
+              <a:rPr lang="en-US" dirty="0" err="1" smtClean="0"/>
+              <a:t>Công</a:t>
+            </a:r>
+            <a:r>
+              <a:rPr lang="en-US" dirty="0" smtClean="0"/>
+              <a:t> </a:t>
+            </a:r>
+            <a:r>
+              <a:rPr lang="en-US" dirty="0" err="1" smtClean="0"/>
+              <a:t>nghệ</a:t>
+            </a:r>
+            <a:r>
+              <a:rPr lang="en-US" dirty="0" smtClean="0"/>
+              <a:t> </a:t>
+            </a:r>
+            <a:r>
+              <a:rPr lang="en-US" dirty="0" err="1" smtClean="0"/>
+              <a:t>áp</a:t>
+            </a:r>
+            <a:r>
+              <a:rPr lang="en-US" dirty="0" smtClean="0"/>
+              <a:t> </a:t>
+            </a:r>
+            <a:r>
+              <a:rPr lang="en-US" dirty="0" err="1" smtClean="0"/>
+              <a:t>dụng</a:t>
+            </a:r>
+            <a:endParaRPr lang="en-US" dirty="0"/>
+          </a:p>
+        </p:txBody>
+      </p:sp>
+      <p:sp>
+        <p:nvSpPr>
+          <p:cNvPr id="6" name="Subtitle 5"/>
+          <p:cNvSpPr>
+            <a:spLocks noGrp="1"/>
+          </p:cNvSpPr>
+          <p:nvPr>
+            <p:ph type="subTitle" idx="1"/>
+          </p:nvPr>
+        </p:nvSpPr>
+        <p:spPr>
+          <a:xfrm>
+            <a:off x="611560" y="2715766"/>
+            <a:ext cx="5497200" cy="379800"/>
+          </a:xfrm>
+        </p:spPr>
+        <p:txBody>
+          <a:bodyPr/>
+          <a:lstStyle/>
+          <a:p>
+            <a:r>
+              <a:rPr lang="en-US" dirty="0" err="1" smtClean="0"/>
+              <a:t>Các</a:t>
+            </a:r>
+            <a:r>
+              <a:rPr lang="en-US" dirty="0" smtClean="0"/>
+              <a:t> </a:t>
+            </a:r>
+            <a:r>
+              <a:rPr lang="en-US" dirty="0" err="1" smtClean="0"/>
+              <a:t>công</a:t>
+            </a:r>
+            <a:r>
+              <a:rPr lang="en-US" dirty="0" smtClean="0"/>
+              <a:t> </a:t>
+            </a:r>
+            <a:r>
+              <a:rPr lang="en-US" dirty="0" err="1" smtClean="0"/>
+              <a:t>nghệ</a:t>
+            </a:r>
+            <a:r>
+              <a:rPr lang="en-US" dirty="0" smtClean="0"/>
+              <a:t> </a:t>
+            </a:r>
+            <a:r>
+              <a:rPr lang="en-US" dirty="0" err="1" smtClean="0"/>
+              <a:t>sử</a:t>
+            </a:r>
+            <a:r>
+              <a:rPr lang="en-US" dirty="0" smtClean="0"/>
+              <a:t> </a:t>
+            </a:r>
+            <a:r>
+              <a:rPr lang="en-US" dirty="0" err="1" smtClean="0"/>
+              <a:t>dụng</a:t>
+            </a:r>
+            <a:r>
+              <a:rPr lang="en-US" dirty="0" smtClean="0"/>
+              <a:t> </a:t>
+            </a:r>
+            <a:r>
+              <a:rPr lang="en-US" dirty="0" err="1" smtClean="0"/>
+              <a:t>để</a:t>
+            </a:r>
+            <a:r>
+              <a:rPr lang="en-US" dirty="0" smtClean="0"/>
+              <a:t> </a:t>
+            </a:r>
+            <a:r>
+              <a:rPr lang="en-US" dirty="0" err="1" smtClean="0"/>
+              <a:t>xây</a:t>
+            </a:r>
+            <a:r>
+              <a:rPr lang="en-US" dirty="0" smtClean="0"/>
+              <a:t> </a:t>
+            </a:r>
+            <a:r>
+              <a:rPr lang="en-US" dirty="0" err="1" smtClean="0"/>
+              <a:t>dựng</a:t>
+            </a:r>
+            <a:r>
+              <a:rPr lang="en-US" dirty="0" smtClean="0"/>
+              <a:t> </a:t>
+            </a:r>
+            <a:r>
+              <a:rPr lang="en-US" dirty="0" err="1" smtClean="0"/>
+              <a:t>phần</a:t>
+            </a:r>
+            <a:r>
+              <a:rPr lang="en-US" dirty="0" smtClean="0"/>
+              <a:t> </a:t>
+            </a:r>
+            <a:r>
+              <a:rPr lang="en-US" dirty="0" err="1" smtClean="0"/>
+              <a:t>mền</a:t>
+            </a:r>
+            <a:r>
+              <a:rPr lang="en-US" dirty="0" smtClean="0"/>
+              <a:t>.</a:t>
+            </a:r>
+            <a:endParaRPr lang="en-US" dirty="0"/>
+          </a:p>
+        </p:txBody>
+      </p:sp>
+      <p:sp>
+        <p:nvSpPr>
+          <p:cNvPr id="580" name="Google Shape;580;p20"/>
+          <p:cNvSpPr txBox="1">
+            <a:spLocks noGrp="1"/>
+          </p:cNvSpPr>
+          <p:nvPr>
+            <p:ph type="sldNum" idx="4294967295"/>
+          </p:nvPr>
+        </p:nvSpPr>
+        <p:spPr>
+          <a:xfrm>
+            <a:off x="8489950" y="4489450"/>
+            <a:ext cx="654050" cy="654050"/>
+          </a:xfrm>
+          <a:prstGeom prst="rect">
+            <a:avLst/>
+          </a:prstGeom>
+        </p:spPr>
+        <p:txBody>
+          <a:bodyPr spcFirstLastPara="1" wrap="square" lIns="0" tIns="0" rIns="0" bIns="0" anchor="ctr" anchorCtr="0">
+            <a:noAutofit/>
+          </a:bodyPr>
+          <a:lstStyle/>
+          <a:p>
+            <a:pPr marL="0" lvl="0" indent="0" algn="ctr" rtl="0">
+              <a:spcBef>
+                <a:spcPts val="0"/>
+              </a:spcBef>
+              <a:spcAft>
+                <a:spcPts val="0"/>
+              </a:spcAft>
+              <a:buNone/>
+            </a:pPr>
+            <a:fld id="{00000000-1234-1234-1234-123412341234}" type="slidenum">
+              <a:rPr lang="en"/>
+              <a:t>49</a:t>
+            </a:fld>
+            <a:endParaRPr/>
+          </a:p>
+        </p:txBody>
+      </p:sp>
+    </p:spTree>
+    <p:extLst>
+      <p:ext uri="{BB962C8B-B14F-4D97-AF65-F5344CB8AC3E}">
+        <p14:creationId xmlns:p14="http://schemas.microsoft.com/office/powerpoint/2010/main" val="2078766817"/>
+      </p:ext>
+    </p:extLst>
+  </p:cSld>
+  <p:clrMapOvr>
+    <a:masterClrMapping/>
+  </p:clrMapOvr>
+</p:sld>
+</file>
+
+<file path=ppt/slides/slide5.xml><?xml version="1.0" encoding="utf-8"?>
+<p:sld xmlns:a="http://schemas.openxmlformats.org/drawingml/2006/main" xmlns:r="http://schemas.openxmlformats.org/officeDocument/2006/relationships" xmlns:p="http://schemas.openxmlformats.org/presentationml/2006/main">
+  <p:cSld>
+    <p:spTree>
+      <p:nvGrpSpPr>
+        <p:cNvPr id="1" name="Shape 529"/>
+        <p:cNvGrpSpPr/>
+        <p:nvPr/>
+      </p:nvGrpSpPr>
+      <p:grpSpPr>
+        <a:xfrm>
+          <a:off x="0" y="0"/>
+          <a:ext cx="0" cy="0"/>
+          <a:chOff x="0" y="0"/>
+          <a:chExt cx="0" cy="0"/>
+        </a:xfrm>
+      </p:grpSpPr>
+      <p:sp>
+        <p:nvSpPr>
+          <p:cNvPr id="530" name="Google Shape;530;p15"/>
+          <p:cNvSpPr txBox="1">
+            <a:spLocks noGrp="1"/>
+          </p:cNvSpPr>
+          <p:nvPr>
+            <p:ph type="ctrTitle"/>
+          </p:nvPr>
+        </p:nvSpPr>
+        <p:spPr>
+          <a:xfrm>
+            <a:off x="611560" y="1779662"/>
+            <a:ext cx="5497200" cy="872700"/>
+          </a:xfrm>
+          <a:prstGeom prst="rect">
+            <a:avLst/>
+          </a:prstGeom>
+        </p:spPr>
+        <p:txBody>
+          <a:bodyPr spcFirstLastPara="1" wrap="square" lIns="0" tIns="0" rIns="0" bIns="0" anchor="b" anchorCtr="0">
+            <a:noAutofit/>
+          </a:bodyPr>
+          <a:lstStyle/>
+          <a:p>
+            <a:pPr marL="0" lvl="0" indent="0" algn="l" rtl="0">
+              <a:spcBef>
+                <a:spcPts val="0"/>
+              </a:spcBef>
+              <a:spcAft>
+                <a:spcPts val="0"/>
+              </a:spcAft>
+              <a:buNone/>
+            </a:pPr>
+            <a:r>
+              <a:rPr lang="en" dirty="0"/>
+              <a:t>1. </a:t>
+            </a:r>
+            <a:r>
+              <a:rPr lang="en" dirty="0" smtClean="0"/>
+              <a:t>Giới thiệu phần mềm</a:t>
+            </a:r>
+            <a:endParaRPr dirty="0"/>
+          </a:p>
+        </p:txBody>
+      </p:sp>
+      <p:sp>
+        <p:nvSpPr>
+          <p:cNvPr id="531" name="Google Shape;531;p15"/>
+          <p:cNvSpPr txBox="1">
+            <a:spLocks noGrp="1"/>
+          </p:cNvSpPr>
+          <p:nvPr>
+            <p:ph type="subTitle" idx="1"/>
+          </p:nvPr>
+        </p:nvSpPr>
+        <p:spPr>
+          <a:xfrm>
+            <a:off x="603425" y="2604674"/>
+            <a:ext cx="5497200" cy="831172"/>
+          </a:xfrm>
+          <a:prstGeom prst="rect">
+            <a:avLst/>
+          </a:prstGeom>
+        </p:spPr>
+        <p:txBody>
+          <a:bodyPr spcFirstLastPara="1" wrap="square" lIns="0" tIns="0" rIns="0" bIns="0" anchor="t" anchorCtr="0">
+            <a:noAutofit/>
+          </a:bodyPr>
+          <a:lstStyle/>
+          <a:p>
+            <a:pPr marL="342900" lvl="0" indent="-342900" algn="l" rtl="0">
+              <a:spcBef>
+                <a:spcPts val="0"/>
+              </a:spcBef>
+              <a:spcAft>
+                <a:spcPts val="0"/>
+              </a:spcAft>
+              <a:buFont typeface="Wingdings" pitchFamily="2" charset="2"/>
+              <a:buChar char="Ø"/>
+            </a:pPr>
+            <a:r>
+              <a:rPr lang="en-US" dirty="0" err="1" smtClean="0">
+                <a:solidFill>
+                  <a:schemeClr val="tx2">
+                    <a:lumMod val="50000"/>
+                  </a:schemeClr>
+                </a:solidFill>
+              </a:rPr>
+              <a:t>Là</a:t>
+            </a:r>
+            <a:r>
+              <a:rPr lang="en-US" dirty="0" smtClean="0">
+                <a:solidFill>
+                  <a:schemeClr val="tx2">
+                    <a:lumMod val="50000"/>
+                  </a:schemeClr>
+                </a:solidFill>
+              </a:rPr>
+              <a:t> </a:t>
+            </a:r>
+            <a:r>
+              <a:rPr lang="en-US" dirty="0" err="1" smtClean="0">
+                <a:solidFill>
+                  <a:schemeClr val="tx2">
+                    <a:lumMod val="50000"/>
+                  </a:schemeClr>
+                </a:solidFill>
+              </a:rPr>
+              <a:t>một</a:t>
+            </a:r>
+            <a:r>
+              <a:rPr lang="en-US" dirty="0" smtClean="0">
+                <a:solidFill>
+                  <a:schemeClr val="tx2">
+                    <a:lumMod val="50000"/>
+                  </a:schemeClr>
+                </a:solidFill>
+              </a:rPr>
+              <a:t> </a:t>
+            </a:r>
+            <a:r>
+              <a:rPr lang="en-US" dirty="0" err="1" smtClean="0">
+                <a:solidFill>
+                  <a:schemeClr val="tx2">
+                    <a:lumMod val="50000"/>
+                  </a:schemeClr>
+                </a:solidFill>
+              </a:rPr>
+              <a:t>phần</a:t>
+            </a:r>
+            <a:r>
+              <a:rPr lang="en-US" dirty="0" smtClean="0">
+                <a:solidFill>
+                  <a:schemeClr val="tx2">
+                    <a:lumMod val="50000"/>
+                  </a:schemeClr>
+                </a:solidFill>
+              </a:rPr>
+              <a:t> </a:t>
+            </a:r>
+            <a:r>
+              <a:rPr lang="en-US" dirty="0" err="1" smtClean="0">
+                <a:solidFill>
+                  <a:schemeClr val="tx2">
+                    <a:lumMod val="50000"/>
+                  </a:schemeClr>
+                </a:solidFill>
+              </a:rPr>
+              <a:t>mềm</a:t>
+            </a:r>
+            <a:r>
+              <a:rPr lang="en-US" dirty="0" smtClean="0">
+                <a:solidFill>
+                  <a:schemeClr val="tx2">
+                    <a:lumMod val="50000"/>
+                  </a:schemeClr>
+                </a:solidFill>
+              </a:rPr>
+              <a:t> </a:t>
+            </a:r>
+            <a:r>
+              <a:rPr lang="en-US" dirty="0" err="1" smtClean="0">
+                <a:solidFill>
+                  <a:schemeClr val="tx2">
+                    <a:lumMod val="50000"/>
+                  </a:schemeClr>
+                </a:solidFill>
+              </a:rPr>
+              <a:t>quản</a:t>
+            </a:r>
+            <a:r>
+              <a:rPr lang="en-US" dirty="0" smtClean="0">
+                <a:solidFill>
+                  <a:schemeClr val="tx2">
+                    <a:lumMod val="50000"/>
+                  </a:schemeClr>
+                </a:solidFill>
+              </a:rPr>
+              <a:t> </a:t>
+            </a:r>
+            <a:r>
+              <a:rPr lang="en-US" dirty="0" err="1" smtClean="0">
+                <a:solidFill>
+                  <a:schemeClr val="tx2">
+                    <a:lumMod val="50000"/>
+                  </a:schemeClr>
+                </a:solidFill>
+              </a:rPr>
+              <a:t>lý</a:t>
+            </a:r>
+            <a:r>
+              <a:rPr lang="en-US" dirty="0" smtClean="0">
+                <a:solidFill>
+                  <a:schemeClr val="tx2">
+                    <a:lumMod val="50000"/>
+                  </a:schemeClr>
+                </a:solidFill>
+              </a:rPr>
+              <a:t> </a:t>
+            </a:r>
+            <a:r>
+              <a:rPr lang="en-US" dirty="0" err="1" smtClean="0">
+                <a:solidFill>
+                  <a:schemeClr val="tx2">
+                    <a:lumMod val="50000"/>
+                  </a:schemeClr>
+                </a:solidFill>
+              </a:rPr>
+              <a:t>giảng</a:t>
+            </a:r>
+            <a:r>
+              <a:rPr lang="en-US" dirty="0" smtClean="0">
+                <a:solidFill>
+                  <a:schemeClr val="tx2">
+                    <a:lumMod val="50000"/>
+                  </a:schemeClr>
+                </a:solidFill>
+              </a:rPr>
+              <a:t> </a:t>
+            </a:r>
+            <a:r>
+              <a:rPr lang="en-US" dirty="0" err="1" smtClean="0">
+                <a:solidFill>
+                  <a:schemeClr val="tx2">
+                    <a:lumMod val="50000"/>
+                  </a:schemeClr>
+                </a:solidFill>
+              </a:rPr>
+              <a:t>viên</a:t>
+            </a:r>
+            <a:r>
+              <a:rPr lang="en-US" dirty="0" smtClean="0">
+                <a:solidFill>
+                  <a:schemeClr val="tx2">
+                    <a:lumMod val="50000"/>
+                  </a:schemeClr>
+                </a:solidFill>
+              </a:rPr>
+              <a:t> </a:t>
+            </a:r>
+            <a:r>
+              <a:rPr lang="en-US" dirty="0" err="1" smtClean="0">
+                <a:solidFill>
+                  <a:schemeClr val="tx2">
+                    <a:lumMod val="50000"/>
+                  </a:schemeClr>
+                </a:solidFill>
+              </a:rPr>
+              <a:t>của</a:t>
+            </a:r>
+            <a:r>
+              <a:rPr lang="en-US" dirty="0" smtClean="0">
+                <a:solidFill>
+                  <a:schemeClr val="tx2">
+                    <a:lumMod val="50000"/>
+                  </a:schemeClr>
+                </a:solidFill>
+              </a:rPr>
+              <a:t> </a:t>
+            </a:r>
+            <a:r>
+              <a:rPr lang="en-US" dirty="0" err="1" smtClean="0">
+                <a:solidFill>
+                  <a:schemeClr val="tx2">
+                    <a:lumMod val="50000"/>
+                  </a:schemeClr>
+                </a:solidFill>
+              </a:rPr>
+              <a:t>phòng</a:t>
+            </a:r>
+            <a:r>
+              <a:rPr lang="en-US" dirty="0" smtClean="0">
+                <a:solidFill>
+                  <a:schemeClr val="tx2">
+                    <a:lumMod val="50000"/>
+                  </a:schemeClr>
+                </a:solidFill>
+              </a:rPr>
+              <a:t> </a:t>
+            </a:r>
+            <a:r>
+              <a:rPr lang="en-US" dirty="0" err="1" smtClean="0">
+                <a:solidFill>
+                  <a:schemeClr val="tx2">
+                    <a:lumMod val="50000"/>
+                  </a:schemeClr>
+                </a:solidFill>
+              </a:rPr>
+              <a:t>giáo</a:t>
+            </a:r>
+            <a:r>
+              <a:rPr lang="en-US" dirty="0" smtClean="0">
+                <a:solidFill>
+                  <a:schemeClr val="tx2">
+                    <a:lumMod val="50000"/>
+                  </a:schemeClr>
+                </a:solidFill>
+              </a:rPr>
+              <a:t> </a:t>
+            </a:r>
+            <a:r>
+              <a:rPr lang="en-US" dirty="0" err="1" smtClean="0">
+                <a:solidFill>
+                  <a:schemeClr val="tx2">
+                    <a:lumMod val="50000"/>
+                  </a:schemeClr>
+                </a:solidFill>
+              </a:rPr>
+              <a:t>vụ</a:t>
+            </a:r>
+            <a:r>
+              <a:rPr lang="en-US" dirty="0" smtClean="0">
+                <a:solidFill>
+                  <a:schemeClr val="tx2">
+                    <a:lumMod val="50000"/>
+                  </a:schemeClr>
+                </a:solidFill>
+              </a:rPr>
+              <a:t>.</a:t>
+            </a:r>
+            <a:endParaRPr dirty="0">
+              <a:solidFill>
+                <a:schemeClr val="tx2">
+                  <a:lumMod val="50000"/>
+                </a:schemeClr>
+              </a:solidFill>
+            </a:endParaRPr>
+          </a:p>
+        </p:txBody>
+      </p:sp>
+    </p:spTree>
+  </p:cSld>
+  <p:clrMapOvr>
+    <a:masterClrMapping/>
+  </p:clrMapOvr>
+  <p:timing>
+    <p:tnLst>
+      <p:par>
+        <p:cTn id="1" dur="indefinite" restart="never" nodeType="tmRoot"/>
+      </p:par>
+    </p:tnLst>
+  </p:timing>
+</p:sld>
+</file>
+
+<file path=ppt/slides/slide50.xml><?xml version="1.0" encoding="utf-8"?>
+<p:sld xmlns:a="http://schemas.openxmlformats.org/drawingml/2006/main" xmlns:r="http://schemas.openxmlformats.org/officeDocument/2006/relationships" xmlns:p="http://schemas.openxmlformats.org/presentationml/2006/main">
+  <p:cSld>
+    <p:spTree>
+      <p:nvGrpSpPr>
+        <p:cNvPr id="1" name="Shape 576"/>
+        <p:cNvGrpSpPr/>
+        <p:nvPr/>
+      </p:nvGrpSpPr>
+      <p:grpSpPr>
+        <a:xfrm>
+          <a:off x="0" y="0"/>
+          <a:ext cx="0" cy="0"/>
+          <a:chOff x="0" y="0"/>
+          <a:chExt cx="0" cy="0"/>
+        </a:xfrm>
+      </p:grpSpPr>
+      <p:sp>
+        <p:nvSpPr>
           <p:cNvPr id="9" name="Title 8"/>
           <p:cNvSpPr>
             <a:spLocks noGrp="1"/>
@@ -28940,6 +32532,21 @@
               <a:rPr lang="en-US" dirty="0" smtClean="0"/>
               <a:t> </a:t>
             </a:r>
+            <a:r>
+              <a:rPr lang="en-US" dirty="0" smtClean="0"/>
+              <a:t>JSP</a:t>
+            </a:r>
+          </a:p>
+          <a:p>
+            <a:r>
+              <a:rPr lang="en-US" dirty="0" smtClean="0"/>
+              <a:t>Hosting </a:t>
+            </a:r>
+            <a:r>
+              <a:rPr lang="en-US" dirty="0" err="1" smtClean="0"/>
+              <a:t>heroku</a:t>
+            </a:r>
+            <a:endParaRPr lang="en-US" dirty="0" smtClean="0"/>
           </a:p>
           <a:p>
             <a:endParaRPr lang="en-US" dirty="0"/>
@@ -28978,7 +32585,7 @@
             </a:pPr>
             <a:fld id="{00000000-1234-1234-1234-123412341234}" type="slidenum">
               <a:rPr lang="en"/>
-              <a:t>40</a:t>
+              <a:t>50</a:t>
             </a:fld>
             <a:endParaRPr/>
           </a:p>
@@ -29004,7 +32611,7 @@
 </p:sld>
 </file>
 
-<file path=ppt/slides/slide41.xml><?xml version="1.0" encoding="utf-8"?>
+<file path=ppt/slides/slide51.xml><?xml version="1.0" encoding="utf-8"?>
 <p:sld xmlns:a="http://schemas.openxmlformats.org/drawingml/2006/main" xmlns:r="http://schemas.openxmlformats.org/officeDocument/2006/relationships" xmlns:p="http://schemas.openxmlformats.org/presentationml/2006/main">
   <p:cSld>
     <p:spTree>
@@ -29061,7 +32668,7 @@
                   <a:schemeClr val="dk1"/>
                 </a:solidFill>
               </a:rPr>
-              <a:t>41</a:t>
+              <a:t>51</a:t>
             </a:fld>
             <a:endParaRPr>
               <a:solidFill>
@@ -29580,369 +33187,6 @@
     <p:bldLst>
       <p:bldP spid="770" grpId="0"/>
     </p:bldLst>
-  </p:timing>
-</p:sld>
-</file>
-
-<file path=ppt/slides/slide5.xml><?xml version="1.0" encoding="utf-8"?>
-<p:sld xmlns:a="http://schemas.openxmlformats.org/drawingml/2006/main" xmlns:r="http://schemas.openxmlformats.org/officeDocument/2006/relationships" xmlns:p="http://schemas.openxmlformats.org/presentationml/2006/main">
-  <p:cSld>
-    <p:spTree>
-      <p:nvGrpSpPr>
-        <p:cNvPr id="1" name="Shape 529"/>
-        <p:cNvGrpSpPr/>
-        <p:nvPr/>
-      </p:nvGrpSpPr>
-      <p:grpSpPr>
-        <a:xfrm>
-          <a:off x="0" y="0"/>
-          <a:ext cx="0" cy="0"/>
-          <a:chOff x="0" y="0"/>
-          <a:chExt cx="0" cy="0"/>
-        </a:xfrm>
-      </p:grpSpPr>
-      <p:sp>
-        <p:nvSpPr>
-          <p:cNvPr id="530" name="Google Shape;530;p15"/>
-          <p:cNvSpPr txBox="1">
-            <a:spLocks noGrp="1"/>
-          </p:cNvSpPr>
-          <p:nvPr>
-            <p:ph type="ctrTitle"/>
-          </p:nvPr>
-        </p:nvSpPr>
-        <p:spPr>
-          <a:xfrm>
-            <a:off x="611560" y="1779662"/>
-            <a:ext cx="5497200" cy="872700"/>
-          </a:xfrm>
-          <a:prstGeom prst="rect">
-            <a:avLst/>
-          </a:prstGeom>
-        </p:spPr>
-        <p:txBody>
-          <a:bodyPr spcFirstLastPara="1" wrap="square" lIns="0" tIns="0" rIns="0" bIns="0" anchor="b" anchorCtr="0">
-            <a:noAutofit/>
-          </a:bodyPr>
-          <a:lstStyle/>
-          <a:p>
-            <a:pPr marL="0" lvl="0" indent="0" algn="l" rtl="0">
-              <a:spcBef>
-                <a:spcPts val="0"/>
-              </a:spcBef>
-              <a:spcAft>
-                <a:spcPts val="0"/>
-              </a:spcAft>
-              <a:buNone/>
-            </a:pPr>
-            <a:r>
-              <a:rPr lang="en" dirty="0"/>
-              <a:t>1. </a:t>
-            </a:r>
-            <a:r>
-              <a:rPr lang="en" dirty="0" smtClean="0"/>
-              <a:t>Giới thiệu phần mềm</a:t>
-            </a:r>
-            <a:endParaRPr dirty="0"/>
-          </a:p>
-        </p:txBody>
-      </p:sp>
-      <p:sp>
-        <p:nvSpPr>
-          <p:cNvPr id="531" name="Google Shape;531;p15"/>
-          <p:cNvSpPr txBox="1">
-            <a:spLocks noGrp="1"/>
-          </p:cNvSpPr>
-          <p:nvPr>
-            <p:ph type="subTitle" idx="1"/>
-          </p:nvPr>
-        </p:nvSpPr>
-        <p:spPr>
-          <a:xfrm>
-            <a:off x="603425" y="2604674"/>
-            <a:ext cx="5497200" cy="831172"/>
-          </a:xfrm>
-          <a:prstGeom prst="rect">
-            <a:avLst/>
-          </a:prstGeom>
-        </p:spPr>
-        <p:txBody>
-          <a:bodyPr spcFirstLastPara="1" wrap="square" lIns="0" tIns="0" rIns="0" bIns="0" anchor="t" anchorCtr="0">
-            <a:noAutofit/>
-          </a:bodyPr>
-          <a:lstStyle/>
-          <a:p>
-            <a:pPr marL="342900" lvl="0" indent="-342900" algn="l" rtl="0">
-              <a:spcBef>
-                <a:spcPts val="0"/>
-              </a:spcBef>
-              <a:spcAft>
-                <a:spcPts val="0"/>
-              </a:spcAft>
-              <a:buFont typeface="Wingdings" pitchFamily="2" charset="2"/>
-              <a:buChar char="Ø"/>
-            </a:pPr>
-            <a:r>
-              <a:rPr lang="en-US" dirty="0" err="1" smtClean="0">
-                <a:solidFill>
-                  <a:schemeClr val="tx2">
-                    <a:lumMod val="50000"/>
-                  </a:schemeClr>
-                </a:solidFill>
-              </a:rPr>
-              <a:t>Là</a:t>
-            </a:r>
-            <a:r>
-              <a:rPr lang="en-US" dirty="0" smtClean="0">
-                <a:solidFill>
-                  <a:schemeClr val="tx2">
-                    <a:lumMod val="50000"/>
-                  </a:schemeClr>
-                </a:solidFill>
-              </a:rPr>
-              <a:t> </a:t>
-            </a:r>
-            <a:r>
-              <a:rPr lang="en-US" dirty="0" err="1" smtClean="0">
-                <a:solidFill>
-                  <a:schemeClr val="tx2">
-                    <a:lumMod val="50000"/>
-                  </a:schemeClr>
-                </a:solidFill>
-              </a:rPr>
-              <a:t>một</a:t>
-            </a:r>
-            <a:r>
-              <a:rPr lang="en-US" dirty="0" smtClean="0">
-                <a:solidFill>
-                  <a:schemeClr val="tx2">
-                    <a:lumMod val="50000"/>
-                  </a:schemeClr>
-                </a:solidFill>
-              </a:rPr>
-              <a:t> </a:t>
-            </a:r>
-            <a:r>
-              <a:rPr lang="en-US" dirty="0" err="1" smtClean="0">
-                <a:solidFill>
-                  <a:schemeClr val="tx2">
-                    <a:lumMod val="50000"/>
-                  </a:schemeClr>
-                </a:solidFill>
-              </a:rPr>
-              <a:t>phần</a:t>
-            </a:r>
-            <a:r>
-              <a:rPr lang="en-US" dirty="0" smtClean="0">
-                <a:solidFill>
-                  <a:schemeClr val="tx2">
-                    <a:lumMod val="50000"/>
-                  </a:schemeClr>
-                </a:solidFill>
-              </a:rPr>
-              <a:t> </a:t>
-            </a:r>
-            <a:r>
-              <a:rPr lang="en-US" dirty="0" err="1" smtClean="0">
-                <a:solidFill>
-                  <a:schemeClr val="tx2">
-                    <a:lumMod val="50000"/>
-                  </a:schemeClr>
-                </a:solidFill>
-              </a:rPr>
-              <a:t>mềm</a:t>
-            </a:r>
-            <a:r>
-              <a:rPr lang="en-US" dirty="0" smtClean="0">
-                <a:solidFill>
-                  <a:schemeClr val="tx2">
-                    <a:lumMod val="50000"/>
-                  </a:schemeClr>
-                </a:solidFill>
-              </a:rPr>
-              <a:t> </a:t>
-            </a:r>
-            <a:r>
-              <a:rPr lang="en-US" dirty="0" err="1" smtClean="0">
-                <a:solidFill>
-                  <a:schemeClr val="tx2">
-                    <a:lumMod val="50000"/>
-                  </a:schemeClr>
-                </a:solidFill>
-              </a:rPr>
-              <a:t>quản</a:t>
-            </a:r>
-            <a:r>
-              <a:rPr lang="en-US" dirty="0" smtClean="0">
-                <a:solidFill>
-                  <a:schemeClr val="tx2">
-                    <a:lumMod val="50000"/>
-                  </a:schemeClr>
-                </a:solidFill>
-              </a:rPr>
-              <a:t> </a:t>
-            </a:r>
-            <a:r>
-              <a:rPr lang="en-US" dirty="0" err="1" smtClean="0">
-                <a:solidFill>
-                  <a:schemeClr val="tx2">
-                    <a:lumMod val="50000"/>
-                  </a:schemeClr>
-                </a:solidFill>
-              </a:rPr>
-              <a:t>lý</a:t>
-            </a:r>
-            <a:r>
-              <a:rPr lang="en-US" dirty="0" smtClean="0">
-                <a:solidFill>
-                  <a:schemeClr val="tx2">
-                    <a:lumMod val="50000"/>
-                  </a:schemeClr>
-                </a:solidFill>
-              </a:rPr>
-              <a:t> </a:t>
-            </a:r>
-            <a:r>
-              <a:rPr lang="en-US" dirty="0" err="1" smtClean="0">
-                <a:solidFill>
-                  <a:schemeClr val="tx2">
-                    <a:lumMod val="50000"/>
-                  </a:schemeClr>
-                </a:solidFill>
-              </a:rPr>
-              <a:t>giảng</a:t>
-            </a:r>
-            <a:r>
-              <a:rPr lang="en-US" dirty="0" smtClean="0">
-                <a:solidFill>
-                  <a:schemeClr val="tx2">
-                    <a:lumMod val="50000"/>
-                  </a:schemeClr>
-                </a:solidFill>
-              </a:rPr>
-              <a:t> </a:t>
-            </a:r>
-            <a:r>
-              <a:rPr lang="en-US" dirty="0" err="1" smtClean="0">
-                <a:solidFill>
-                  <a:schemeClr val="tx2">
-                    <a:lumMod val="50000"/>
-                  </a:schemeClr>
-                </a:solidFill>
-              </a:rPr>
-              <a:t>viên</a:t>
-            </a:r>
-            <a:r>
-              <a:rPr lang="en-US" dirty="0" smtClean="0">
-                <a:solidFill>
-                  <a:schemeClr val="tx2">
-                    <a:lumMod val="50000"/>
-                  </a:schemeClr>
-                </a:solidFill>
-              </a:rPr>
-              <a:t> </a:t>
-            </a:r>
-            <a:r>
-              <a:rPr lang="en-US" dirty="0" err="1" smtClean="0">
-                <a:solidFill>
-                  <a:schemeClr val="tx2">
-                    <a:lumMod val="50000"/>
-                  </a:schemeClr>
-                </a:solidFill>
-              </a:rPr>
-              <a:t>của</a:t>
-            </a:r>
-            <a:r>
-              <a:rPr lang="en-US" dirty="0" smtClean="0">
-                <a:solidFill>
-                  <a:schemeClr val="tx2">
-                    <a:lumMod val="50000"/>
-                  </a:schemeClr>
-                </a:solidFill>
-              </a:rPr>
-              <a:t> </a:t>
-            </a:r>
-            <a:r>
-              <a:rPr lang="en-US" dirty="0" err="1" smtClean="0">
-                <a:solidFill>
-                  <a:schemeClr val="tx2">
-                    <a:lumMod val="50000"/>
-                  </a:schemeClr>
-                </a:solidFill>
-              </a:rPr>
-              <a:t>phòng</a:t>
-            </a:r>
-            <a:r>
-              <a:rPr lang="en-US" dirty="0" smtClean="0">
-                <a:solidFill>
-                  <a:schemeClr val="tx2">
-                    <a:lumMod val="50000"/>
-                  </a:schemeClr>
-                </a:solidFill>
-              </a:rPr>
-              <a:t> </a:t>
-            </a:r>
-            <a:r>
-              <a:rPr lang="en-US" dirty="0" err="1" smtClean="0">
-                <a:solidFill>
-                  <a:schemeClr val="tx2">
-                    <a:lumMod val="50000"/>
-                  </a:schemeClr>
-                </a:solidFill>
-              </a:rPr>
-              <a:t>giáo</a:t>
-            </a:r>
-            <a:r>
-              <a:rPr lang="en-US" dirty="0" smtClean="0">
-                <a:solidFill>
-                  <a:schemeClr val="tx2">
-                    <a:lumMod val="50000"/>
-                  </a:schemeClr>
-                </a:solidFill>
-              </a:rPr>
-              <a:t> </a:t>
-            </a:r>
-            <a:r>
-              <a:rPr lang="en-US" dirty="0" err="1" smtClean="0">
-                <a:solidFill>
-                  <a:schemeClr val="tx2">
-                    <a:lumMod val="50000"/>
-                  </a:schemeClr>
-                </a:solidFill>
-              </a:rPr>
-              <a:t>vụ</a:t>
-            </a:r>
-            <a:r>
-              <a:rPr lang="en-US" dirty="0" smtClean="0">
-                <a:solidFill>
-                  <a:schemeClr val="tx2">
-                    <a:lumMod val="50000"/>
-                  </a:schemeClr>
-                </a:solidFill>
-              </a:rPr>
-              <a:t>.</a:t>
-            </a:r>
-            <a:endParaRPr dirty="0">
-              <a:solidFill>
-                <a:schemeClr val="tx2">
-                  <a:lumMod val="50000"/>
-                </a:schemeClr>
-              </a:solidFill>
-            </a:endParaRPr>
-          </a:p>
-        </p:txBody>
-      </p:sp>
-    </p:spTree>
-  </p:cSld>
-  <p:clrMapOvr>
-    <a:masterClrMapping/>
-  </p:clrMapOvr>
-  <p:timing>
-    <p:tnLst>
-      <p:par>
-        <p:cTn id="1" dur="indefinite" restart="never" nodeType="tmRoot"/>
-      </p:par>
-    </p:tnLst>
   </p:timing>
 </p:sld>
 </file>

</xml_diff>